<commit_message>
Add tài liệu mô hình đối tượng cho phân hệ Khách tham quan và Nhân viên nhập hàng
</commit_message>
<xml_diff>
--- a/Laptop_Phong_Vu_Mo_hinh_Doi_tuong.pptx
+++ b/Laptop_Phong_Vu_Mo_hinh_Doi_tuong.pptx
@@ -8,11 +8,13 @@
     <p:notesMasterId r:id="rId4"/>
   </p:notesMasterIdLst>
   <p:handoutMasterIdLst>
-    <p:handoutMasterId r:id="rId6"/>
+    <p:handoutMasterId r:id="rId8"/>
   </p:handoutMasterIdLst>
   <p:sldIdLst>
     <p:sldId id="293" r:id="rId3"/>
     <p:sldId id="305" r:id="rId5"/>
+    <p:sldId id="306" r:id="rId6"/>
+    <p:sldId id="307" r:id="rId7"/>
   </p:sldIdLst>
   <p:sldSz cx="12192000" cy="6858000"/>
   <p:notesSz cx="6858000" cy="9144000"/>
@@ -706,6 +708,178 @@
 </file>
 
 <file path=ppt/notesSlides/notesSlide2.xml><?xml version="1.0" encoding="utf-8"?>
+<p:notes xmlns:a="http://schemas.openxmlformats.org/drawingml/2006/main" xmlns:r="http://schemas.openxmlformats.org/officeDocument/2006/relationships" xmlns:p="http://schemas.openxmlformats.org/presentationml/2006/main">
+  <p:cSld>
+    <p:spTree>
+      <p:nvGrpSpPr>
+        <p:cNvPr id="1" name=""/>
+        <p:cNvGrpSpPr/>
+        <p:nvPr/>
+      </p:nvGrpSpPr>
+      <p:grpSpPr>
+        <a:xfrm>
+          <a:off x="0" y="0"/>
+          <a:ext cx="0" cy="0"/>
+          <a:chOff x="0" y="0"/>
+          <a:chExt cx="0" cy="0"/>
+        </a:xfrm>
+      </p:grpSpPr>
+      <p:sp>
+        <p:nvSpPr>
+          <p:cNvPr id="2" name="Slide Image Placeholder 1"/>
+          <p:cNvSpPr>
+            <a:spLocks noGrp="1" noRot="1" noChangeAspect="1"/>
+          </p:cNvSpPr>
+          <p:nvPr>
+            <p:ph type="sldImg"/>
+          </p:nvPr>
+        </p:nvSpPr>
+        <p:spPr/>
+      </p:sp>
+      <p:sp>
+        <p:nvSpPr>
+          <p:cNvPr id="3" name="Notes Placeholder 2"/>
+          <p:cNvSpPr>
+            <a:spLocks noGrp="1"/>
+          </p:cNvSpPr>
+          <p:nvPr>
+            <p:ph type="body" idx="1"/>
+          </p:nvPr>
+        </p:nvSpPr>
+        <p:spPr/>
+        <p:txBody>
+          <a:bodyPr/>
+          <a:lstStyle/>
+          <a:p>
+            <a:endParaRPr lang="en-US"/>
+          </a:p>
+        </p:txBody>
+      </p:sp>
+      <p:sp>
+        <p:nvSpPr>
+          <p:cNvPr id="4" name="Slide Number Placeholder 3"/>
+          <p:cNvSpPr>
+            <a:spLocks noGrp="1"/>
+          </p:cNvSpPr>
+          <p:nvPr>
+            <p:ph type="sldNum" sz="quarter" idx="10"/>
+          </p:nvPr>
+        </p:nvSpPr>
+        <p:spPr/>
+        <p:txBody>
+          <a:bodyPr/>
+          <a:lstStyle/>
+          <a:p>
+            <a:fld id="{1C6F55E1-8FA1-4431-8CCD-46EFB1EBE07A}" type="slidenum">
+              <a:rPr lang="vi-VN" smtClean="0">
+                <a:solidFill>
+                  <a:prstClr val="black"/>
+                </a:solidFill>
+              </a:rPr>
+            </a:fld>
+            <a:endParaRPr lang="vi-VN">
+              <a:solidFill>
+                <a:prstClr val="black"/>
+              </a:solidFill>
+            </a:endParaRPr>
+          </a:p>
+        </p:txBody>
+      </p:sp>
+    </p:spTree>
+  </p:cSld>
+  <p:clrMapOvr>
+    <a:masterClrMapping/>
+  </p:clrMapOvr>
+</p:notes>
+</file>
+
+<file path=ppt/notesSlides/notesSlide3.xml><?xml version="1.0" encoding="utf-8"?>
+<p:notes xmlns:a="http://schemas.openxmlformats.org/drawingml/2006/main" xmlns:r="http://schemas.openxmlformats.org/officeDocument/2006/relationships" xmlns:p="http://schemas.openxmlformats.org/presentationml/2006/main">
+  <p:cSld>
+    <p:spTree>
+      <p:nvGrpSpPr>
+        <p:cNvPr id="1" name=""/>
+        <p:cNvGrpSpPr/>
+        <p:nvPr/>
+      </p:nvGrpSpPr>
+      <p:grpSpPr>
+        <a:xfrm>
+          <a:off x="0" y="0"/>
+          <a:ext cx="0" cy="0"/>
+          <a:chOff x="0" y="0"/>
+          <a:chExt cx="0" cy="0"/>
+        </a:xfrm>
+      </p:grpSpPr>
+      <p:sp>
+        <p:nvSpPr>
+          <p:cNvPr id="2" name="Slide Image Placeholder 1"/>
+          <p:cNvSpPr>
+            <a:spLocks noGrp="1" noRot="1" noChangeAspect="1"/>
+          </p:cNvSpPr>
+          <p:nvPr>
+            <p:ph type="sldImg"/>
+          </p:nvPr>
+        </p:nvSpPr>
+        <p:spPr/>
+      </p:sp>
+      <p:sp>
+        <p:nvSpPr>
+          <p:cNvPr id="3" name="Notes Placeholder 2"/>
+          <p:cNvSpPr>
+            <a:spLocks noGrp="1"/>
+          </p:cNvSpPr>
+          <p:nvPr>
+            <p:ph type="body" idx="1"/>
+          </p:nvPr>
+        </p:nvSpPr>
+        <p:spPr/>
+        <p:txBody>
+          <a:bodyPr/>
+          <a:lstStyle/>
+          <a:p>
+            <a:endParaRPr lang="en-US"/>
+          </a:p>
+        </p:txBody>
+      </p:sp>
+      <p:sp>
+        <p:nvSpPr>
+          <p:cNvPr id="4" name="Slide Number Placeholder 3"/>
+          <p:cNvSpPr>
+            <a:spLocks noGrp="1"/>
+          </p:cNvSpPr>
+          <p:nvPr>
+            <p:ph type="sldNum" sz="quarter" idx="10"/>
+          </p:nvPr>
+        </p:nvSpPr>
+        <p:spPr/>
+        <p:txBody>
+          <a:bodyPr/>
+          <a:lstStyle/>
+          <a:p>
+            <a:fld id="{1C6F55E1-8FA1-4431-8CCD-46EFB1EBE07A}" type="slidenum">
+              <a:rPr lang="vi-VN" smtClean="0">
+                <a:solidFill>
+                  <a:prstClr val="black"/>
+                </a:solidFill>
+              </a:rPr>
+            </a:fld>
+            <a:endParaRPr lang="vi-VN">
+              <a:solidFill>
+                <a:prstClr val="black"/>
+              </a:solidFill>
+            </a:endParaRPr>
+          </a:p>
+        </p:txBody>
+      </p:sp>
+    </p:spTree>
+  </p:cSld>
+  <p:clrMapOvr>
+    <a:masterClrMapping/>
+  </p:clrMapOvr>
+</p:notes>
+</file>
+
+<file path=ppt/notesSlides/notesSlide4.xml><?xml version="1.0" encoding="utf-8"?>
 <p:notes xmlns:a="http://schemas.openxmlformats.org/drawingml/2006/main" xmlns:r="http://schemas.openxmlformats.org/officeDocument/2006/relationships" xmlns:p="http://schemas.openxmlformats.org/presentationml/2006/main">
   <p:cSld>
     <p:spTree>
@@ -4245,11 +4419,21 @@
                 <a:latin typeface="Arial" panose="020B0604020202020204" pitchFamily="34" charset="0"/>
                 <a:cs typeface="Arial" panose="020B0604020202020204" pitchFamily="34" charset="0"/>
               </a:rPr>
-              <a:t>), Đặt hàng</a:t>
+              <a:t>), </a:t>
+            </a:r>
+            <a:r>
+              <a:rPr lang="en-US" sz="1400" smtClean="0">
+                <a:solidFill>
+                  <a:srgbClr val="FF0000"/>
+                </a:solidFill>
+                <a:latin typeface="Arial" panose="020B0604020202020204" pitchFamily="34" charset="0"/>
+                <a:cs typeface="Arial" panose="020B0604020202020204" pitchFamily="34" charset="0"/>
+              </a:rPr>
+              <a:t>Đặt hàng</a:t>
             </a:r>
             <a:endParaRPr lang="en-US" sz="1400" smtClean="0">
               <a:solidFill>
-                <a:srgbClr val="002060"/>
+                <a:srgbClr val="FF0000"/>
               </a:solidFill>
               <a:latin typeface="Arial" panose="020B0604020202020204" pitchFamily="34" charset="0"/>
               <a:cs typeface="Arial" panose="020B0604020202020204" pitchFamily="34" charset="0"/>
@@ -6098,12 +6282,24 @@
             <a:r>
               <a:rPr lang="en-US" sz="1600" b="1" smtClean="0">
                 <a:solidFill>
+                  <a:srgbClr val="FFFF00"/>
+                </a:solidFill>
+                <a:latin typeface="Arial" panose="020B0604020202020204" pitchFamily="34" charset="0"/>
+                <a:cs typeface="Arial" panose="020B0604020202020204" pitchFamily="34" charset="0"/>
+                <a:sym typeface="+mn-ea"/>
+              </a:rPr>
+              <a:t>Công ty Laptop Phong Vũ</a:t>
+            </a:r>
+            <a:r>
+              <a:rPr lang="en-US" sz="1600" b="1" smtClean="0">
+                <a:solidFill>
                   <a:prstClr val="white"/>
                 </a:solidFill>
                 <a:latin typeface="Arial" panose="020B0604020202020204" pitchFamily="34" charset="0"/>
                 <a:cs typeface="Arial" panose="020B0604020202020204" pitchFamily="34" charset="0"/>
-              </a:rPr>
-              <a:t>Cửa hàng Tivi 1 </a:t>
+                <a:sym typeface="+mn-ea"/>
+              </a:rPr>
+              <a:t> </a:t>
             </a:r>
             <a:r>
               <a:rPr lang="en-US" sz="1600" smtClean="0">
@@ -6112,8 +6308,31 @@
                 </a:solidFill>
                 <a:latin typeface="Arial" panose="020B0604020202020204" pitchFamily="34" charset="0"/>
                 <a:cs typeface="Arial" panose="020B0604020202020204" pitchFamily="34" charset="0"/>
-              </a:rPr>
-              <a:t>( Mã số : Tivi_1)</a:t>
+                <a:sym typeface="+mn-ea"/>
+              </a:rPr>
+              <a:t>( Mã số : </a:t>
+            </a:r>
+            <a:r>
+              <a:rPr lang="en-US" sz="1600" smtClean="0">
+                <a:solidFill>
+                  <a:schemeClr val="bg1"/>
+                </a:solidFill>
+                <a:latin typeface="Arial" panose="020B0604020202020204" pitchFamily="34" charset="0"/>
+                <a:cs typeface="Arial" panose="020B0604020202020204" pitchFamily="34" charset="0"/>
+                <a:sym typeface="+mn-ea"/>
+              </a:rPr>
+              <a:t>Laptop_Phong_Vu</a:t>
+            </a:r>
+            <a:r>
+              <a:rPr lang="en-US" sz="1600" smtClean="0">
+                <a:solidFill>
+                  <a:prstClr val="white"/>
+                </a:solidFill>
+                <a:latin typeface="Arial" panose="020B0604020202020204" pitchFamily="34" charset="0"/>
+                <a:cs typeface="Arial" panose="020B0604020202020204" pitchFamily="34" charset="0"/>
+                <a:sym typeface="+mn-ea"/>
+              </a:rPr>
+              <a:t>)</a:t>
             </a:r>
             <a:endParaRPr lang="en-US" sz="1600" smtClean="0">
               <a:solidFill>
@@ -6153,7 +6372,7 @@
         </p:nvGrpSpPr>
         <p:grpSpPr>
           <a:xfrm>
-            <a:off x="5161897" y="1182784"/>
+            <a:off x="5161897" y="1173259"/>
             <a:ext cx="6623703" cy="2361927"/>
             <a:chOff x="5239516" y="917224"/>
             <a:chExt cx="6488196" cy="1862830"/>
@@ -6716,7 +6935,7 @@
         </p:nvGrpSpPr>
         <p:grpSpPr>
           <a:xfrm>
-            <a:off x="133937" y="189045"/>
+            <a:off x="133937" y="190950"/>
             <a:ext cx="4107738" cy="6522819"/>
             <a:chOff x="620563" y="2333151"/>
             <a:chExt cx="1767100" cy="6522819"/>
@@ -7595,6 +7814,3726 @@
           </p:txBody>
         </p:sp>
       </p:grpSp>
+    </p:spTree>
+  </p:cSld>
+  <p:clrMapOvr>
+    <a:masterClrMapping/>
+  </p:clrMapOvr>
+  <p:timing>
+    <p:tnLst>
+      <p:par>
+        <p:cTn id="1" dur="indefinite" restart="never" nodeType="tmRoot"/>
+      </p:par>
+    </p:tnLst>
+  </p:timing>
+</p:sld>
+</file>
+
+<file path=ppt/slides/slide3.xml><?xml version="1.0" encoding="utf-8"?>
+<p:sld xmlns:a="http://schemas.openxmlformats.org/drawingml/2006/main" xmlns:r="http://schemas.openxmlformats.org/officeDocument/2006/relationships" xmlns:p="http://schemas.openxmlformats.org/presentationml/2006/main">
+  <p:cSld>
+    <p:spTree>
+      <p:nvGrpSpPr>
+        <p:cNvPr id="1" name=""/>
+        <p:cNvGrpSpPr/>
+        <p:nvPr/>
+      </p:nvGrpSpPr>
+      <p:grpSpPr>
+        <a:xfrm>
+          <a:off x="0" y="0"/>
+          <a:ext cx="0" cy="0"/>
+          <a:chOff x="0" y="0"/>
+          <a:chExt cx="0" cy="0"/>
+        </a:xfrm>
+      </p:grpSpPr>
+      <p:sp>
+        <p:nvSpPr>
+          <p:cNvPr id="69" name="Rounded Rectangle 68">
+            <a:hlinkClick r:id="rId1" action="ppaction://hlinksldjump"/>
+          </p:cNvPr>
+          <p:cNvSpPr/>
+          <p:nvPr/>
+        </p:nvSpPr>
+        <p:spPr>
+          <a:xfrm>
+            <a:off x="5479061" y="190982"/>
+            <a:ext cx="6074929" cy="754401"/>
+          </a:xfrm>
+          <a:prstGeom prst="roundRect">
+            <a:avLst/>
+          </a:prstGeom>
+          <a:solidFill>
+            <a:srgbClr val="002060"/>
+          </a:solidFill>
+          <a:ln w="38100" cap="rnd">
+            <a:solidFill>
+              <a:schemeClr val="bg1"/>
+            </a:solidFill>
+          </a:ln>
+          <a:effectLst>
+            <a:outerShdw blurRad="482600" dir="5400000" sx="89000" sy="89000" algn="ctr" rotWithShape="0">
+              <a:srgbClr val="000000">
+                <a:alpha val="49000"/>
+              </a:srgbClr>
+            </a:outerShdw>
+          </a:effectLst>
+          <a:scene3d>
+            <a:camera prst="orthographicFront"/>
+            <a:lightRig rig="twoPt" dir="t"/>
+          </a:scene3d>
+          <a:sp3d extrusionH="12700" prstMaterial="translucentPowder">
+            <a:bevelB w="165100" prst="coolSlant"/>
+          </a:sp3d>
+        </p:spPr>
+        <p:style>
+          <a:lnRef idx="2">
+            <a:schemeClr val="accent1">
+              <a:shade val="50000"/>
+            </a:schemeClr>
+          </a:lnRef>
+          <a:fillRef idx="1">
+            <a:schemeClr val="accent1"/>
+          </a:fillRef>
+          <a:effectRef idx="0">
+            <a:schemeClr val="accent1"/>
+          </a:effectRef>
+          <a:fontRef idx="minor">
+            <a:schemeClr val="lt1"/>
+          </a:fontRef>
+        </p:style>
+        <p:txBody>
+          <a:bodyPr rtlCol="0" anchor="ctr"/>
+          <a:lstStyle/>
+          <a:p>
+            <a:pPr algn="ctr"/>
+            <a:r>
+              <a:rPr lang="en-US" sz="1600" b="1" smtClean="0">
+                <a:solidFill>
+                  <a:srgbClr val="FFFF00"/>
+                </a:solidFill>
+                <a:latin typeface="Arial" panose="020B0604020202020204" pitchFamily="34" charset="0"/>
+                <a:cs typeface="Arial" panose="020B0604020202020204" pitchFamily="34" charset="0"/>
+                <a:sym typeface="+mn-ea"/>
+              </a:rPr>
+              <a:t>Công ty Laptop Phong Vũ</a:t>
+            </a:r>
+            <a:r>
+              <a:rPr lang="en-US" sz="1600" b="1" smtClean="0">
+                <a:solidFill>
+                  <a:prstClr val="white"/>
+                </a:solidFill>
+                <a:latin typeface="Arial" panose="020B0604020202020204" pitchFamily="34" charset="0"/>
+                <a:cs typeface="Arial" panose="020B0604020202020204" pitchFamily="34" charset="0"/>
+                <a:sym typeface="+mn-ea"/>
+              </a:rPr>
+              <a:t> </a:t>
+            </a:r>
+            <a:r>
+              <a:rPr lang="en-US" sz="1600" smtClean="0">
+                <a:solidFill>
+                  <a:prstClr val="white"/>
+                </a:solidFill>
+                <a:latin typeface="Arial" panose="020B0604020202020204" pitchFamily="34" charset="0"/>
+                <a:cs typeface="Arial" panose="020B0604020202020204" pitchFamily="34" charset="0"/>
+                <a:sym typeface="+mn-ea"/>
+              </a:rPr>
+              <a:t>( Mã số : </a:t>
+            </a:r>
+            <a:r>
+              <a:rPr lang="en-US" sz="1600" smtClean="0">
+                <a:solidFill>
+                  <a:schemeClr val="bg1"/>
+                </a:solidFill>
+                <a:latin typeface="Arial" panose="020B0604020202020204" pitchFamily="34" charset="0"/>
+                <a:cs typeface="Arial" panose="020B0604020202020204" pitchFamily="34" charset="0"/>
+                <a:sym typeface="+mn-ea"/>
+              </a:rPr>
+              <a:t>Laptop_Phong_Vu</a:t>
+            </a:r>
+            <a:r>
+              <a:rPr lang="en-US" sz="1600" smtClean="0">
+                <a:solidFill>
+                  <a:prstClr val="white"/>
+                </a:solidFill>
+                <a:latin typeface="Arial" panose="020B0604020202020204" pitchFamily="34" charset="0"/>
+                <a:cs typeface="Arial" panose="020B0604020202020204" pitchFamily="34" charset="0"/>
+                <a:sym typeface="+mn-ea"/>
+              </a:rPr>
+              <a:t>)</a:t>
+            </a:r>
+            <a:endParaRPr lang="en-US" sz="1600" smtClean="0">
+              <a:solidFill>
+                <a:prstClr val="white"/>
+              </a:solidFill>
+              <a:latin typeface="Arial" panose="020B0604020202020204" pitchFamily="34" charset="0"/>
+              <a:cs typeface="Arial" panose="020B0604020202020204" pitchFamily="34" charset="0"/>
+            </a:endParaRPr>
+          </a:p>
+          <a:p>
+            <a:pPr algn="ctr"/>
+            <a:r>
+              <a:rPr lang="en-US" sz="1600" b="1" smtClean="0">
+                <a:solidFill>
+                  <a:srgbClr val="FFFF00"/>
+                </a:solidFill>
+                <a:latin typeface="Arial" panose="020B0604020202020204" pitchFamily="34" charset="0"/>
+                <a:cs typeface="Arial" panose="020B0604020202020204" pitchFamily="34" charset="0"/>
+              </a:rPr>
+              <a:t>Mô hình đối tượng xử lý của Phân hệ Khách Tham quan </a:t>
+            </a:r>
+            <a:endParaRPr lang="vi-VN" sz="1600">
+              <a:solidFill>
+                <a:srgbClr val="FFFF00"/>
+              </a:solidFill>
+              <a:latin typeface="Arial" panose="020B0604020202020204" pitchFamily="34" charset="0"/>
+              <a:cs typeface="Arial" panose="020B0604020202020204" pitchFamily="34" charset="0"/>
+            </a:endParaRPr>
+          </a:p>
+        </p:txBody>
+      </p:sp>
+      <p:sp>
+        <p:nvSpPr>
+          <p:cNvPr id="10" name="Cube 9">
+            <a:hlinkClick r:id="" action="ppaction://noaction"/>
+          </p:cNvPr>
+          <p:cNvSpPr/>
+          <p:nvPr/>
+        </p:nvSpPr>
+        <p:spPr>
+          <a:xfrm>
+            <a:off x="5161897" y="2009249"/>
+            <a:ext cx="4665340" cy="1292616"/>
+          </a:xfrm>
+          <a:prstGeom prst="cube">
+            <a:avLst>
+              <a:gd name="adj" fmla="val 15836"/>
+            </a:avLst>
+          </a:prstGeom>
+          <a:solidFill>
+            <a:schemeClr val="bg1"/>
+          </a:solidFill>
+          <a:ln w="6350">
+            <a:prstDash val="sysDash"/>
+          </a:ln>
+        </p:spPr>
+        <p:style>
+          <a:lnRef idx="2">
+            <a:schemeClr val="accent1">
+              <a:shade val="50000"/>
+            </a:schemeClr>
+          </a:lnRef>
+          <a:fillRef idx="1">
+            <a:schemeClr val="accent1"/>
+          </a:fillRef>
+          <a:effectRef idx="0">
+            <a:schemeClr val="accent1"/>
+          </a:effectRef>
+          <a:fontRef idx="minor">
+            <a:schemeClr val="lt1"/>
+          </a:fontRef>
+        </p:style>
+        <p:txBody>
+          <a:bodyPr rtlCol="0" anchor="ctr"/>
+          <a:lstStyle/>
+          <a:p>
+            <a:pPr algn="ctr"/>
+            <a:endParaRPr lang="vi-VN" sz="3200" b="1">
+              <a:solidFill>
+                <a:prstClr val="white"/>
+              </a:solidFill>
+            </a:endParaRPr>
+          </a:p>
+        </p:txBody>
+      </p:sp>
+      <p:sp>
+        <p:nvSpPr>
+          <p:cNvPr id="11" name="Oval 10"/>
+          <p:cNvSpPr/>
+          <p:nvPr/>
+        </p:nvSpPr>
+        <p:spPr>
+          <a:xfrm>
+            <a:off x="7749054" y="2318725"/>
+            <a:ext cx="1763271" cy="680610"/>
+          </a:xfrm>
+          <a:prstGeom prst="ellipse">
+            <a:avLst/>
+          </a:prstGeom>
+          <a:solidFill>
+            <a:schemeClr val="bg1"/>
+          </a:solidFill>
+        </p:spPr>
+        <p:style>
+          <a:lnRef idx="2">
+            <a:schemeClr val="accent1">
+              <a:shade val="50000"/>
+            </a:schemeClr>
+          </a:lnRef>
+          <a:fillRef idx="1">
+            <a:schemeClr val="accent1"/>
+          </a:fillRef>
+          <a:effectRef idx="0">
+            <a:schemeClr val="accent1"/>
+          </a:effectRef>
+          <a:fontRef idx="minor">
+            <a:schemeClr val="lt1"/>
+          </a:fontRef>
+        </p:style>
+        <p:txBody>
+          <a:bodyPr rtlCol="0" anchor="ctr"/>
+          <a:lstStyle/>
+          <a:p>
+            <a:pPr algn="ctr"/>
+            <a:endParaRPr lang="en-US" sz="1600" smtClean="0">
+              <a:solidFill>
+                <a:srgbClr val="FF0000"/>
+              </a:solidFill>
+              <a:latin typeface="Arial" panose="020B0604020202020204" pitchFamily="34" charset="0"/>
+              <a:cs typeface="Arial" panose="020B0604020202020204" pitchFamily="34" charset="0"/>
+            </a:endParaRPr>
+          </a:p>
+          <a:p>
+            <a:pPr algn="ctr"/>
+            <a:r>
+              <a:rPr lang="en-US" sz="1600" smtClean="0">
+                <a:solidFill>
+                  <a:srgbClr val="FF0000"/>
+                </a:solidFill>
+                <a:latin typeface="Arial" panose="020B0604020202020204" pitchFamily="34" charset="0"/>
+                <a:cs typeface="Arial" panose="020B0604020202020204" pitchFamily="34" charset="0"/>
+              </a:rPr>
+              <a:t>Lệnh </a:t>
+            </a:r>
+            <a:r>
+              <a:rPr lang="en-US" sz="1600" b="1" smtClean="0">
+                <a:solidFill>
+                  <a:srgbClr val="FF0000"/>
+                </a:solidFill>
+                <a:latin typeface="Arial" panose="020B0604020202020204" pitchFamily="34" charset="0"/>
+                <a:cs typeface="Arial" panose="020B0604020202020204" pitchFamily="34" charset="0"/>
+              </a:rPr>
+              <a:t>(3B)</a:t>
+            </a:r>
+            <a:br>
+              <a:rPr lang="en-US" sz="1600" b="1" smtClean="0">
+                <a:solidFill>
+                  <a:srgbClr val="FF0000"/>
+                </a:solidFill>
+                <a:latin typeface="Arial" panose="020B0604020202020204" pitchFamily="34" charset="0"/>
+                <a:cs typeface="Arial" panose="020B0604020202020204" pitchFamily="34" charset="0"/>
+              </a:rPr>
+            </a:br>
+            <a:r>
+              <a:rPr lang="en-US" sz="1600" b="1" i="1" u="sng" smtClean="0">
+                <a:solidFill>
+                  <a:srgbClr val="FF0000"/>
+                </a:solidFill>
+                <a:latin typeface="Arial" panose="020B0604020202020204" pitchFamily="34" charset="0"/>
+                <a:cs typeface="Arial" panose="020B0604020202020204" pitchFamily="34" charset="0"/>
+              </a:rPr>
+              <a:t> </a:t>
+            </a:r>
+            <a:endParaRPr lang="en-US" sz="1600" b="1">
+              <a:solidFill>
+                <a:srgbClr val="FF0000"/>
+              </a:solidFill>
+              <a:latin typeface="Arial" panose="020B0604020202020204" pitchFamily="34" charset="0"/>
+              <a:cs typeface="Arial" panose="020B0604020202020204" pitchFamily="34" charset="0"/>
+            </a:endParaRPr>
+          </a:p>
+        </p:txBody>
+      </p:sp>
+      <p:grpSp>
+        <p:nvGrpSpPr>
+          <p:cNvPr id="15" name="Group 93"/>
+          <p:cNvGrpSpPr/>
+          <p:nvPr/>
+        </p:nvGrpSpPr>
+        <p:grpSpPr bwMode="auto">
+          <a:xfrm>
+            <a:off x="6275101" y="1190568"/>
+            <a:ext cx="630966" cy="632252"/>
+            <a:chOff x="4628879" y="642920"/>
+            <a:chExt cx="676276" cy="928696"/>
+          </a:xfrm>
+          <a:solidFill>
+            <a:srgbClr val="0070C0"/>
+          </a:solidFill>
+        </p:grpSpPr>
+        <p:sp>
+          <p:nvSpPr>
+            <p:cNvPr id="17" name="Oval 16"/>
+            <p:cNvSpPr/>
+            <p:nvPr/>
+          </p:nvSpPr>
+          <p:spPr>
+            <a:xfrm>
+              <a:off x="4703494" y="642920"/>
+              <a:ext cx="450850" cy="214315"/>
+            </a:xfrm>
+            <a:prstGeom prst="ellipse">
+              <a:avLst/>
+            </a:prstGeom>
+            <a:solidFill>
+              <a:schemeClr val="bg1"/>
+            </a:solidFill>
+            <a:ln w="31750" cmpd="sng">
+              <a:solidFill>
+                <a:schemeClr val="accent2"/>
+              </a:solidFill>
+            </a:ln>
+          </p:spPr>
+          <p:style>
+            <a:lnRef idx="2">
+              <a:schemeClr val="accent1">
+                <a:shade val="50000"/>
+              </a:schemeClr>
+            </a:lnRef>
+            <a:fillRef idx="1">
+              <a:schemeClr val="accent1"/>
+            </a:fillRef>
+            <a:effectRef idx="0">
+              <a:schemeClr val="accent1"/>
+            </a:effectRef>
+            <a:fontRef idx="minor">
+              <a:schemeClr val="lt1"/>
+            </a:fontRef>
+          </p:style>
+          <p:txBody>
+            <a:bodyPr anchor="ctr"/>
+            <a:lstStyle/>
+            <a:p>
+              <a:pPr algn="ctr">
+                <a:defRPr/>
+              </a:pPr>
+              <a:endParaRPr lang="vi-VN">
+                <a:solidFill>
+                  <a:prstClr val="white"/>
+                </a:solidFill>
+              </a:endParaRPr>
+            </a:p>
+          </p:txBody>
+        </p:sp>
+        <p:cxnSp>
+          <p:nvCxnSpPr>
+            <p:cNvPr id="18" name="Straight Arrow Connector 17"/>
+            <p:cNvCxnSpPr>
+              <a:stCxn id="17" idx="4"/>
+            </p:cNvCxnSpPr>
+            <p:nvPr/>
+          </p:nvCxnSpPr>
+          <p:spPr>
+            <a:xfrm rot="5400000">
+              <a:off x="4679679" y="1108062"/>
+              <a:ext cx="500067" cy="1588"/>
+            </a:xfrm>
+            <a:prstGeom prst="straightConnector1">
+              <a:avLst/>
+            </a:prstGeom>
+            <a:grpFill/>
+            <a:ln w="31750" cmpd="sng">
+              <a:solidFill>
+                <a:schemeClr val="accent2"/>
+              </a:solidFill>
+              <a:tailEnd type="none"/>
+            </a:ln>
+          </p:spPr>
+          <p:style>
+            <a:lnRef idx="1">
+              <a:schemeClr val="accent1"/>
+            </a:lnRef>
+            <a:fillRef idx="0">
+              <a:schemeClr val="accent1"/>
+            </a:fillRef>
+            <a:effectRef idx="0">
+              <a:schemeClr val="accent1"/>
+            </a:effectRef>
+            <a:fontRef idx="minor">
+              <a:schemeClr val="tx1"/>
+            </a:fontRef>
+          </p:style>
+        </p:cxnSp>
+        <p:cxnSp>
+          <p:nvCxnSpPr>
+            <p:cNvPr id="19" name="Straight Arrow Connector 18"/>
+            <p:cNvCxnSpPr/>
+            <p:nvPr/>
+          </p:nvCxnSpPr>
+          <p:spPr>
+            <a:xfrm rot="10800000" flipV="1">
+              <a:off x="4628879" y="1000111"/>
+              <a:ext cx="300037" cy="214314"/>
+            </a:xfrm>
+            <a:prstGeom prst="straightConnector1">
+              <a:avLst/>
+            </a:prstGeom>
+            <a:grpFill/>
+            <a:ln w="31750" cmpd="sng">
+              <a:solidFill>
+                <a:schemeClr val="accent2"/>
+              </a:solidFill>
+              <a:tailEnd type="none"/>
+            </a:ln>
+          </p:spPr>
+          <p:style>
+            <a:lnRef idx="1">
+              <a:schemeClr val="accent1"/>
+            </a:lnRef>
+            <a:fillRef idx="0">
+              <a:schemeClr val="accent1"/>
+            </a:fillRef>
+            <a:effectRef idx="0">
+              <a:schemeClr val="accent1"/>
+            </a:effectRef>
+            <a:fontRef idx="minor">
+              <a:schemeClr val="tx1"/>
+            </a:fontRef>
+          </p:style>
+        </p:cxnSp>
+        <p:cxnSp>
+          <p:nvCxnSpPr>
+            <p:cNvPr id="20" name="Straight Arrow Connector 19"/>
+            <p:cNvCxnSpPr/>
+            <p:nvPr/>
+          </p:nvCxnSpPr>
+          <p:spPr>
+            <a:xfrm rot="16200000" flipH="1">
+              <a:off x="4934471" y="1351746"/>
+              <a:ext cx="214315" cy="225426"/>
+            </a:xfrm>
+            <a:prstGeom prst="straightConnector1">
+              <a:avLst/>
+            </a:prstGeom>
+            <a:grpFill/>
+            <a:ln w="31750" cmpd="sng">
+              <a:solidFill>
+                <a:schemeClr val="accent2"/>
+              </a:solidFill>
+              <a:tailEnd type="none"/>
+            </a:ln>
+          </p:spPr>
+          <p:style>
+            <a:lnRef idx="1">
+              <a:schemeClr val="accent1"/>
+            </a:lnRef>
+            <a:fillRef idx="0">
+              <a:schemeClr val="accent1"/>
+            </a:fillRef>
+            <a:effectRef idx="0">
+              <a:schemeClr val="accent1"/>
+            </a:effectRef>
+            <a:fontRef idx="minor">
+              <a:schemeClr val="tx1"/>
+            </a:fontRef>
+          </p:style>
+        </p:cxnSp>
+        <p:cxnSp>
+          <p:nvCxnSpPr>
+            <p:cNvPr id="21" name="Straight Arrow Connector 20"/>
+            <p:cNvCxnSpPr/>
+            <p:nvPr/>
+          </p:nvCxnSpPr>
+          <p:spPr>
+            <a:xfrm rot="5400000">
+              <a:off x="4747145" y="1389846"/>
+              <a:ext cx="214315" cy="149225"/>
+            </a:xfrm>
+            <a:prstGeom prst="straightConnector1">
+              <a:avLst/>
+            </a:prstGeom>
+            <a:grpFill/>
+            <a:ln w="31750" cmpd="sng">
+              <a:solidFill>
+                <a:schemeClr val="accent2"/>
+              </a:solidFill>
+              <a:tailEnd type="none"/>
+            </a:ln>
+          </p:spPr>
+          <p:style>
+            <a:lnRef idx="1">
+              <a:schemeClr val="accent1"/>
+            </a:lnRef>
+            <a:fillRef idx="0">
+              <a:schemeClr val="accent1"/>
+            </a:fillRef>
+            <a:effectRef idx="0">
+              <a:schemeClr val="accent1"/>
+            </a:effectRef>
+            <a:fontRef idx="minor">
+              <a:schemeClr val="tx1"/>
+            </a:fontRef>
+          </p:style>
+        </p:cxnSp>
+        <p:cxnSp>
+          <p:nvCxnSpPr>
+            <p:cNvPr id="22" name="Straight Arrow Connector 21"/>
+            <p:cNvCxnSpPr/>
+            <p:nvPr/>
+          </p:nvCxnSpPr>
+          <p:spPr>
+            <a:xfrm flipV="1">
+              <a:off x="4928917" y="1071547"/>
+              <a:ext cx="376238" cy="71439"/>
+            </a:xfrm>
+            <a:prstGeom prst="straightConnector1">
+              <a:avLst/>
+            </a:prstGeom>
+            <a:grpFill/>
+            <a:ln w="31750" cmpd="sng">
+              <a:solidFill>
+                <a:schemeClr val="accent2"/>
+              </a:solidFill>
+              <a:tailEnd type="none"/>
+            </a:ln>
+          </p:spPr>
+          <p:style>
+            <a:lnRef idx="1">
+              <a:schemeClr val="accent1"/>
+            </a:lnRef>
+            <a:fillRef idx="0">
+              <a:schemeClr val="accent1"/>
+            </a:fillRef>
+            <a:effectRef idx="0">
+              <a:schemeClr val="accent1"/>
+            </a:effectRef>
+            <a:fontRef idx="minor">
+              <a:schemeClr val="tx1"/>
+            </a:fontRef>
+          </p:style>
+        </p:cxnSp>
+        <p:sp>
+          <p:nvSpPr>
+            <p:cNvPr id="23" name="Oval 22"/>
+            <p:cNvSpPr/>
+            <p:nvPr/>
+          </p:nvSpPr>
+          <p:spPr>
+            <a:xfrm>
+              <a:off x="4779699" y="714355"/>
+              <a:ext cx="74614" cy="71437"/>
+            </a:xfrm>
+            <a:prstGeom prst="ellipse">
+              <a:avLst/>
+            </a:prstGeom>
+            <a:grpFill/>
+            <a:ln w="31750" cmpd="sng">
+              <a:solidFill>
+                <a:schemeClr val="bg1"/>
+              </a:solidFill>
+            </a:ln>
+          </p:spPr>
+          <p:style>
+            <a:lnRef idx="2">
+              <a:schemeClr val="accent1">
+                <a:shade val="50000"/>
+              </a:schemeClr>
+            </a:lnRef>
+            <a:fillRef idx="1">
+              <a:schemeClr val="accent1"/>
+            </a:fillRef>
+            <a:effectRef idx="0">
+              <a:schemeClr val="accent1"/>
+            </a:effectRef>
+            <a:fontRef idx="minor">
+              <a:schemeClr val="lt1"/>
+            </a:fontRef>
+          </p:style>
+          <p:txBody>
+            <a:bodyPr anchor="ctr"/>
+            <a:lstStyle/>
+            <a:p>
+              <a:pPr algn="ctr">
+                <a:defRPr/>
+              </a:pPr>
+              <a:endParaRPr lang="vi-VN">
+                <a:solidFill>
+                  <a:prstClr val="white"/>
+                </a:solidFill>
+              </a:endParaRPr>
+            </a:p>
+          </p:txBody>
+        </p:sp>
+        <p:sp>
+          <p:nvSpPr>
+            <p:cNvPr id="24" name="Oval 23"/>
+            <p:cNvSpPr/>
+            <p:nvPr/>
+          </p:nvSpPr>
+          <p:spPr>
+            <a:xfrm>
+              <a:off x="5005149" y="714358"/>
+              <a:ext cx="74614" cy="71437"/>
+            </a:xfrm>
+            <a:prstGeom prst="ellipse">
+              <a:avLst/>
+            </a:prstGeom>
+            <a:grpFill/>
+            <a:ln w="31750" cmpd="sng">
+              <a:solidFill>
+                <a:schemeClr val="bg1"/>
+              </a:solidFill>
+            </a:ln>
+          </p:spPr>
+          <p:style>
+            <a:lnRef idx="2">
+              <a:schemeClr val="accent1">
+                <a:shade val="50000"/>
+              </a:schemeClr>
+            </a:lnRef>
+            <a:fillRef idx="1">
+              <a:schemeClr val="accent1"/>
+            </a:fillRef>
+            <a:effectRef idx="0">
+              <a:schemeClr val="accent1"/>
+            </a:effectRef>
+            <a:fontRef idx="minor">
+              <a:schemeClr val="lt1"/>
+            </a:fontRef>
+          </p:style>
+          <p:txBody>
+            <a:bodyPr anchor="ctr"/>
+            <a:lstStyle/>
+            <a:p>
+              <a:pPr algn="ctr">
+                <a:defRPr/>
+              </a:pPr>
+              <a:endParaRPr lang="vi-VN">
+                <a:solidFill>
+                  <a:prstClr val="white"/>
+                </a:solidFill>
+              </a:endParaRPr>
+            </a:p>
+          </p:txBody>
+        </p:sp>
+      </p:grpSp>
+      <p:sp>
+        <p:nvSpPr>
+          <p:cNvPr id="16" name="TextBox 15">
+            <a:hlinkClick r:id="" action="ppaction://noaction"/>
+          </p:cNvPr>
+          <p:cNvSpPr txBox="1"/>
+          <p:nvPr/>
+        </p:nvSpPr>
+        <p:spPr>
+          <a:xfrm>
+            <a:off x="5781745" y="1703035"/>
+            <a:ext cx="2765467" cy="429261"/>
+          </a:xfrm>
+          <a:prstGeom prst="rect">
+            <a:avLst/>
+          </a:prstGeom>
+          <a:solidFill>
+            <a:schemeClr val="bg1"/>
+          </a:solidFill>
+          <a:ln>
+            <a:solidFill>
+              <a:schemeClr val="accent2">
+                <a:lumMod val="50000"/>
+              </a:schemeClr>
+            </a:solidFill>
+          </a:ln>
+        </p:spPr>
+        <p:txBody>
+          <a:bodyPr wrap="square" rtlCol="0">
+            <a:spAutoFit/>
+          </a:bodyPr>
+          <a:lstStyle/>
+          <a:p>
+            <a:r>
+              <a:rPr lang="en-US" sz="1600">
+                <a:solidFill>
+                  <a:schemeClr val="accent2">
+                    <a:lumMod val="50000"/>
+                  </a:schemeClr>
+                </a:solidFill>
+                <a:latin typeface="Arial" panose="020B0604020202020204" pitchFamily="34" charset="0"/>
+                <a:cs typeface="Arial" panose="020B0604020202020204" pitchFamily="34" charset="0"/>
+              </a:rPr>
+              <a:t>Màn hình </a:t>
+            </a:r>
+            <a:r>
+              <a:rPr lang="en-US" sz="1600" smtClean="0">
+                <a:solidFill>
+                  <a:schemeClr val="accent2">
+                    <a:lumMod val="50000"/>
+                  </a:schemeClr>
+                </a:solidFill>
+                <a:latin typeface="Arial" panose="020B0604020202020204" pitchFamily="34" charset="0"/>
+                <a:cs typeface="Arial" panose="020B0604020202020204" pitchFamily="34" charset="0"/>
+              </a:rPr>
+              <a:t>Giao diện </a:t>
+            </a:r>
+            <a:r>
+              <a:rPr lang="en-US" sz="1600" b="1" smtClean="0">
+                <a:solidFill>
+                  <a:schemeClr val="accent2">
+                    <a:lumMod val="50000"/>
+                  </a:schemeClr>
+                </a:solidFill>
+                <a:latin typeface="Arial" panose="020B0604020202020204" pitchFamily="34" charset="0"/>
+                <a:cs typeface="Arial" panose="020B0604020202020204" pitchFamily="34" charset="0"/>
+              </a:rPr>
+              <a:t>(1 )</a:t>
+            </a:r>
+            <a:endParaRPr lang="en-US" sz="1600" b="1" i="1" u="sng">
+              <a:solidFill>
+                <a:schemeClr val="accent2">
+                  <a:lumMod val="50000"/>
+                </a:schemeClr>
+              </a:solidFill>
+            </a:endParaRPr>
+          </a:p>
+        </p:txBody>
+      </p:sp>
+      <p:sp>
+        <p:nvSpPr>
+          <p:cNvPr id="31" name="TextBox 30">
+            <a:hlinkClick r:id="" action="ppaction://noaction"/>
+          </p:cNvPr>
+          <p:cNvSpPr txBox="1"/>
+          <p:nvPr/>
+        </p:nvSpPr>
+        <p:spPr>
+          <a:xfrm>
+            <a:off x="5611780" y="4481689"/>
+            <a:ext cx="2765467" cy="338553"/>
+          </a:xfrm>
+          <a:prstGeom prst="rect">
+            <a:avLst/>
+          </a:prstGeom>
+          <a:solidFill>
+            <a:schemeClr val="bg1"/>
+          </a:solidFill>
+          <a:ln>
+            <a:solidFill>
+              <a:schemeClr val="accent2">
+                <a:lumMod val="50000"/>
+              </a:schemeClr>
+            </a:solidFill>
+          </a:ln>
+        </p:spPr>
+        <p:txBody>
+          <a:bodyPr wrap="square" rtlCol="0">
+            <a:spAutoFit/>
+          </a:bodyPr>
+          <a:lstStyle/>
+          <a:p>
+            <a:r>
+              <a:rPr lang="en-US" sz="1600" smtClean="0">
+                <a:solidFill>
+                  <a:schemeClr val="accent2">
+                    <a:lumMod val="50000"/>
+                  </a:schemeClr>
+                </a:solidFill>
+                <a:latin typeface="Arial" panose="020B0604020202020204" pitchFamily="34" charset="0"/>
+                <a:cs typeface="Arial" panose="020B0604020202020204" pitchFamily="34" charset="0"/>
+              </a:rPr>
+              <a:t>Dịch vụ Giao tiếp </a:t>
+            </a:r>
+            <a:r>
+              <a:rPr lang="en-US" sz="1600" b="1" smtClean="0">
+                <a:solidFill>
+                  <a:schemeClr val="accent2">
+                    <a:lumMod val="50000"/>
+                  </a:schemeClr>
+                </a:solidFill>
+                <a:latin typeface="Arial" panose="020B0604020202020204" pitchFamily="34" charset="0"/>
+                <a:cs typeface="Arial" panose="020B0604020202020204" pitchFamily="34" charset="0"/>
+              </a:rPr>
+              <a:t>(1 )</a:t>
+            </a:r>
+            <a:endParaRPr lang="en-US" sz="1600" b="1" i="1" u="sng">
+              <a:solidFill>
+                <a:schemeClr val="accent2">
+                  <a:lumMod val="50000"/>
+                </a:schemeClr>
+              </a:solidFill>
+            </a:endParaRPr>
+          </a:p>
+        </p:txBody>
+      </p:sp>
+      <p:cxnSp>
+        <p:nvCxnSpPr>
+          <p:cNvPr id="3" name="Straight Arrow Connector 2"/>
+          <p:cNvCxnSpPr/>
+          <p:nvPr/>
+        </p:nvCxnSpPr>
+        <p:spPr>
+          <a:xfrm flipV="1">
+            <a:off x="6448132" y="3312120"/>
+            <a:ext cx="0" cy="1117053"/>
+          </a:xfrm>
+          <a:prstGeom prst="straightConnector1">
+            <a:avLst/>
+          </a:prstGeom>
+          <a:ln w="50800">
+            <a:solidFill>
+              <a:schemeClr val="tx1"/>
+            </a:solidFill>
+            <a:tailEnd type="triangle"/>
+          </a:ln>
+        </p:spPr>
+        <p:style>
+          <a:lnRef idx="1">
+            <a:schemeClr val="accent1"/>
+          </a:lnRef>
+          <a:fillRef idx="0">
+            <a:schemeClr val="accent1"/>
+          </a:fillRef>
+          <a:effectRef idx="0">
+            <a:schemeClr val="accent1"/>
+          </a:effectRef>
+          <a:fontRef idx="minor">
+            <a:schemeClr val="tx1"/>
+          </a:fontRef>
+        </p:style>
+      </p:cxnSp>
+      <p:sp>
+        <p:nvSpPr>
+          <p:cNvPr id="32" name="TextBox 31">
+            <a:hlinkClick r:id="" action="ppaction://noaction"/>
+          </p:cNvPr>
+          <p:cNvSpPr txBox="1"/>
+          <p:nvPr/>
+        </p:nvSpPr>
+        <p:spPr>
+          <a:xfrm>
+            <a:off x="5161897" y="3737888"/>
+            <a:ext cx="1063470" cy="307777"/>
+          </a:xfrm>
+          <a:prstGeom prst="rect">
+            <a:avLst/>
+          </a:prstGeom>
+          <a:solidFill>
+            <a:schemeClr val="bg1"/>
+          </a:solidFill>
+          <a:ln w="41275">
+            <a:solidFill>
+              <a:schemeClr val="tx1"/>
+            </a:solidFill>
+            <a:prstDash val="sysDash"/>
+          </a:ln>
+        </p:spPr>
+        <p:txBody>
+          <a:bodyPr wrap="square" rtlCol="0">
+            <a:spAutoFit/>
+          </a:bodyPr>
+          <a:lstStyle/>
+          <a:p>
+            <a:pPr algn="ctr"/>
+            <a:r>
+              <a:rPr lang="en-US" sz="1400" smtClean="0">
+                <a:latin typeface="Arial" panose="020B0604020202020204" pitchFamily="34" charset="0"/>
+                <a:cs typeface="Arial" panose="020B0604020202020204" pitchFamily="34" charset="0"/>
+              </a:rPr>
+              <a:t>Du_lieu</a:t>
+            </a:r>
+            <a:endParaRPr lang="en-US" sz="1400" smtClean="0">
+              <a:latin typeface="Arial" panose="020B0604020202020204" pitchFamily="34" charset="0"/>
+              <a:cs typeface="Arial" panose="020B0604020202020204" pitchFamily="34" charset="0"/>
+            </a:endParaRPr>
+          </a:p>
+        </p:txBody>
+      </p:sp>
+      <p:sp>
+        <p:nvSpPr>
+          <p:cNvPr id="33" name="TextBox 32">
+            <a:hlinkClick r:id="" action="ppaction://noaction"/>
+          </p:cNvPr>
+          <p:cNvSpPr txBox="1"/>
+          <p:nvPr/>
+        </p:nvSpPr>
+        <p:spPr>
+          <a:xfrm>
+            <a:off x="7115380" y="1011011"/>
+            <a:ext cx="4438510" cy="829945"/>
+          </a:xfrm>
+          <a:prstGeom prst="rect">
+            <a:avLst/>
+          </a:prstGeom>
+          <a:solidFill>
+            <a:schemeClr val="bg1"/>
+          </a:solidFill>
+          <a:ln>
+            <a:solidFill>
+              <a:schemeClr val="accent1"/>
+            </a:solidFill>
+          </a:ln>
+        </p:spPr>
+        <p:txBody>
+          <a:bodyPr wrap="square" rtlCol="0">
+            <a:spAutoFit/>
+          </a:bodyPr>
+          <a:lstStyle/>
+          <a:p>
+            <a:pPr fontAlgn="auto">
+              <a:spcBef>
+                <a:spcPts val="0"/>
+              </a:spcBef>
+              <a:spcAft>
+                <a:spcPts val="0"/>
+              </a:spcAft>
+              <a:defRPr/>
+            </a:pPr>
+            <a:r>
+              <a:rPr lang="en-US" sz="1200" smtClean="0">
+                <a:solidFill>
+                  <a:srgbClr val="FF0000"/>
+                </a:solidFill>
+                <a:latin typeface="Arial" panose="020B0604020202020204" pitchFamily="34" charset="0"/>
+                <a:cs typeface="Arial" panose="020B0604020202020204" pitchFamily="34" charset="0"/>
+                <a:sym typeface="+mn-ea"/>
+              </a:rPr>
+              <a:t>Xem </a:t>
+            </a:r>
+            <a:r>
+              <a:rPr lang="en-US" sz="1200" smtClean="0">
+                <a:solidFill>
+                  <a:srgbClr val="002060"/>
+                </a:solidFill>
+                <a:latin typeface="Arial" panose="020B0604020202020204" pitchFamily="34" charset="0"/>
+                <a:cs typeface="Arial" panose="020B0604020202020204" pitchFamily="34" charset="0"/>
+                <a:sym typeface="+mn-ea"/>
+              </a:rPr>
+              <a:t>  </a:t>
+            </a:r>
+            <a:r>
+              <a:rPr lang="en-US" sz="1200" b="1" smtClean="0">
+                <a:solidFill>
+                  <a:srgbClr val="002060"/>
+                </a:solidFill>
+                <a:latin typeface="Arial" panose="020B0604020202020204" pitchFamily="34" charset="0"/>
+                <a:cs typeface="Arial" panose="020B0604020202020204" pitchFamily="34" charset="0"/>
+                <a:sym typeface="+mn-ea"/>
+              </a:rPr>
+              <a:t>Laptop(</a:t>
+            </a:r>
+            <a:r>
+              <a:rPr lang="en-US" sz="1200" smtClean="0">
+                <a:solidFill>
+                  <a:srgbClr val="002060"/>
+                </a:solidFill>
+                <a:latin typeface="Arial" panose="020B0604020202020204" pitchFamily="34" charset="0"/>
+                <a:cs typeface="Arial" panose="020B0604020202020204" pitchFamily="34" charset="0"/>
+                <a:sym typeface="+mn-ea"/>
+              </a:rPr>
+              <a:t>Tên, Đơn giá Bán, nhóm laptop, </a:t>
+            </a:r>
+            <a:r>
+              <a:rPr lang="en-US" sz="1200" u="sng" smtClean="0">
+                <a:solidFill>
+                  <a:srgbClr val="002060"/>
+                </a:solidFill>
+                <a:latin typeface="Arial" panose="020B0604020202020204" pitchFamily="34" charset="0"/>
+                <a:cs typeface="Arial" panose="020B0604020202020204" pitchFamily="34" charset="0"/>
+                <a:sym typeface="+mn-ea"/>
+              </a:rPr>
+              <a:t>Trạng thái còn hàng</a:t>
+            </a:r>
+            <a:r>
+              <a:rPr lang="en-US" sz="1200" smtClean="0">
+                <a:solidFill>
+                  <a:srgbClr val="002060"/>
+                </a:solidFill>
+                <a:latin typeface="Arial" panose="020B0604020202020204" pitchFamily="34" charset="0"/>
+                <a:cs typeface="Arial" panose="020B0604020202020204" pitchFamily="34" charset="0"/>
+                <a:sym typeface="+mn-ea"/>
+              </a:rPr>
+              <a:t> ,</a:t>
+            </a:r>
+            <a:r>
+              <a:rPr lang="en-US" sz="1200" smtClean="0">
+                <a:solidFill>
+                  <a:srgbClr val="21117F"/>
+                </a:solidFill>
+                <a:latin typeface="Arial" panose="020B0604020202020204" pitchFamily="34" charset="0"/>
+                <a:cs typeface="Arial" panose="020B0604020202020204" pitchFamily="34" charset="0"/>
+                <a:sym typeface="+mn-ea"/>
+              </a:rPr>
+              <a:t> </a:t>
+            </a:r>
+            <a:r>
+              <a:rPr lang="en-US" sz="1200" smtClean="0">
+                <a:solidFill>
+                  <a:srgbClr val="21117F"/>
+                </a:solidFill>
+                <a:latin typeface="Arial" panose="020B0604020202020204" pitchFamily="34" charset="0"/>
+                <a:cs typeface="Arial" panose="020B0604020202020204" pitchFamily="34" charset="0"/>
+                <a:sym typeface="+mn-ea"/>
+              </a:rPr>
+              <a:t>chi tiết kỹ thuật (CPU, Ram, HDD/SSD, Màn hình, Tính năng, màu sắc, Card onboard, Card ngoài, hệ điều hành, Trọng lượng,Bảo hành)</a:t>
+            </a:r>
+            <a:r>
+              <a:rPr lang="en-US" sz="1200" smtClean="0">
+                <a:solidFill>
+                  <a:srgbClr val="002060"/>
+                </a:solidFill>
+                <a:latin typeface="Arial" panose="020B0604020202020204" pitchFamily="34" charset="0"/>
+                <a:cs typeface="Arial" panose="020B0604020202020204" pitchFamily="34" charset="0"/>
+                <a:sym typeface="+mn-ea"/>
+              </a:rPr>
+              <a:t>), </a:t>
+            </a:r>
+            <a:r>
+              <a:rPr lang="en-US" sz="1200" smtClean="0">
+                <a:solidFill>
+                  <a:srgbClr val="FF0000"/>
+                </a:solidFill>
+                <a:latin typeface="Arial" panose="020B0604020202020204" pitchFamily="34" charset="0"/>
+                <a:cs typeface="Arial" panose="020B0604020202020204" pitchFamily="34" charset="0"/>
+                <a:sym typeface="+mn-ea"/>
+              </a:rPr>
+              <a:t>Đặt hàng</a:t>
+            </a:r>
+            <a:endParaRPr lang="en-US" sz="1200" smtClean="0">
+              <a:solidFill>
+                <a:prstClr val="black"/>
+              </a:solidFill>
+              <a:latin typeface="Arial" panose="020B0604020202020204" pitchFamily="34" charset="0"/>
+              <a:cs typeface="Arial" panose="020B0604020202020204" pitchFamily="34" charset="0"/>
+            </a:endParaRPr>
+          </a:p>
+        </p:txBody>
+      </p:sp>
+      <p:sp>
+        <p:nvSpPr>
+          <p:cNvPr id="2" name="TextBox 11">
+            <a:hlinkClick r:id="" action="ppaction://noaction"/>
+          </p:cNvPr>
+          <p:cNvSpPr txBox="1"/>
+          <p:nvPr/>
+        </p:nvSpPr>
+        <p:spPr>
+          <a:xfrm>
+            <a:off x="5270406" y="2303253"/>
+            <a:ext cx="2355453" cy="737234"/>
+          </a:xfrm>
+          <a:prstGeom prst="rect">
+            <a:avLst/>
+          </a:prstGeom>
+          <a:solidFill>
+            <a:schemeClr val="bg1"/>
+          </a:solidFill>
+          <a:ln w="41275">
+            <a:solidFill>
+              <a:srgbClr val="002060"/>
+            </a:solidFill>
+            <a:prstDash val="sysDash"/>
+          </a:ln>
+        </p:spPr>
+        <p:txBody>
+          <a:bodyPr wrap="square" rtlCol="0">
+            <a:spAutoFit/>
+          </a:bodyPr>
+          <a:p>
+            <a:r>
+              <a:rPr lang="en-US" sz="1400" b="1" smtClean="0">
+                <a:solidFill>
+                  <a:srgbClr val="002060"/>
+                </a:solidFill>
+                <a:latin typeface="Arial" panose="020B0604020202020204" pitchFamily="34" charset="0"/>
+                <a:cs typeface="Arial" panose="020B0604020202020204" pitchFamily="34" charset="0"/>
+              </a:rPr>
+              <a:t>Du_lieu</a:t>
+            </a:r>
+            <a:br>
+              <a:rPr lang="en-US" sz="1400" smtClean="0">
+                <a:solidFill>
+                  <a:srgbClr val="002060"/>
+                </a:solidFill>
+                <a:latin typeface="Arial" panose="020B0604020202020204" pitchFamily="34" charset="0"/>
+                <a:cs typeface="Arial" panose="020B0604020202020204" pitchFamily="34" charset="0"/>
+              </a:rPr>
+            </a:br>
+            <a:r>
+              <a:rPr lang="en-US" sz="1400" smtClean="0">
+                <a:solidFill>
+                  <a:srgbClr val="002060"/>
+                </a:solidFill>
+                <a:latin typeface="Arial" panose="020B0604020202020204" pitchFamily="34" charset="0"/>
+                <a:cs typeface="Arial" panose="020B0604020202020204" pitchFamily="34" charset="0"/>
+              </a:rPr>
+              <a:t> Cong_ty</a:t>
+            </a:r>
+            <a:br>
+              <a:rPr lang="en-US" sz="1400" b="1" smtClean="0">
+                <a:solidFill>
+                  <a:srgbClr val="002060"/>
+                </a:solidFill>
+                <a:latin typeface="Arial" panose="020B0604020202020204" pitchFamily="34" charset="0"/>
+                <a:cs typeface="Arial" panose="020B0604020202020204" pitchFamily="34" charset="0"/>
+              </a:rPr>
+            </a:br>
+            <a:r>
+              <a:rPr lang="en-US" sz="1400">
+                <a:solidFill>
+                  <a:srgbClr val="002060"/>
+                </a:solidFill>
+                <a:latin typeface="Arial" panose="020B0604020202020204" pitchFamily="34" charset="0"/>
+                <a:cs typeface="Arial" panose="020B0604020202020204" pitchFamily="34" charset="0"/>
+              </a:rPr>
+              <a:t> </a:t>
+            </a:r>
+            <a:r>
+              <a:rPr lang="en-US" sz="1400" smtClean="0">
+                <a:solidFill>
+                  <a:srgbClr val="002060"/>
+                </a:solidFill>
+                <a:latin typeface="Arial" panose="020B0604020202020204" pitchFamily="34" charset="0"/>
+                <a:cs typeface="Arial" panose="020B0604020202020204" pitchFamily="34" charset="0"/>
+              </a:rPr>
+              <a:t>Danh_sach_Laptop </a:t>
+            </a:r>
+            <a:endParaRPr lang="en-US" sz="1400" b="1" smtClean="0">
+              <a:solidFill>
+                <a:srgbClr val="002060"/>
+              </a:solidFill>
+              <a:latin typeface="Arial" panose="020B0604020202020204" pitchFamily="34" charset="0"/>
+              <a:cs typeface="Arial" panose="020B0604020202020204" pitchFamily="34" charset="0"/>
+            </a:endParaRPr>
+          </a:p>
+        </p:txBody>
+      </p:sp>
+      <p:grpSp>
+        <p:nvGrpSpPr>
+          <p:cNvPr id="4" name="Group 3"/>
+          <p:cNvGrpSpPr/>
+          <p:nvPr/>
+        </p:nvGrpSpPr>
+        <p:grpSpPr>
+          <a:xfrm>
+            <a:off x="53927" y="11245"/>
+            <a:ext cx="4107738" cy="4675604"/>
+            <a:chOff x="620563" y="2333151"/>
+            <a:chExt cx="1767100" cy="4675604"/>
+          </a:xfrm>
+        </p:grpSpPr>
+        <p:sp>
+          <p:nvSpPr>
+            <p:cNvPr id="5" name="TextBox 25"/>
+            <p:cNvSpPr txBox="1"/>
+            <p:nvPr/>
+          </p:nvSpPr>
+          <p:spPr>
+            <a:xfrm>
+              <a:off x="620563" y="2333151"/>
+              <a:ext cx="1767100" cy="337185"/>
+            </a:xfrm>
+            <a:prstGeom prst="rect">
+              <a:avLst/>
+            </a:prstGeom>
+            <a:noFill/>
+            <a:ln>
+              <a:solidFill>
+                <a:schemeClr val="tx1"/>
+              </a:solidFill>
+            </a:ln>
+          </p:spPr>
+          <p:txBody>
+            <a:bodyPr wrap="square" rtlCol="0">
+              <a:spAutoFit/>
+            </a:bodyPr>
+            <a:p>
+              <a:pPr algn="ctr"/>
+              <a:r>
+                <a:rPr lang="en-US" sz="1600" b="1" smtClean="0">
+                  <a:solidFill>
+                    <a:srgbClr val="002060"/>
+                  </a:solidFill>
+                  <a:latin typeface="Arial" panose="020B0604020202020204" pitchFamily="34" charset="0"/>
+                  <a:cs typeface="Arial" panose="020B0604020202020204" pitchFamily="34" charset="0"/>
+                </a:rPr>
+                <a:t>XL_CONG_TY</a:t>
+              </a:r>
+              <a:endParaRPr lang="en-US" sz="1600" b="1">
+                <a:latin typeface="Arial" panose="020B0604020202020204" pitchFamily="34" charset="0"/>
+                <a:cs typeface="Arial" panose="020B0604020202020204" pitchFamily="34" charset="0"/>
+              </a:endParaRPr>
+            </a:p>
+          </p:txBody>
+        </p:sp>
+        <p:sp>
+          <p:nvSpPr>
+            <p:cNvPr id="6" name="TextBox 26"/>
+            <p:cNvSpPr txBox="1"/>
+            <p:nvPr/>
+          </p:nvSpPr>
+          <p:spPr>
+            <a:xfrm>
+              <a:off x="620563" y="2670435"/>
+              <a:ext cx="1767100" cy="4338320"/>
+            </a:xfrm>
+            <a:prstGeom prst="rect">
+              <a:avLst/>
+            </a:prstGeom>
+            <a:noFill/>
+            <a:ln>
+              <a:solidFill>
+                <a:schemeClr val="tx1"/>
+              </a:solidFill>
+            </a:ln>
+          </p:spPr>
+          <p:txBody>
+            <a:bodyPr wrap="square" rtlCol="0">
+              <a:spAutoFit/>
+            </a:bodyPr>
+            <a:p>
+              <a:r>
+                <a:rPr lang="en-US" sz="1200" smtClean="0">
+                  <a:latin typeface="Arial" panose="020B0604020202020204" pitchFamily="34" charset="0"/>
+                  <a:cs typeface="Arial" panose="020B0604020202020204" pitchFamily="34" charset="0"/>
+                </a:rPr>
+                <a:t>Ma_so,Ten</a:t>
+              </a:r>
+              <a:endParaRPr lang="en-US" sz="1200" smtClean="0">
+                <a:latin typeface="Arial" panose="020B0604020202020204" pitchFamily="34" charset="0"/>
+                <a:cs typeface="Arial" panose="020B0604020202020204" pitchFamily="34" charset="0"/>
+              </a:endParaRPr>
+            </a:p>
+            <a:p>
+              <a:r>
+                <a:rPr lang="en-US" sz="1200" smtClean="0">
+                  <a:latin typeface="Arial" panose="020B0604020202020204" pitchFamily="34" charset="0"/>
+                  <a:cs typeface="Arial" panose="020B0604020202020204" pitchFamily="34" charset="0"/>
+                </a:rPr>
+                <a:t>     Danh_sach_Nhom_Lap_top:</a:t>
+              </a:r>
+              <a:endParaRPr lang="en-US" sz="1200" smtClean="0">
+                <a:latin typeface="Arial" panose="020B0604020202020204" pitchFamily="34" charset="0"/>
+                <a:cs typeface="Arial" panose="020B0604020202020204" pitchFamily="34" charset="0"/>
+              </a:endParaRPr>
+            </a:p>
+            <a:p>
+              <a:r>
+                <a:rPr lang="en-US" sz="1200" smtClean="0">
+                  <a:latin typeface="Arial" panose="020B0604020202020204" pitchFamily="34" charset="0"/>
+                  <a:cs typeface="Arial" panose="020B0604020202020204" pitchFamily="34" charset="0"/>
+                </a:rPr>
+                <a:t>       * Nhom_Lap_top:Ma_so,Ten</a:t>
+              </a:r>
+              <a:endParaRPr lang="en-US" sz="1200" smtClean="0">
+                <a:latin typeface="Arial" panose="020B0604020202020204" pitchFamily="34" charset="0"/>
+                <a:cs typeface="Arial" panose="020B0604020202020204" pitchFamily="34" charset="0"/>
+              </a:endParaRPr>
+            </a:p>
+            <a:p>
+              <a:r>
+                <a:rPr lang="en-US" sz="1200" smtClean="0">
+                  <a:latin typeface="Arial" panose="020B0604020202020204" pitchFamily="34" charset="0"/>
+                  <a:cs typeface="Arial" panose="020B0604020202020204" pitchFamily="34" charset="0"/>
+                </a:rPr>
+                <a:t>     Danh_sach_Mau_sac:</a:t>
+              </a:r>
+              <a:endParaRPr lang="en-US" sz="1200" smtClean="0">
+                <a:latin typeface="Arial" panose="020B0604020202020204" pitchFamily="34" charset="0"/>
+                <a:cs typeface="Arial" panose="020B0604020202020204" pitchFamily="34" charset="0"/>
+              </a:endParaRPr>
+            </a:p>
+            <a:p>
+              <a:r>
+                <a:rPr lang="en-US" sz="1200" smtClean="0">
+                  <a:latin typeface="Arial" panose="020B0604020202020204" pitchFamily="34" charset="0"/>
+                  <a:cs typeface="Arial" panose="020B0604020202020204" pitchFamily="34" charset="0"/>
+                </a:rPr>
+                <a:t>       * Mau_sac:Ma_so,Ten</a:t>
+              </a:r>
+              <a:endParaRPr lang="en-US" sz="1200" smtClean="0">
+                <a:latin typeface="Arial" panose="020B0604020202020204" pitchFamily="34" charset="0"/>
+                <a:cs typeface="Arial" panose="020B0604020202020204" pitchFamily="34" charset="0"/>
+              </a:endParaRPr>
+            </a:p>
+            <a:p>
+              <a:r>
+                <a:rPr lang="en-US" sz="1200" smtClean="0">
+                  <a:latin typeface="Arial" panose="020B0604020202020204" pitchFamily="34" charset="0"/>
+                  <a:cs typeface="Arial" panose="020B0604020202020204" pitchFamily="34" charset="0"/>
+                </a:rPr>
+                <a:t>     Danh_sach_Tinh_nang:</a:t>
+              </a:r>
+              <a:endParaRPr lang="en-US" sz="1200" smtClean="0">
+                <a:latin typeface="Arial" panose="020B0604020202020204" pitchFamily="34" charset="0"/>
+                <a:cs typeface="Arial" panose="020B0604020202020204" pitchFamily="34" charset="0"/>
+              </a:endParaRPr>
+            </a:p>
+            <a:p>
+              <a:r>
+                <a:rPr lang="en-US" sz="1200" smtClean="0">
+                  <a:latin typeface="Arial" panose="020B0604020202020204" pitchFamily="34" charset="0"/>
+                  <a:cs typeface="Arial" panose="020B0604020202020204" pitchFamily="34" charset="0"/>
+                </a:rPr>
+                <a:t>       * Tinh_nang:Ma_so,Ten</a:t>
+              </a:r>
+              <a:endParaRPr lang="en-US" sz="1200" smtClean="0">
+                <a:latin typeface="Arial" panose="020B0604020202020204" pitchFamily="34" charset="0"/>
+                <a:cs typeface="Arial" panose="020B0604020202020204" pitchFamily="34" charset="0"/>
+              </a:endParaRPr>
+            </a:p>
+            <a:p>
+              <a:r>
+                <a:rPr lang="en-US" sz="1200" smtClean="0">
+                  <a:latin typeface="Arial" panose="020B0604020202020204" pitchFamily="34" charset="0"/>
+                  <a:cs typeface="Arial" panose="020B0604020202020204" pitchFamily="34" charset="0"/>
+                </a:rPr>
+                <a:t>     Danh_sach_CPU_Series:</a:t>
+              </a:r>
+              <a:endParaRPr lang="en-US" sz="1200" smtClean="0">
+                <a:latin typeface="Arial" panose="020B0604020202020204" pitchFamily="34" charset="0"/>
+                <a:cs typeface="Arial" panose="020B0604020202020204" pitchFamily="34" charset="0"/>
+              </a:endParaRPr>
+            </a:p>
+            <a:p>
+              <a:r>
+                <a:rPr lang="en-US" sz="1200" smtClean="0">
+                  <a:latin typeface="Arial" panose="020B0604020202020204" pitchFamily="34" charset="0"/>
+                  <a:cs typeface="Arial" panose="020B0604020202020204" pitchFamily="34" charset="0"/>
+                </a:rPr>
+                <a:t>       * CPU_Series:Ma_so,Ten</a:t>
+              </a:r>
+              <a:endParaRPr lang="en-US" sz="1200" smtClean="0">
+                <a:latin typeface="Arial" panose="020B0604020202020204" pitchFamily="34" charset="0"/>
+                <a:cs typeface="Arial" panose="020B0604020202020204" pitchFamily="34" charset="0"/>
+              </a:endParaRPr>
+            </a:p>
+            <a:p>
+              <a:r>
+                <a:rPr lang="en-US" sz="1200" smtClean="0">
+                  <a:latin typeface="Arial" panose="020B0604020202020204" pitchFamily="34" charset="0"/>
+                  <a:cs typeface="Arial" panose="020B0604020202020204" pitchFamily="34" charset="0"/>
+                </a:rPr>
+                <a:t>     Danh_sach_Card_Man_hinh_Ngoai:</a:t>
+              </a:r>
+              <a:endParaRPr lang="en-US" sz="1200" smtClean="0">
+                <a:latin typeface="Arial" panose="020B0604020202020204" pitchFamily="34" charset="0"/>
+                <a:cs typeface="Arial" panose="020B0604020202020204" pitchFamily="34" charset="0"/>
+              </a:endParaRPr>
+            </a:p>
+            <a:p>
+              <a:r>
+                <a:rPr lang="en-US" sz="1200" smtClean="0">
+                  <a:latin typeface="Arial" panose="020B0604020202020204" pitchFamily="34" charset="0"/>
+                  <a:cs typeface="Arial" panose="020B0604020202020204" pitchFamily="34" charset="0"/>
+                </a:rPr>
+                <a:t>       * Card_Man_hinh_Ngoai:Ma_so,Ten</a:t>
+              </a:r>
+              <a:endParaRPr lang="en-US" sz="1200" smtClean="0">
+                <a:latin typeface="Arial" panose="020B0604020202020204" pitchFamily="34" charset="0"/>
+                <a:cs typeface="Arial" panose="020B0604020202020204" pitchFamily="34" charset="0"/>
+              </a:endParaRPr>
+            </a:p>
+            <a:p>
+              <a:r>
+                <a:rPr lang="en-US" sz="1200" smtClean="0">
+                  <a:latin typeface="Arial" panose="020B0604020202020204" pitchFamily="34" charset="0"/>
+                  <a:cs typeface="Arial" panose="020B0604020202020204" pitchFamily="34" charset="0"/>
+                </a:rPr>
+                <a:t>     Danh_sach_Chuan_Man_hinh:</a:t>
+              </a:r>
+              <a:endParaRPr lang="en-US" sz="1200" smtClean="0">
+                <a:latin typeface="Arial" panose="020B0604020202020204" pitchFamily="34" charset="0"/>
+                <a:cs typeface="Arial" panose="020B0604020202020204" pitchFamily="34" charset="0"/>
+              </a:endParaRPr>
+            </a:p>
+            <a:p>
+              <a:r>
+                <a:rPr lang="en-US" sz="1200" smtClean="0">
+                  <a:latin typeface="Arial" panose="020B0604020202020204" pitchFamily="34" charset="0"/>
+                  <a:cs typeface="Arial" panose="020B0604020202020204" pitchFamily="34" charset="0"/>
+                </a:rPr>
+                <a:t>       * Chuan_Man_hinh:Ma_so,Ten</a:t>
+              </a:r>
+              <a:endParaRPr lang="en-US" sz="1200" smtClean="0">
+                <a:latin typeface="Arial" panose="020B0604020202020204" pitchFamily="34" charset="0"/>
+                <a:cs typeface="Arial" panose="020B0604020202020204" pitchFamily="34" charset="0"/>
+              </a:endParaRPr>
+            </a:p>
+            <a:p>
+              <a:r>
+                <a:rPr lang="en-US" sz="1200" smtClean="0">
+                  <a:latin typeface="Arial" panose="020B0604020202020204" pitchFamily="34" charset="0"/>
+                  <a:cs typeface="Arial" panose="020B0604020202020204" pitchFamily="34" charset="0"/>
+                </a:rPr>
+                <a:t>     Danh_sach_Kich_thuoc_Man_hinh:</a:t>
+              </a:r>
+              <a:endParaRPr lang="en-US" sz="1200" smtClean="0">
+                <a:latin typeface="Arial" panose="020B0604020202020204" pitchFamily="34" charset="0"/>
+                <a:cs typeface="Arial" panose="020B0604020202020204" pitchFamily="34" charset="0"/>
+              </a:endParaRPr>
+            </a:p>
+            <a:p>
+              <a:r>
+                <a:rPr lang="en-US" sz="1200" smtClean="0">
+                  <a:latin typeface="Arial" panose="020B0604020202020204" pitchFamily="34" charset="0"/>
+                  <a:cs typeface="Arial" panose="020B0604020202020204" pitchFamily="34" charset="0"/>
+                </a:rPr>
+                <a:t>       * Kich_thuoc_Man_hinh:Ma_so,Ten</a:t>
+              </a:r>
+              <a:endParaRPr lang="en-US" sz="1200" smtClean="0">
+                <a:latin typeface="Arial" panose="020B0604020202020204" pitchFamily="34" charset="0"/>
+                <a:cs typeface="Arial" panose="020B0604020202020204" pitchFamily="34" charset="0"/>
+              </a:endParaRPr>
+            </a:p>
+            <a:p>
+              <a:r>
+                <a:rPr lang="en-US" sz="1200" smtClean="0">
+                  <a:latin typeface="Arial" panose="020B0604020202020204" pitchFamily="34" charset="0"/>
+                  <a:cs typeface="Arial" panose="020B0604020202020204" pitchFamily="34" charset="0"/>
+                </a:rPr>
+                <a:t>     Danh_sach_Dung_luong_Ram:</a:t>
+              </a:r>
+              <a:endParaRPr lang="en-US" sz="1200" smtClean="0">
+                <a:latin typeface="Arial" panose="020B0604020202020204" pitchFamily="34" charset="0"/>
+                <a:cs typeface="Arial" panose="020B0604020202020204" pitchFamily="34" charset="0"/>
+              </a:endParaRPr>
+            </a:p>
+            <a:p>
+              <a:r>
+                <a:rPr lang="en-US" sz="1200" smtClean="0">
+                  <a:latin typeface="Arial" panose="020B0604020202020204" pitchFamily="34" charset="0"/>
+                  <a:cs typeface="Arial" panose="020B0604020202020204" pitchFamily="34" charset="0"/>
+                </a:rPr>
+                <a:t>       * Dung_luong_Ram:Ma_so,Ten</a:t>
+              </a:r>
+              <a:endParaRPr lang="en-US" sz="1200" smtClean="0">
+                <a:latin typeface="Arial" panose="020B0604020202020204" pitchFamily="34" charset="0"/>
+                <a:cs typeface="Arial" panose="020B0604020202020204" pitchFamily="34" charset="0"/>
+              </a:endParaRPr>
+            </a:p>
+            <a:p>
+              <a:r>
+                <a:rPr lang="en-US" sz="1200" smtClean="0">
+                  <a:latin typeface="Arial" panose="020B0604020202020204" pitchFamily="34" charset="0"/>
+                  <a:cs typeface="Arial" panose="020B0604020202020204" pitchFamily="34" charset="0"/>
+                </a:rPr>
+                <a:t>     Danh_sach_HDD:</a:t>
+              </a:r>
+              <a:endParaRPr lang="en-US" sz="1200" smtClean="0">
+                <a:latin typeface="Arial" panose="020B0604020202020204" pitchFamily="34" charset="0"/>
+                <a:cs typeface="Arial" panose="020B0604020202020204" pitchFamily="34" charset="0"/>
+              </a:endParaRPr>
+            </a:p>
+            <a:p>
+              <a:r>
+                <a:rPr lang="en-US" sz="1200" smtClean="0">
+                  <a:latin typeface="Arial" panose="020B0604020202020204" pitchFamily="34" charset="0"/>
+                  <a:cs typeface="Arial" panose="020B0604020202020204" pitchFamily="34" charset="0"/>
+                </a:rPr>
+                <a:t>       * HDD:Ma_so,Ten</a:t>
+              </a:r>
+              <a:endParaRPr lang="en-US" sz="1200" smtClean="0">
+                <a:latin typeface="Arial" panose="020B0604020202020204" pitchFamily="34" charset="0"/>
+                <a:cs typeface="Arial" panose="020B0604020202020204" pitchFamily="34" charset="0"/>
+              </a:endParaRPr>
+            </a:p>
+            <a:p>
+              <a:r>
+                <a:rPr lang="en-US" sz="1200" smtClean="0">
+                  <a:latin typeface="Arial" panose="020B0604020202020204" pitchFamily="34" charset="0"/>
+                  <a:cs typeface="Arial" panose="020B0604020202020204" pitchFamily="34" charset="0"/>
+                </a:rPr>
+                <a:t>     Danh_sach_SDD:</a:t>
+              </a:r>
+              <a:endParaRPr lang="en-US" sz="1200" smtClean="0">
+                <a:latin typeface="Arial" panose="020B0604020202020204" pitchFamily="34" charset="0"/>
+                <a:cs typeface="Arial" panose="020B0604020202020204" pitchFamily="34" charset="0"/>
+              </a:endParaRPr>
+            </a:p>
+            <a:p>
+              <a:r>
+                <a:rPr lang="en-US" sz="1200" smtClean="0">
+                  <a:latin typeface="Arial" panose="020B0604020202020204" pitchFamily="34" charset="0"/>
+                  <a:cs typeface="Arial" panose="020B0604020202020204" pitchFamily="34" charset="0"/>
+                </a:rPr>
+                <a:t>       * SSD:Ma_so,Ten</a:t>
+              </a:r>
+              <a:endParaRPr lang="en-US" sz="1200" smtClean="0">
+                <a:latin typeface="Arial" panose="020B0604020202020204" pitchFamily="34" charset="0"/>
+                <a:cs typeface="Arial" panose="020B0604020202020204" pitchFamily="34" charset="0"/>
+              </a:endParaRPr>
+            </a:p>
+            <a:p>
+              <a:r>
+                <a:rPr lang="en-US" sz="1200" smtClean="0">
+                  <a:latin typeface="Arial" panose="020B0604020202020204" pitchFamily="34" charset="0"/>
+                  <a:cs typeface="Arial" panose="020B0604020202020204" pitchFamily="34" charset="0"/>
+                </a:rPr>
+                <a:t>     Danh_sach_Cua_hang:</a:t>
+              </a:r>
+              <a:endParaRPr lang="en-US" sz="1200" smtClean="0">
+                <a:latin typeface="Arial" panose="020B0604020202020204" pitchFamily="34" charset="0"/>
+                <a:cs typeface="Arial" panose="020B0604020202020204" pitchFamily="34" charset="0"/>
+              </a:endParaRPr>
+            </a:p>
+            <a:p>
+              <a:r>
+                <a:rPr lang="en-US" sz="1200" smtClean="0">
+                  <a:latin typeface="Arial" panose="020B0604020202020204" pitchFamily="34" charset="0"/>
+                  <a:cs typeface="Arial" panose="020B0604020202020204" pitchFamily="34" charset="0"/>
+                </a:rPr>
+                <a:t>       * Cua_hang:Ma_so,Ten, Dia_chi, So_dien_thoai</a:t>
+              </a:r>
+              <a:endParaRPr lang="en-US" sz="1200" smtClean="0">
+                <a:latin typeface="Arial" panose="020B0604020202020204" pitchFamily="34" charset="0"/>
+                <a:cs typeface="Arial" panose="020B0604020202020204" pitchFamily="34" charset="0"/>
+              </a:endParaRPr>
+            </a:p>
+          </p:txBody>
+        </p:sp>
+      </p:grpSp>
+      <p:grpSp>
+        <p:nvGrpSpPr>
+          <p:cNvPr id="7" name="Group 6"/>
+          <p:cNvGrpSpPr/>
+          <p:nvPr/>
+        </p:nvGrpSpPr>
+        <p:grpSpPr>
+          <a:xfrm>
+            <a:off x="96923" y="4686942"/>
+            <a:ext cx="5173080" cy="2830294"/>
+            <a:chOff x="903567" y="2937671"/>
+            <a:chExt cx="1767100" cy="2830294"/>
+          </a:xfrm>
+        </p:grpSpPr>
+        <p:sp>
+          <p:nvSpPr>
+            <p:cNvPr id="8" name="TextBox 28"/>
+            <p:cNvSpPr txBox="1"/>
+            <p:nvPr/>
+          </p:nvSpPr>
+          <p:spPr>
+            <a:xfrm>
+              <a:off x="903567" y="2937671"/>
+              <a:ext cx="1767100" cy="337185"/>
+            </a:xfrm>
+            <a:prstGeom prst="rect">
+              <a:avLst/>
+            </a:prstGeom>
+            <a:noFill/>
+            <a:ln>
+              <a:solidFill>
+                <a:schemeClr val="tx1"/>
+              </a:solidFill>
+            </a:ln>
+          </p:spPr>
+          <p:txBody>
+            <a:bodyPr wrap="square" rtlCol="0">
+              <a:spAutoFit/>
+            </a:bodyPr>
+            <a:p>
+              <a:pPr algn="ctr"/>
+              <a:r>
+                <a:rPr lang="en-US" sz="1600" b="1" smtClean="0">
+                  <a:solidFill>
+                    <a:srgbClr val="002060"/>
+                  </a:solidFill>
+                  <a:latin typeface="Arial" panose="020B0604020202020204" pitchFamily="34" charset="0"/>
+                  <a:cs typeface="Arial" panose="020B0604020202020204" pitchFamily="34" charset="0"/>
+                </a:rPr>
+                <a:t>XL_LAPTOP </a:t>
+              </a:r>
+              <a:endParaRPr lang="en-US" sz="1600" b="1">
+                <a:latin typeface="Arial" panose="020B0604020202020204" pitchFamily="34" charset="0"/>
+                <a:cs typeface="Arial" panose="020B0604020202020204" pitchFamily="34" charset="0"/>
+              </a:endParaRPr>
+            </a:p>
+          </p:txBody>
+        </p:sp>
+        <p:sp>
+          <p:nvSpPr>
+            <p:cNvPr id="9" name="TextBox 29"/>
+            <p:cNvSpPr txBox="1"/>
+            <p:nvPr/>
+          </p:nvSpPr>
+          <p:spPr>
+            <a:xfrm>
+              <a:off x="903567" y="3276225"/>
+              <a:ext cx="1767100" cy="2491740"/>
+            </a:xfrm>
+            <a:prstGeom prst="rect">
+              <a:avLst/>
+            </a:prstGeom>
+            <a:noFill/>
+            <a:ln>
+              <a:solidFill>
+                <a:schemeClr val="tx1"/>
+              </a:solidFill>
+            </a:ln>
+          </p:spPr>
+          <p:txBody>
+            <a:bodyPr wrap="square" rtlCol="0">
+              <a:spAutoFit/>
+            </a:bodyPr>
+            <a:p>
+              <a:r>
+                <a:rPr lang="en-US" sz="1200" u="sng">
+                  <a:latin typeface="Arial" panose="020B0604020202020204" pitchFamily="34" charset="0"/>
+                  <a:cs typeface="Arial" panose="020B0604020202020204" pitchFamily="34" charset="0"/>
+                  <a:sym typeface="+mn-ea"/>
+                </a:rPr>
+                <a:t>Số lượng Tồn </a:t>
+              </a:r>
+              <a:endParaRPr lang="en-US" sz="1200">
+                <a:latin typeface="Arial" panose="020B0604020202020204" pitchFamily="34" charset="0"/>
+                <a:cs typeface="Arial" panose="020B0604020202020204" pitchFamily="34" charset="0"/>
+              </a:endParaRPr>
+            </a:p>
+            <a:p>
+              <a:r>
+                <a:rPr lang="en-US" sz="1200">
+                  <a:latin typeface="Arial" panose="020B0604020202020204" pitchFamily="34" charset="0"/>
+                  <a:cs typeface="Arial" panose="020B0604020202020204" pitchFamily="34" charset="0"/>
+                </a:rPr>
+                <a:t>Ma_so,Ten,Don_gia_Ban,,Don_gia_Nhap,CPU,Loai_Ram,Card_Man_hinh_Onboard,He_dieu_hanh,Trong_luong,Bao_hanh</a:t>
+              </a:r>
+              <a:endParaRPr lang="en-US" sz="1200">
+                <a:latin typeface="Arial" panose="020B0604020202020204" pitchFamily="34" charset="0"/>
+                <a:cs typeface="Arial" panose="020B0604020202020204" pitchFamily="34" charset="0"/>
+              </a:endParaRPr>
+            </a:p>
+            <a:p>
+              <a:r>
+                <a:rPr lang="en-US" sz="1200">
+                  <a:latin typeface="Arial" panose="020B0604020202020204" pitchFamily="34" charset="0"/>
+                  <a:cs typeface="Arial" panose="020B0604020202020204" pitchFamily="34" charset="0"/>
+                </a:rPr>
+                <a:t>          Nhom_Lap_top:Ma_so,Ten</a:t>
+              </a:r>
+              <a:endParaRPr lang="en-US" sz="1200">
+                <a:latin typeface="Arial" panose="020B0604020202020204" pitchFamily="34" charset="0"/>
+                <a:cs typeface="Arial" panose="020B0604020202020204" pitchFamily="34" charset="0"/>
+              </a:endParaRPr>
+            </a:p>
+            <a:p>
+              <a:r>
+                <a:rPr lang="en-US" sz="1200">
+                  <a:latin typeface="Arial" panose="020B0604020202020204" pitchFamily="34" charset="0"/>
+                  <a:cs typeface="Arial" panose="020B0604020202020204" pitchFamily="34" charset="0"/>
+                </a:rPr>
+                <a:t>          Tinh_nang:Ma_so,Ten</a:t>
+              </a:r>
+              <a:endParaRPr lang="en-US" sz="1200">
+                <a:latin typeface="Arial" panose="020B0604020202020204" pitchFamily="34" charset="0"/>
+                <a:cs typeface="Arial" panose="020B0604020202020204" pitchFamily="34" charset="0"/>
+              </a:endParaRPr>
+            </a:p>
+            <a:p>
+              <a:r>
+                <a:rPr lang="en-US" sz="1200">
+                  <a:latin typeface="Arial" panose="020B0604020202020204" pitchFamily="34" charset="0"/>
+                  <a:cs typeface="Arial" panose="020B0604020202020204" pitchFamily="34" charset="0"/>
+                </a:rPr>
+                <a:t>          CPU_Series:Ma_so,Ten</a:t>
+              </a:r>
+              <a:endParaRPr lang="en-US" sz="1200">
+                <a:latin typeface="Arial" panose="020B0604020202020204" pitchFamily="34" charset="0"/>
+                <a:cs typeface="Arial" panose="020B0604020202020204" pitchFamily="34" charset="0"/>
+              </a:endParaRPr>
+            </a:p>
+            <a:p>
+              <a:r>
+                <a:rPr lang="en-US" sz="1200">
+                  <a:latin typeface="Arial" panose="020B0604020202020204" pitchFamily="34" charset="0"/>
+                  <a:cs typeface="Arial" panose="020B0604020202020204" pitchFamily="34" charset="0"/>
+                </a:rPr>
+                <a:t>          Chuan_Man_hinh:Ma_so,Ten</a:t>
+              </a:r>
+              <a:endParaRPr lang="en-US" sz="1200">
+                <a:latin typeface="Arial" panose="020B0604020202020204" pitchFamily="34" charset="0"/>
+                <a:cs typeface="Arial" panose="020B0604020202020204" pitchFamily="34" charset="0"/>
+              </a:endParaRPr>
+            </a:p>
+            <a:p>
+              <a:r>
+                <a:rPr lang="en-US" sz="1200">
+                  <a:latin typeface="Arial" panose="020B0604020202020204" pitchFamily="34" charset="0"/>
+                  <a:cs typeface="Arial" panose="020B0604020202020204" pitchFamily="34" charset="0"/>
+                </a:rPr>
+                <a:t>          Mau_sac:Ma_so,Ten</a:t>
+              </a:r>
+              <a:endParaRPr lang="en-US" sz="1200">
+                <a:latin typeface="Arial" panose="020B0604020202020204" pitchFamily="34" charset="0"/>
+                <a:cs typeface="Arial" panose="020B0604020202020204" pitchFamily="34" charset="0"/>
+              </a:endParaRPr>
+            </a:p>
+            <a:p>
+              <a:r>
+                <a:rPr lang="en-US" sz="1200">
+                  <a:latin typeface="Arial" panose="020B0604020202020204" pitchFamily="34" charset="0"/>
+                  <a:cs typeface="Arial" panose="020B0604020202020204" pitchFamily="34" charset="0"/>
+                </a:rPr>
+                <a:t>          Kich_thuoc_Man_hinh:Ma_so,Ten</a:t>
+              </a:r>
+              <a:endParaRPr lang="en-US" sz="1200">
+                <a:latin typeface="Arial" panose="020B0604020202020204" pitchFamily="34" charset="0"/>
+                <a:cs typeface="Arial" panose="020B0604020202020204" pitchFamily="34" charset="0"/>
+              </a:endParaRPr>
+            </a:p>
+            <a:p>
+              <a:r>
+                <a:rPr lang="en-US" sz="1200">
+                  <a:latin typeface="Arial" panose="020B0604020202020204" pitchFamily="34" charset="0"/>
+                  <a:cs typeface="Arial" panose="020B0604020202020204" pitchFamily="34" charset="0"/>
+                </a:rPr>
+                <a:t>          Dung_luong_Ram:Ma_so,Ten</a:t>
+              </a:r>
+              <a:endParaRPr lang="en-US" sz="1200">
+                <a:latin typeface="Arial" panose="020B0604020202020204" pitchFamily="34" charset="0"/>
+                <a:cs typeface="Arial" panose="020B0604020202020204" pitchFamily="34" charset="0"/>
+              </a:endParaRPr>
+            </a:p>
+            <a:p>
+              <a:r>
+                <a:rPr lang="en-US" sz="1200">
+                  <a:latin typeface="Arial" panose="020B0604020202020204" pitchFamily="34" charset="0"/>
+                  <a:cs typeface="Arial" panose="020B0604020202020204" pitchFamily="34" charset="0"/>
+                </a:rPr>
+                <a:t>          Card_Man_hinh_Ngoai:Ma_so,Ten</a:t>
+              </a:r>
+              <a:endParaRPr lang="en-US" sz="1200">
+                <a:latin typeface="Arial" panose="020B0604020202020204" pitchFamily="34" charset="0"/>
+                <a:cs typeface="Arial" panose="020B0604020202020204" pitchFamily="34" charset="0"/>
+              </a:endParaRPr>
+            </a:p>
+            <a:p>
+              <a:r>
+                <a:rPr lang="en-US" sz="1200">
+                  <a:latin typeface="Arial" panose="020B0604020202020204" pitchFamily="34" charset="0"/>
+                  <a:cs typeface="Arial" panose="020B0604020202020204" pitchFamily="34" charset="0"/>
+                </a:rPr>
+                <a:t>          HDD:Ma_so,Ten</a:t>
+              </a:r>
+              <a:endParaRPr lang="en-US" sz="1200">
+                <a:latin typeface="Arial" panose="020B0604020202020204" pitchFamily="34" charset="0"/>
+                <a:cs typeface="Arial" panose="020B0604020202020204" pitchFamily="34" charset="0"/>
+              </a:endParaRPr>
+            </a:p>
+            <a:p>
+              <a:r>
+                <a:rPr lang="en-US" sz="1200">
+                  <a:latin typeface="Arial" panose="020B0604020202020204" pitchFamily="34" charset="0"/>
+                  <a:cs typeface="Arial" panose="020B0604020202020204" pitchFamily="34" charset="0"/>
+                </a:rPr>
+                <a:t>          SSD:Ma_so,Ten</a:t>
+              </a:r>
+              <a:endParaRPr lang="en-US" sz="1200">
+                <a:latin typeface="Arial" panose="020B0604020202020204" pitchFamily="34" charset="0"/>
+                <a:cs typeface="Arial" panose="020B0604020202020204" pitchFamily="34" charset="0"/>
+              </a:endParaRPr>
+            </a:p>
+          </p:txBody>
+        </p:sp>
+      </p:grpSp>
+      <p:sp>
+        <p:nvSpPr>
+          <p:cNvPr id="34" name="Text Box 33"/>
+          <p:cNvSpPr txBox="1"/>
+          <p:nvPr/>
+        </p:nvSpPr>
+        <p:spPr>
+          <a:xfrm>
+            <a:off x="4826000" y="3106420"/>
+            <a:ext cx="2540000" cy="645160"/>
+          </a:xfrm>
+          <a:prstGeom prst="rect">
+            <a:avLst/>
+          </a:prstGeom>
+          <a:noFill/>
+        </p:spPr>
+        <p:txBody>
+          <a:bodyPr wrap="square" rtlCol="0" anchor="t">
+            <a:spAutoFit/>
+          </a:bodyPr>
+          <a:p>
+            <a:r>
+              <a:rPr lang="en-US"/>
+              <a:t>Queens Of The Stone Age - In My Head</a:t>
+            </a:r>
+            <a:endParaRPr lang="en-US"/>
+          </a:p>
+        </p:txBody>
+      </p:sp>
+    </p:spTree>
+  </p:cSld>
+  <p:clrMapOvr>
+    <a:masterClrMapping/>
+  </p:clrMapOvr>
+  <p:timing>
+    <p:tnLst>
+      <p:par>
+        <p:cTn id="1" dur="indefinite" restart="never" nodeType="tmRoot"/>
+      </p:par>
+    </p:tnLst>
+  </p:timing>
+</p:sld>
+</file>
+
+<file path=ppt/slides/slide4.xml><?xml version="1.0" encoding="utf-8"?>
+<p:sld xmlns:a="http://schemas.openxmlformats.org/drawingml/2006/main" xmlns:r="http://schemas.openxmlformats.org/officeDocument/2006/relationships" xmlns:p="http://schemas.openxmlformats.org/presentationml/2006/main">
+  <p:cSld>
+    <p:spTree>
+      <p:nvGrpSpPr>
+        <p:cNvPr id="1" name=""/>
+        <p:cNvGrpSpPr/>
+        <p:nvPr/>
+      </p:nvGrpSpPr>
+      <p:grpSpPr>
+        <a:xfrm>
+          <a:off x="0" y="0"/>
+          <a:ext cx="0" cy="0"/>
+          <a:chOff x="0" y="0"/>
+          <a:chExt cx="0" cy="0"/>
+        </a:xfrm>
+      </p:grpSpPr>
+      <p:sp>
+        <p:nvSpPr>
+          <p:cNvPr id="69" name="Rounded Rectangle 68">
+            <a:hlinkClick r:id="rId1" action="ppaction://hlinksldjump"/>
+          </p:cNvPr>
+          <p:cNvSpPr/>
+          <p:nvPr/>
+        </p:nvSpPr>
+        <p:spPr>
+          <a:xfrm>
+            <a:off x="5479061" y="190982"/>
+            <a:ext cx="6074929" cy="754401"/>
+          </a:xfrm>
+          <a:prstGeom prst="roundRect">
+            <a:avLst/>
+          </a:prstGeom>
+          <a:solidFill>
+            <a:srgbClr val="002060"/>
+          </a:solidFill>
+          <a:ln w="38100" cap="rnd">
+            <a:solidFill>
+              <a:schemeClr val="bg1"/>
+            </a:solidFill>
+          </a:ln>
+          <a:effectLst>
+            <a:outerShdw blurRad="482600" dir="5400000" sx="89000" sy="89000" algn="ctr" rotWithShape="0">
+              <a:srgbClr val="000000">
+                <a:alpha val="49000"/>
+              </a:srgbClr>
+            </a:outerShdw>
+          </a:effectLst>
+          <a:scene3d>
+            <a:camera prst="orthographicFront"/>
+            <a:lightRig rig="twoPt" dir="t"/>
+          </a:scene3d>
+          <a:sp3d extrusionH="12700" prstMaterial="translucentPowder">
+            <a:bevelB w="165100" prst="coolSlant"/>
+          </a:sp3d>
+        </p:spPr>
+        <p:style>
+          <a:lnRef idx="2">
+            <a:schemeClr val="accent1">
+              <a:shade val="50000"/>
+            </a:schemeClr>
+          </a:lnRef>
+          <a:fillRef idx="1">
+            <a:schemeClr val="accent1"/>
+          </a:fillRef>
+          <a:effectRef idx="0">
+            <a:schemeClr val="accent1"/>
+          </a:effectRef>
+          <a:fontRef idx="minor">
+            <a:schemeClr val="lt1"/>
+          </a:fontRef>
+        </p:style>
+        <p:txBody>
+          <a:bodyPr rtlCol="0" anchor="ctr"/>
+          <a:lstStyle/>
+          <a:p>
+            <a:pPr algn="ctr"/>
+            <a:r>
+              <a:rPr lang="en-US" sz="1600" b="1" smtClean="0">
+                <a:solidFill>
+                  <a:srgbClr val="FFFF00"/>
+                </a:solidFill>
+                <a:latin typeface="Arial" panose="020B0604020202020204" pitchFamily="34" charset="0"/>
+                <a:cs typeface="Arial" panose="020B0604020202020204" pitchFamily="34" charset="0"/>
+                <a:sym typeface="+mn-ea"/>
+              </a:rPr>
+              <a:t>Công ty Laptop Phong Vũ</a:t>
+            </a:r>
+            <a:r>
+              <a:rPr lang="en-US" sz="1600" b="1" smtClean="0">
+                <a:solidFill>
+                  <a:prstClr val="white"/>
+                </a:solidFill>
+                <a:latin typeface="Arial" panose="020B0604020202020204" pitchFamily="34" charset="0"/>
+                <a:cs typeface="Arial" panose="020B0604020202020204" pitchFamily="34" charset="0"/>
+                <a:sym typeface="+mn-ea"/>
+              </a:rPr>
+              <a:t> </a:t>
+            </a:r>
+            <a:r>
+              <a:rPr lang="en-US" sz="1600" smtClean="0">
+                <a:solidFill>
+                  <a:prstClr val="white"/>
+                </a:solidFill>
+                <a:latin typeface="Arial" panose="020B0604020202020204" pitchFamily="34" charset="0"/>
+                <a:cs typeface="Arial" panose="020B0604020202020204" pitchFamily="34" charset="0"/>
+                <a:sym typeface="+mn-ea"/>
+              </a:rPr>
+              <a:t>( Mã số : </a:t>
+            </a:r>
+            <a:r>
+              <a:rPr lang="en-US" sz="1600" smtClean="0">
+                <a:solidFill>
+                  <a:schemeClr val="bg1"/>
+                </a:solidFill>
+                <a:latin typeface="Arial" panose="020B0604020202020204" pitchFamily="34" charset="0"/>
+                <a:cs typeface="Arial" panose="020B0604020202020204" pitchFamily="34" charset="0"/>
+                <a:sym typeface="+mn-ea"/>
+              </a:rPr>
+              <a:t>Laptop_Phong_Vu</a:t>
+            </a:r>
+            <a:r>
+              <a:rPr lang="en-US" sz="1600" smtClean="0">
+                <a:solidFill>
+                  <a:prstClr val="white"/>
+                </a:solidFill>
+                <a:latin typeface="Arial" panose="020B0604020202020204" pitchFamily="34" charset="0"/>
+                <a:cs typeface="Arial" panose="020B0604020202020204" pitchFamily="34" charset="0"/>
+                <a:sym typeface="+mn-ea"/>
+              </a:rPr>
+              <a:t>)</a:t>
+            </a:r>
+            <a:endParaRPr lang="en-US" sz="1600" smtClean="0">
+              <a:solidFill>
+                <a:prstClr val="white"/>
+              </a:solidFill>
+              <a:latin typeface="Arial" panose="020B0604020202020204" pitchFamily="34" charset="0"/>
+              <a:cs typeface="Arial" panose="020B0604020202020204" pitchFamily="34" charset="0"/>
+            </a:endParaRPr>
+          </a:p>
+          <a:p>
+            <a:pPr algn="ctr"/>
+            <a:r>
+              <a:rPr lang="en-US" sz="1600" b="1" smtClean="0">
+                <a:solidFill>
+                  <a:srgbClr val="FFFF00"/>
+                </a:solidFill>
+                <a:latin typeface="Arial" panose="020B0604020202020204" pitchFamily="34" charset="0"/>
+                <a:cs typeface="Arial" panose="020B0604020202020204" pitchFamily="34" charset="0"/>
+              </a:rPr>
+              <a:t>Mô hình đối tượng xử lý của Nhân viên Nhập hàng </a:t>
+            </a:r>
+            <a:endParaRPr lang="vi-VN" sz="1600">
+              <a:solidFill>
+                <a:srgbClr val="FFFF00"/>
+              </a:solidFill>
+              <a:latin typeface="Arial" panose="020B0604020202020204" pitchFamily="34" charset="0"/>
+              <a:cs typeface="Arial" panose="020B0604020202020204" pitchFamily="34" charset="0"/>
+            </a:endParaRPr>
+          </a:p>
+        </p:txBody>
+      </p:sp>
+      <p:sp>
+        <p:nvSpPr>
+          <p:cNvPr id="10" name="Cube 9">
+            <a:hlinkClick r:id="" action="ppaction://noaction"/>
+          </p:cNvPr>
+          <p:cNvSpPr/>
+          <p:nvPr/>
+        </p:nvSpPr>
+        <p:spPr>
+          <a:xfrm>
+            <a:off x="5161897" y="2009249"/>
+            <a:ext cx="4665340" cy="1292616"/>
+          </a:xfrm>
+          <a:prstGeom prst="cube">
+            <a:avLst>
+              <a:gd name="adj" fmla="val 15836"/>
+            </a:avLst>
+          </a:prstGeom>
+          <a:solidFill>
+            <a:schemeClr val="bg1"/>
+          </a:solidFill>
+          <a:ln w="6350">
+            <a:prstDash val="sysDash"/>
+          </a:ln>
+        </p:spPr>
+        <p:style>
+          <a:lnRef idx="2">
+            <a:schemeClr val="accent1">
+              <a:shade val="50000"/>
+            </a:schemeClr>
+          </a:lnRef>
+          <a:fillRef idx="1">
+            <a:schemeClr val="accent1"/>
+          </a:fillRef>
+          <a:effectRef idx="0">
+            <a:schemeClr val="accent1"/>
+          </a:effectRef>
+          <a:fontRef idx="minor">
+            <a:schemeClr val="lt1"/>
+          </a:fontRef>
+        </p:style>
+        <p:txBody>
+          <a:bodyPr rtlCol="0" anchor="ctr"/>
+          <a:lstStyle/>
+          <a:p>
+            <a:pPr algn="ctr"/>
+            <a:endParaRPr lang="vi-VN" sz="3200" b="1">
+              <a:solidFill>
+                <a:prstClr val="white"/>
+              </a:solidFill>
+            </a:endParaRPr>
+          </a:p>
+        </p:txBody>
+      </p:sp>
+      <p:sp>
+        <p:nvSpPr>
+          <p:cNvPr id="11" name="Oval 10"/>
+          <p:cNvSpPr/>
+          <p:nvPr/>
+        </p:nvSpPr>
+        <p:spPr>
+          <a:xfrm>
+            <a:off x="7749054" y="2318725"/>
+            <a:ext cx="1763271" cy="680610"/>
+          </a:xfrm>
+          <a:prstGeom prst="ellipse">
+            <a:avLst/>
+          </a:prstGeom>
+          <a:solidFill>
+            <a:schemeClr val="bg1"/>
+          </a:solidFill>
+        </p:spPr>
+        <p:style>
+          <a:lnRef idx="2">
+            <a:schemeClr val="accent1">
+              <a:shade val="50000"/>
+            </a:schemeClr>
+          </a:lnRef>
+          <a:fillRef idx="1">
+            <a:schemeClr val="accent1"/>
+          </a:fillRef>
+          <a:effectRef idx="0">
+            <a:schemeClr val="accent1"/>
+          </a:effectRef>
+          <a:fontRef idx="minor">
+            <a:schemeClr val="lt1"/>
+          </a:fontRef>
+        </p:style>
+        <p:txBody>
+          <a:bodyPr rtlCol="0" anchor="ctr"/>
+          <a:lstStyle/>
+          <a:p>
+            <a:pPr algn="ctr"/>
+            <a:endParaRPr lang="en-US" sz="1600" smtClean="0">
+              <a:solidFill>
+                <a:srgbClr val="FF0000"/>
+              </a:solidFill>
+              <a:latin typeface="Arial" panose="020B0604020202020204" pitchFamily="34" charset="0"/>
+              <a:cs typeface="Arial" panose="020B0604020202020204" pitchFamily="34" charset="0"/>
+            </a:endParaRPr>
+          </a:p>
+          <a:p>
+            <a:pPr algn="ctr"/>
+            <a:r>
+              <a:rPr lang="en-US" sz="1600" smtClean="0">
+                <a:solidFill>
+                  <a:srgbClr val="FF0000"/>
+                </a:solidFill>
+                <a:latin typeface="Arial" panose="020B0604020202020204" pitchFamily="34" charset="0"/>
+                <a:cs typeface="Arial" panose="020B0604020202020204" pitchFamily="34" charset="0"/>
+              </a:rPr>
+              <a:t>Lệnh </a:t>
+            </a:r>
+            <a:r>
+              <a:rPr lang="en-US" sz="1600" b="1" smtClean="0">
+                <a:solidFill>
+                  <a:srgbClr val="FF0000"/>
+                </a:solidFill>
+                <a:latin typeface="Arial" panose="020B0604020202020204" pitchFamily="34" charset="0"/>
+                <a:cs typeface="Arial" panose="020B0604020202020204" pitchFamily="34" charset="0"/>
+              </a:rPr>
+              <a:t>(3B)</a:t>
+            </a:r>
+            <a:br>
+              <a:rPr lang="en-US" sz="1600" b="1" smtClean="0">
+                <a:solidFill>
+                  <a:srgbClr val="FF0000"/>
+                </a:solidFill>
+                <a:latin typeface="Arial" panose="020B0604020202020204" pitchFamily="34" charset="0"/>
+                <a:cs typeface="Arial" panose="020B0604020202020204" pitchFamily="34" charset="0"/>
+              </a:rPr>
+            </a:br>
+            <a:r>
+              <a:rPr lang="en-US" sz="1600" b="1" i="1" u="sng" smtClean="0">
+                <a:solidFill>
+                  <a:srgbClr val="FF0000"/>
+                </a:solidFill>
+                <a:latin typeface="Arial" panose="020B0604020202020204" pitchFamily="34" charset="0"/>
+                <a:cs typeface="Arial" panose="020B0604020202020204" pitchFamily="34" charset="0"/>
+              </a:rPr>
+              <a:t> </a:t>
+            </a:r>
+            <a:endParaRPr lang="en-US" sz="1600" b="1">
+              <a:solidFill>
+                <a:srgbClr val="FF0000"/>
+              </a:solidFill>
+              <a:latin typeface="Arial" panose="020B0604020202020204" pitchFamily="34" charset="0"/>
+              <a:cs typeface="Arial" panose="020B0604020202020204" pitchFamily="34" charset="0"/>
+            </a:endParaRPr>
+          </a:p>
+        </p:txBody>
+      </p:sp>
+      <p:grpSp>
+        <p:nvGrpSpPr>
+          <p:cNvPr id="15" name="Group 93"/>
+          <p:cNvGrpSpPr/>
+          <p:nvPr/>
+        </p:nvGrpSpPr>
+        <p:grpSpPr bwMode="auto">
+          <a:xfrm>
+            <a:off x="6275101" y="1190568"/>
+            <a:ext cx="630966" cy="632252"/>
+            <a:chOff x="4628879" y="642920"/>
+            <a:chExt cx="676276" cy="928696"/>
+          </a:xfrm>
+          <a:solidFill>
+            <a:srgbClr val="0070C0"/>
+          </a:solidFill>
+        </p:grpSpPr>
+        <p:sp>
+          <p:nvSpPr>
+            <p:cNvPr id="17" name="Oval 16"/>
+            <p:cNvSpPr/>
+            <p:nvPr/>
+          </p:nvSpPr>
+          <p:spPr>
+            <a:xfrm>
+              <a:off x="4703494" y="642920"/>
+              <a:ext cx="450850" cy="214315"/>
+            </a:xfrm>
+            <a:prstGeom prst="ellipse">
+              <a:avLst/>
+            </a:prstGeom>
+            <a:solidFill>
+              <a:schemeClr val="bg1"/>
+            </a:solidFill>
+            <a:ln w="31750" cmpd="sng">
+              <a:solidFill>
+                <a:schemeClr val="accent2"/>
+              </a:solidFill>
+            </a:ln>
+          </p:spPr>
+          <p:style>
+            <a:lnRef idx="2">
+              <a:schemeClr val="accent1">
+                <a:shade val="50000"/>
+              </a:schemeClr>
+            </a:lnRef>
+            <a:fillRef idx="1">
+              <a:schemeClr val="accent1"/>
+            </a:fillRef>
+            <a:effectRef idx="0">
+              <a:schemeClr val="accent1"/>
+            </a:effectRef>
+            <a:fontRef idx="minor">
+              <a:schemeClr val="lt1"/>
+            </a:fontRef>
+          </p:style>
+          <p:txBody>
+            <a:bodyPr anchor="ctr"/>
+            <a:lstStyle/>
+            <a:p>
+              <a:pPr algn="ctr">
+                <a:defRPr/>
+              </a:pPr>
+              <a:endParaRPr lang="vi-VN">
+                <a:solidFill>
+                  <a:prstClr val="white"/>
+                </a:solidFill>
+              </a:endParaRPr>
+            </a:p>
+          </p:txBody>
+        </p:sp>
+        <p:cxnSp>
+          <p:nvCxnSpPr>
+            <p:cNvPr id="18" name="Straight Arrow Connector 17"/>
+            <p:cNvCxnSpPr>
+              <a:stCxn id="17" idx="4"/>
+            </p:cNvCxnSpPr>
+            <p:nvPr/>
+          </p:nvCxnSpPr>
+          <p:spPr>
+            <a:xfrm rot="5400000">
+              <a:off x="4679679" y="1108062"/>
+              <a:ext cx="500067" cy="1588"/>
+            </a:xfrm>
+            <a:prstGeom prst="straightConnector1">
+              <a:avLst/>
+            </a:prstGeom>
+            <a:grpFill/>
+            <a:ln w="31750" cmpd="sng">
+              <a:solidFill>
+                <a:schemeClr val="accent2"/>
+              </a:solidFill>
+              <a:tailEnd type="none"/>
+            </a:ln>
+          </p:spPr>
+          <p:style>
+            <a:lnRef idx="1">
+              <a:schemeClr val="accent1"/>
+            </a:lnRef>
+            <a:fillRef idx="0">
+              <a:schemeClr val="accent1"/>
+            </a:fillRef>
+            <a:effectRef idx="0">
+              <a:schemeClr val="accent1"/>
+            </a:effectRef>
+            <a:fontRef idx="minor">
+              <a:schemeClr val="tx1"/>
+            </a:fontRef>
+          </p:style>
+        </p:cxnSp>
+        <p:cxnSp>
+          <p:nvCxnSpPr>
+            <p:cNvPr id="19" name="Straight Arrow Connector 18"/>
+            <p:cNvCxnSpPr/>
+            <p:nvPr/>
+          </p:nvCxnSpPr>
+          <p:spPr>
+            <a:xfrm rot="10800000" flipV="1">
+              <a:off x="4628879" y="1000111"/>
+              <a:ext cx="300037" cy="214314"/>
+            </a:xfrm>
+            <a:prstGeom prst="straightConnector1">
+              <a:avLst/>
+            </a:prstGeom>
+            <a:grpFill/>
+            <a:ln w="31750" cmpd="sng">
+              <a:solidFill>
+                <a:schemeClr val="accent2"/>
+              </a:solidFill>
+              <a:tailEnd type="none"/>
+            </a:ln>
+          </p:spPr>
+          <p:style>
+            <a:lnRef idx="1">
+              <a:schemeClr val="accent1"/>
+            </a:lnRef>
+            <a:fillRef idx="0">
+              <a:schemeClr val="accent1"/>
+            </a:fillRef>
+            <a:effectRef idx="0">
+              <a:schemeClr val="accent1"/>
+            </a:effectRef>
+            <a:fontRef idx="minor">
+              <a:schemeClr val="tx1"/>
+            </a:fontRef>
+          </p:style>
+        </p:cxnSp>
+        <p:cxnSp>
+          <p:nvCxnSpPr>
+            <p:cNvPr id="20" name="Straight Arrow Connector 19"/>
+            <p:cNvCxnSpPr/>
+            <p:nvPr/>
+          </p:nvCxnSpPr>
+          <p:spPr>
+            <a:xfrm rot="16200000" flipH="1">
+              <a:off x="4934471" y="1351746"/>
+              <a:ext cx="214315" cy="225426"/>
+            </a:xfrm>
+            <a:prstGeom prst="straightConnector1">
+              <a:avLst/>
+            </a:prstGeom>
+            <a:grpFill/>
+            <a:ln w="31750" cmpd="sng">
+              <a:solidFill>
+                <a:schemeClr val="accent2"/>
+              </a:solidFill>
+              <a:tailEnd type="none"/>
+            </a:ln>
+          </p:spPr>
+          <p:style>
+            <a:lnRef idx="1">
+              <a:schemeClr val="accent1"/>
+            </a:lnRef>
+            <a:fillRef idx="0">
+              <a:schemeClr val="accent1"/>
+            </a:fillRef>
+            <a:effectRef idx="0">
+              <a:schemeClr val="accent1"/>
+            </a:effectRef>
+            <a:fontRef idx="minor">
+              <a:schemeClr val="tx1"/>
+            </a:fontRef>
+          </p:style>
+        </p:cxnSp>
+        <p:cxnSp>
+          <p:nvCxnSpPr>
+            <p:cNvPr id="21" name="Straight Arrow Connector 20"/>
+            <p:cNvCxnSpPr/>
+            <p:nvPr/>
+          </p:nvCxnSpPr>
+          <p:spPr>
+            <a:xfrm rot="5400000">
+              <a:off x="4747145" y="1389846"/>
+              <a:ext cx="214315" cy="149225"/>
+            </a:xfrm>
+            <a:prstGeom prst="straightConnector1">
+              <a:avLst/>
+            </a:prstGeom>
+            <a:grpFill/>
+            <a:ln w="31750" cmpd="sng">
+              <a:solidFill>
+                <a:schemeClr val="accent2"/>
+              </a:solidFill>
+              <a:tailEnd type="none"/>
+            </a:ln>
+          </p:spPr>
+          <p:style>
+            <a:lnRef idx="1">
+              <a:schemeClr val="accent1"/>
+            </a:lnRef>
+            <a:fillRef idx="0">
+              <a:schemeClr val="accent1"/>
+            </a:fillRef>
+            <a:effectRef idx="0">
+              <a:schemeClr val="accent1"/>
+            </a:effectRef>
+            <a:fontRef idx="minor">
+              <a:schemeClr val="tx1"/>
+            </a:fontRef>
+          </p:style>
+        </p:cxnSp>
+        <p:cxnSp>
+          <p:nvCxnSpPr>
+            <p:cNvPr id="22" name="Straight Arrow Connector 21"/>
+            <p:cNvCxnSpPr/>
+            <p:nvPr/>
+          </p:nvCxnSpPr>
+          <p:spPr>
+            <a:xfrm flipV="1">
+              <a:off x="4928917" y="1071547"/>
+              <a:ext cx="376238" cy="71439"/>
+            </a:xfrm>
+            <a:prstGeom prst="straightConnector1">
+              <a:avLst/>
+            </a:prstGeom>
+            <a:grpFill/>
+            <a:ln w="31750" cmpd="sng">
+              <a:solidFill>
+                <a:schemeClr val="accent2"/>
+              </a:solidFill>
+              <a:tailEnd type="none"/>
+            </a:ln>
+          </p:spPr>
+          <p:style>
+            <a:lnRef idx="1">
+              <a:schemeClr val="accent1"/>
+            </a:lnRef>
+            <a:fillRef idx="0">
+              <a:schemeClr val="accent1"/>
+            </a:fillRef>
+            <a:effectRef idx="0">
+              <a:schemeClr val="accent1"/>
+            </a:effectRef>
+            <a:fontRef idx="minor">
+              <a:schemeClr val="tx1"/>
+            </a:fontRef>
+          </p:style>
+        </p:cxnSp>
+        <p:sp>
+          <p:nvSpPr>
+            <p:cNvPr id="23" name="Oval 22"/>
+            <p:cNvSpPr/>
+            <p:nvPr/>
+          </p:nvSpPr>
+          <p:spPr>
+            <a:xfrm>
+              <a:off x="4779699" y="714355"/>
+              <a:ext cx="74614" cy="71437"/>
+            </a:xfrm>
+            <a:prstGeom prst="ellipse">
+              <a:avLst/>
+            </a:prstGeom>
+            <a:grpFill/>
+            <a:ln w="31750" cmpd="sng">
+              <a:solidFill>
+                <a:schemeClr val="bg1"/>
+              </a:solidFill>
+            </a:ln>
+          </p:spPr>
+          <p:style>
+            <a:lnRef idx="2">
+              <a:schemeClr val="accent1">
+                <a:shade val="50000"/>
+              </a:schemeClr>
+            </a:lnRef>
+            <a:fillRef idx="1">
+              <a:schemeClr val="accent1"/>
+            </a:fillRef>
+            <a:effectRef idx="0">
+              <a:schemeClr val="accent1"/>
+            </a:effectRef>
+            <a:fontRef idx="minor">
+              <a:schemeClr val="lt1"/>
+            </a:fontRef>
+          </p:style>
+          <p:txBody>
+            <a:bodyPr anchor="ctr"/>
+            <a:lstStyle/>
+            <a:p>
+              <a:pPr algn="ctr">
+                <a:defRPr/>
+              </a:pPr>
+              <a:endParaRPr lang="vi-VN">
+                <a:solidFill>
+                  <a:prstClr val="white"/>
+                </a:solidFill>
+              </a:endParaRPr>
+            </a:p>
+          </p:txBody>
+        </p:sp>
+        <p:sp>
+          <p:nvSpPr>
+            <p:cNvPr id="24" name="Oval 23"/>
+            <p:cNvSpPr/>
+            <p:nvPr/>
+          </p:nvSpPr>
+          <p:spPr>
+            <a:xfrm>
+              <a:off x="5005149" y="714358"/>
+              <a:ext cx="74614" cy="71437"/>
+            </a:xfrm>
+            <a:prstGeom prst="ellipse">
+              <a:avLst/>
+            </a:prstGeom>
+            <a:grpFill/>
+            <a:ln w="31750" cmpd="sng">
+              <a:solidFill>
+                <a:schemeClr val="bg1"/>
+              </a:solidFill>
+            </a:ln>
+          </p:spPr>
+          <p:style>
+            <a:lnRef idx="2">
+              <a:schemeClr val="accent1">
+                <a:shade val="50000"/>
+              </a:schemeClr>
+            </a:lnRef>
+            <a:fillRef idx="1">
+              <a:schemeClr val="accent1"/>
+            </a:fillRef>
+            <a:effectRef idx="0">
+              <a:schemeClr val="accent1"/>
+            </a:effectRef>
+            <a:fontRef idx="minor">
+              <a:schemeClr val="lt1"/>
+            </a:fontRef>
+          </p:style>
+          <p:txBody>
+            <a:bodyPr anchor="ctr"/>
+            <a:lstStyle/>
+            <a:p>
+              <a:pPr algn="ctr">
+                <a:defRPr/>
+              </a:pPr>
+              <a:endParaRPr lang="vi-VN">
+                <a:solidFill>
+                  <a:prstClr val="white"/>
+                </a:solidFill>
+              </a:endParaRPr>
+            </a:p>
+          </p:txBody>
+        </p:sp>
+      </p:grpSp>
+      <p:sp>
+        <p:nvSpPr>
+          <p:cNvPr id="16" name="TextBox 15">
+            <a:hlinkClick r:id="" action="ppaction://noaction"/>
+          </p:cNvPr>
+          <p:cNvSpPr txBox="1"/>
+          <p:nvPr/>
+        </p:nvSpPr>
+        <p:spPr>
+          <a:xfrm>
+            <a:off x="5781745" y="1703035"/>
+            <a:ext cx="2765467" cy="429261"/>
+          </a:xfrm>
+          <a:prstGeom prst="rect">
+            <a:avLst/>
+          </a:prstGeom>
+          <a:solidFill>
+            <a:schemeClr val="bg1"/>
+          </a:solidFill>
+          <a:ln>
+            <a:solidFill>
+              <a:schemeClr val="accent2">
+                <a:lumMod val="50000"/>
+              </a:schemeClr>
+            </a:solidFill>
+          </a:ln>
+        </p:spPr>
+        <p:txBody>
+          <a:bodyPr wrap="square" rtlCol="0">
+            <a:spAutoFit/>
+          </a:bodyPr>
+          <a:lstStyle/>
+          <a:p>
+            <a:r>
+              <a:rPr lang="en-US" sz="1600">
+                <a:solidFill>
+                  <a:schemeClr val="accent2">
+                    <a:lumMod val="50000"/>
+                  </a:schemeClr>
+                </a:solidFill>
+                <a:latin typeface="Arial" panose="020B0604020202020204" pitchFamily="34" charset="0"/>
+                <a:cs typeface="Arial" panose="020B0604020202020204" pitchFamily="34" charset="0"/>
+              </a:rPr>
+              <a:t>Màn hình </a:t>
+            </a:r>
+            <a:r>
+              <a:rPr lang="en-US" sz="1600" smtClean="0">
+                <a:solidFill>
+                  <a:schemeClr val="accent2">
+                    <a:lumMod val="50000"/>
+                  </a:schemeClr>
+                </a:solidFill>
+                <a:latin typeface="Arial" panose="020B0604020202020204" pitchFamily="34" charset="0"/>
+                <a:cs typeface="Arial" panose="020B0604020202020204" pitchFamily="34" charset="0"/>
+              </a:rPr>
+              <a:t>Giao diện </a:t>
+            </a:r>
+            <a:r>
+              <a:rPr lang="en-US" sz="1600" b="1" smtClean="0">
+                <a:solidFill>
+                  <a:schemeClr val="accent2">
+                    <a:lumMod val="50000"/>
+                  </a:schemeClr>
+                </a:solidFill>
+                <a:latin typeface="Arial" panose="020B0604020202020204" pitchFamily="34" charset="0"/>
+                <a:cs typeface="Arial" panose="020B0604020202020204" pitchFamily="34" charset="0"/>
+              </a:rPr>
+              <a:t>(1 )</a:t>
+            </a:r>
+            <a:endParaRPr lang="en-US" sz="1600" b="1" i="1" u="sng">
+              <a:solidFill>
+                <a:schemeClr val="accent2">
+                  <a:lumMod val="50000"/>
+                </a:schemeClr>
+              </a:solidFill>
+            </a:endParaRPr>
+          </a:p>
+        </p:txBody>
+      </p:sp>
+      <p:sp>
+        <p:nvSpPr>
+          <p:cNvPr id="31" name="TextBox 30">
+            <a:hlinkClick r:id="" action="ppaction://noaction"/>
+          </p:cNvPr>
+          <p:cNvSpPr txBox="1"/>
+          <p:nvPr/>
+        </p:nvSpPr>
+        <p:spPr>
+          <a:xfrm>
+            <a:off x="5611780" y="4481689"/>
+            <a:ext cx="2765467" cy="338553"/>
+          </a:xfrm>
+          <a:prstGeom prst="rect">
+            <a:avLst/>
+          </a:prstGeom>
+          <a:solidFill>
+            <a:schemeClr val="bg1"/>
+          </a:solidFill>
+          <a:ln>
+            <a:solidFill>
+              <a:schemeClr val="accent2">
+                <a:lumMod val="50000"/>
+              </a:schemeClr>
+            </a:solidFill>
+          </a:ln>
+        </p:spPr>
+        <p:txBody>
+          <a:bodyPr wrap="square" rtlCol="0">
+            <a:spAutoFit/>
+          </a:bodyPr>
+          <a:lstStyle/>
+          <a:p>
+            <a:r>
+              <a:rPr lang="en-US" sz="1600" smtClean="0">
+                <a:solidFill>
+                  <a:schemeClr val="accent2">
+                    <a:lumMod val="50000"/>
+                  </a:schemeClr>
+                </a:solidFill>
+                <a:latin typeface="Arial" panose="020B0604020202020204" pitchFamily="34" charset="0"/>
+                <a:cs typeface="Arial" panose="020B0604020202020204" pitchFamily="34" charset="0"/>
+              </a:rPr>
+              <a:t>Dịch vụ Giao tiếp </a:t>
+            </a:r>
+            <a:r>
+              <a:rPr lang="en-US" sz="1600" b="1" smtClean="0">
+                <a:solidFill>
+                  <a:schemeClr val="accent2">
+                    <a:lumMod val="50000"/>
+                  </a:schemeClr>
+                </a:solidFill>
+                <a:latin typeface="Arial" panose="020B0604020202020204" pitchFamily="34" charset="0"/>
+                <a:cs typeface="Arial" panose="020B0604020202020204" pitchFamily="34" charset="0"/>
+              </a:rPr>
+              <a:t>(1 )</a:t>
+            </a:r>
+            <a:endParaRPr lang="en-US" sz="1600" b="1" i="1" u="sng">
+              <a:solidFill>
+                <a:schemeClr val="accent2">
+                  <a:lumMod val="50000"/>
+                </a:schemeClr>
+              </a:solidFill>
+            </a:endParaRPr>
+          </a:p>
+        </p:txBody>
+      </p:sp>
+      <p:cxnSp>
+        <p:nvCxnSpPr>
+          <p:cNvPr id="3" name="Straight Arrow Connector 2"/>
+          <p:cNvCxnSpPr/>
+          <p:nvPr/>
+        </p:nvCxnSpPr>
+        <p:spPr>
+          <a:xfrm flipV="1">
+            <a:off x="6448132" y="3312120"/>
+            <a:ext cx="0" cy="1117053"/>
+          </a:xfrm>
+          <a:prstGeom prst="straightConnector1">
+            <a:avLst/>
+          </a:prstGeom>
+          <a:ln w="50800">
+            <a:solidFill>
+              <a:schemeClr val="tx1"/>
+            </a:solidFill>
+            <a:tailEnd type="triangle"/>
+          </a:ln>
+        </p:spPr>
+        <p:style>
+          <a:lnRef idx="1">
+            <a:schemeClr val="accent1"/>
+          </a:lnRef>
+          <a:fillRef idx="0">
+            <a:schemeClr val="accent1"/>
+          </a:fillRef>
+          <a:effectRef idx="0">
+            <a:schemeClr val="accent1"/>
+          </a:effectRef>
+          <a:fontRef idx="minor">
+            <a:schemeClr val="tx1"/>
+          </a:fontRef>
+        </p:style>
+      </p:cxnSp>
+      <p:sp>
+        <p:nvSpPr>
+          <p:cNvPr id="32" name="TextBox 31">
+            <a:hlinkClick r:id="" action="ppaction://noaction"/>
+          </p:cNvPr>
+          <p:cNvSpPr txBox="1"/>
+          <p:nvPr/>
+        </p:nvSpPr>
+        <p:spPr>
+          <a:xfrm>
+            <a:off x="5161897" y="3737888"/>
+            <a:ext cx="1063470" cy="307777"/>
+          </a:xfrm>
+          <a:prstGeom prst="rect">
+            <a:avLst/>
+          </a:prstGeom>
+          <a:solidFill>
+            <a:schemeClr val="bg1"/>
+          </a:solidFill>
+          <a:ln w="41275">
+            <a:solidFill>
+              <a:schemeClr val="tx1"/>
+            </a:solidFill>
+            <a:prstDash val="sysDash"/>
+          </a:ln>
+        </p:spPr>
+        <p:txBody>
+          <a:bodyPr wrap="square" rtlCol="0">
+            <a:spAutoFit/>
+          </a:bodyPr>
+          <a:lstStyle/>
+          <a:p>
+            <a:pPr algn="ctr"/>
+            <a:r>
+              <a:rPr lang="en-US" sz="1400" smtClean="0">
+                <a:latin typeface="Arial" panose="020B0604020202020204" pitchFamily="34" charset="0"/>
+                <a:cs typeface="Arial" panose="020B0604020202020204" pitchFamily="34" charset="0"/>
+              </a:rPr>
+              <a:t>Du_lieu</a:t>
+            </a:r>
+            <a:endParaRPr lang="en-US" sz="1400" smtClean="0">
+              <a:latin typeface="Arial" panose="020B0604020202020204" pitchFamily="34" charset="0"/>
+              <a:cs typeface="Arial" panose="020B0604020202020204" pitchFamily="34" charset="0"/>
+            </a:endParaRPr>
+          </a:p>
+        </p:txBody>
+      </p:sp>
+      <p:sp>
+        <p:nvSpPr>
+          <p:cNvPr id="33" name="TextBox 32">
+            <a:hlinkClick r:id="" action="ppaction://noaction"/>
+          </p:cNvPr>
+          <p:cNvSpPr txBox="1"/>
+          <p:nvPr/>
+        </p:nvSpPr>
+        <p:spPr>
+          <a:xfrm>
+            <a:off x="7115380" y="1011011"/>
+            <a:ext cx="4438510" cy="829945"/>
+          </a:xfrm>
+          <a:prstGeom prst="rect">
+            <a:avLst/>
+          </a:prstGeom>
+          <a:solidFill>
+            <a:schemeClr val="bg1"/>
+          </a:solidFill>
+          <a:ln>
+            <a:solidFill>
+              <a:schemeClr val="accent1"/>
+            </a:solidFill>
+          </a:ln>
+        </p:spPr>
+        <p:txBody>
+          <a:bodyPr wrap="square" rtlCol="0">
+            <a:spAutoFit/>
+          </a:bodyPr>
+          <a:lstStyle/>
+          <a:p>
+            <a:pPr fontAlgn="auto">
+              <a:spcBef>
+                <a:spcPts val="0"/>
+              </a:spcBef>
+              <a:spcAft>
+                <a:spcPts val="0"/>
+              </a:spcAft>
+              <a:defRPr/>
+            </a:pPr>
+            <a:r>
+              <a:rPr lang="en-US" sz="1200" smtClean="0">
+                <a:solidFill>
+                  <a:srgbClr val="FF0000"/>
+                </a:solidFill>
+                <a:latin typeface="Arial" panose="020B0604020202020204" pitchFamily="34" charset="0"/>
+                <a:cs typeface="Arial" panose="020B0604020202020204" pitchFamily="34" charset="0"/>
+                <a:sym typeface="+mn-ea"/>
+              </a:rPr>
+              <a:t>Xem </a:t>
+            </a:r>
+            <a:r>
+              <a:rPr lang="en-US" sz="1200" smtClean="0">
+                <a:solidFill>
+                  <a:srgbClr val="002060"/>
+                </a:solidFill>
+                <a:latin typeface="Arial" panose="020B0604020202020204" pitchFamily="34" charset="0"/>
+                <a:cs typeface="Arial" panose="020B0604020202020204" pitchFamily="34" charset="0"/>
+                <a:sym typeface="+mn-ea"/>
+              </a:rPr>
+              <a:t>  </a:t>
+            </a:r>
+            <a:r>
+              <a:rPr lang="en-US" sz="1200" b="1" smtClean="0">
+                <a:solidFill>
+                  <a:srgbClr val="002060"/>
+                </a:solidFill>
+                <a:latin typeface="Arial" panose="020B0604020202020204" pitchFamily="34" charset="0"/>
+                <a:cs typeface="Arial" panose="020B0604020202020204" pitchFamily="34" charset="0"/>
+                <a:sym typeface="+mn-ea"/>
+              </a:rPr>
+              <a:t>Laptop(</a:t>
+            </a:r>
+            <a:r>
+              <a:rPr lang="en-US" sz="1200" smtClean="0">
+                <a:solidFill>
+                  <a:srgbClr val="002060"/>
+                </a:solidFill>
+                <a:latin typeface="Arial" panose="020B0604020202020204" pitchFamily="34" charset="0"/>
+                <a:cs typeface="Arial" panose="020B0604020202020204" pitchFamily="34" charset="0"/>
+                <a:sym typeface="+mn-ea"/>
+              </a:rPr>
+              <a:t>Tên, Đơn giá Bán, nhóm laptop, </a:t>
+            </a:r>
+            <a:r>
+              <a:rPr lang="en-US" sz="1200" u="sng" smtClean="0">
+                <a:solidFill>
+                  <a:srgbClr val="002060"/>
+                </a:solidFill>
+                <a:latin typeface="Arial" panose="020B0604020202020204" pitchFamily="34" charset="0"/>
+                <a:cs typeface="Arial" panose="020B0604020202020204" pitchFamily="34" charset="0"/>
+                <a:sym typeface="+mn-ea"/>
+              </a:rPr>
+              <a:t>Trạng thái còn hàng</a:t>
+            </a:r>
+            <a:r>
+              <a:rPr lang="en-US" sz="1200" smtClean="0">
+                <a:solidFill>
+                  <a:srgbClr val="002060"/>
+                </a:solidFill>
+                <a:latin typeface="Arial" panose="020B0604020202020204" pitchFamily="34" charset="0"/>
+                <a:cs typeface="Arial" panose="020B0604020202020204" pitchFamily="34" charset="0"/>
+                <a:sym typeface="+mn-ea"/>
+              </a:rPr>
+              <a:t> ,</a:t>
+            </a:r>
+            <a:r>
+              <a:rPr lang="en-US" sz="1200" smtClean="0">
+                <a:solidFill>
+                  <a:srgbClr val="21117F"/>
+                </a:solidFill>
+                <a:latin typeface="Arial" panose="020B0604020202020204" pitchFamily="34" charset="0"/>
+                <a:cs typeface="Arial" panose="020B0604020202020204" pitchFamily="34" charset="0"/>
+                <a:sym typeface="+mn-ea"/>
+              </a:rPr>
+              <a:t> chi tiết kỹ thuật (CPU, Ram, HDD/SSD, Màn hình, Tính năng, màu sắc, Card onboard, Card ngoài, hệ điều hành, Trọng lượng,Bảo hành)</a:t>
+            </a:r>
+            <a:r>
+              <a:rPr lang="en-US" sz="1200" smtClean="0">
+                <a:solidFill>
+                  <a:srgbClr val="002060"/>
+                </a:solidFill>
+                <a:latin typeface="Arial" panose="020B0604020202020204" pitchFamily="34" charset="0"/>
+                <a:cs typeface="Arial" panose="020B0604020202020204" pitchFamily="34" charset="0"/>
+                <a:sym typeface="+mn-ea"/>
+              </a:rPr>
+              <a:t>), </a:t>
+            </a:r>
+            <a:r>
+              <a:rPr lang="en-US" sz="1200" smtClean="0">
+                <a:solidFill>
+                  <a:srgbClr val="FF0000"/>
+                </a:solidFill>
+                <a:latin typeface="Arial" panose="020B0604020202020204" pitchFamily="34" charset="0"/>
+                <a:cs typeface="Arial" panose="020B0604020202020204" pitchFamily="34" charset="0"/>
+                <a:sym typeface="+mn-ea"/>
+              </a:rPr>
+              <a:t>Đặt hàng</a:t>
+            </a:r>
+            <a:endParaRPr lang="en-US" sz="1200" smtClean="0">
+              <a:solidFill>
+                <a:prstClr val="black"/>
+              </a:solidFill>
+              <a:latin typeface="Arial" panose="020B0604020202020204" pitchFamily="34" charset="0"/>
+              <a:cs typeface="Arial" panose="020B0604020202020204" pitchFamily="34" charset="0"/>
+            </a:endParaRPr>
+          </a:p>
+        </p:txBody>
+      </p:sp>
+      <p:sp>
+        <p:nvSpPr>
+          <p:cNvPr id="2" name="TextBox 11">
+            <a:hlinkClick r:id="" action="ppaction://noaction"/>
+          </p:cNvPr>
+          <p:cNvSpPr txBox="1"/>
+          <p:nvPr/>
+        </p:nvSpPr>
+        <p:spPr>
+          <a:xfrm>
+            <a:off x="5270406" y="2303253"/>
+            <a:ext cx="2355453" cy="737234"/>
+          </a:xfrm>
+          <a:prstGeom prst="rect">
+            <a:avLst/>
+          </a:prstGeom>
+          <a:solidFill>
+            <a:schemeClr val="bg1"/>
+          </a:solidFill>
+          <a:ln w="41275">
+            <a:solidFill>
+              <a:srgbClr val="002060"/>
+            </a:solidFill>
+            <a:prstDash val="sysDash"/>
+          </a:ln>
+        </p:spPr>
+        <p:txBody>
+          <a:bodyPr wrap="square" rtlCol="0">
+            <a:spAutoFit/>
+          </a:bodyPr>
+          <a:p>
+            <a:r>
+              <a:rPr lang="en-US" sz="1400" b="1" smtClean="0">
+                <a:solidFill>
+                  <a:srgbClr val="002060"/>
+                </a:solidFill>
+                <a:latin typeface="Arial" panose="020B0604020202020204" pitchFamily="34" charset="0"/>
+                <a:cs typeface="Arial" panose="020B0604020202020204" pitchFamily="34" charset="0"/>
+              </a:rPr>
+              <a:t>Du_lieu</a:t>
+            </a:r>
+            <a:br>
+              <a:rPr lang="en-US" sz="1400" smtClean="0">
+                <a:solidFill>
+                  <a:srgbClr val="002060"/>
+                </a:solidFill>
+                <a:latin typeface="Arial" panose="020B0604020202020204" pitchFamily="34" charset="0"/>
+                <a:cs typeface="Arial" panose="020B0604020202020204" pitchFamily="34" charset="0"/>
+              </a:rPr>
+            </a:br>
+            <a:r>
+              <a:rPr lang="en-US" sz="1400" smtClean="0">
+                <a:solidFill>
+                  <a:srgbClr val="002060"/>
+                </a:solidFill>
+                <a:latin typeface="Arial" panose="020B0604020202020204" pitchFamily="34" charset="0"/>
+                <a:cs typeface="Arial" panose="020B0604020202020204" pitchFamily="34" charset="0"/>
+              </a:rPr>
+              <a:t> Cong_ty</a:t>
+            </a:r>
+            <a:br>
+              <a:rPr lang="en-US" sz="1400" b="1" smtClean="0">
+                <a:solidFill>
+                  <a:srgbClr val="002060"/>
+                </a:solidFill>
+                <a:latin typeface="Arial" panose="020B0604020202020204" pitchFamily="34" charset="0"/>
+                <a:cs typeface="Arial" panose="020B0604020202020204" pitchFamily="34" charset="0"/>
+              </a:rPr>
+            </a:br>
+            <a:r>
+              <a:rPr lang="en-US" sz="1400">
+                <a:solidFill>
+                  <a:srgbClr val="002060"/>
+                </a:solidFill>
+                <a:latin typeface="Arial" panose="020B0604020202020204" pitchFamily="34" charset="0"/>
+                <a:cs typeface="Arial" panose="020B0604020202020204" pitchFamily="34" charset="0"/>
+              </a:rPr>
+              <a:t> </a:t>
+            </a:r>
+            <a:r>
+              <a:rPr lang="en-US" sz="1400" smtClean="0">
+                <a:solidFill>
+                  <a:srgbClr val="002060"/>
+                </a:solidFill>
+                <a:latin typeface="Arial" panose="020B0604020202020204" pitchFamily="34" charset="0"/>
+                <a:cs typeface="Arial" panose="020B0604020202020204" pitchFamily="34" charset="0"/>
+              </a:rPr>
+              <a:t>Danh_sach_Laptop </a:t>
+            </a:r>
+            <a:endParaRPr lang="en-US" sz="1400" b="1" smtClean="0">
+              <a:solidFill>
+                <a:srgbClr val="002060"/>
+              </a:solidFill>
+              <a:latin typeface="Arial" panose="020B0604020202020204" pitchFamily="34" charset="0"/>
+              <a:cs typeface="Arial" panose="020B0604020202020204" pitchFamily="34" charset="0"/>
+            </a:endParaRPr>
+          </a:p>
+        </p:txBody>
+      </p:sp>
+      <p:grpSp>
+        <p:nvGrpSpPr>
+          <p:cNvPr id="4" name="Group 3"/>
+          <p:cNvGrpSpPr/>
+          <p:nvPr/>
+        </p:nvGrpSpPr>
+        <p:grpSpPr>
+          <a:xfrm>
+            <a:off x="53975" y="1270"/>
+            <a:ext cx="4575810" cy="5414738"/>
+            <a:chOff x="620563" y="2333151"/>
+            <a:chExt cx="1767100" cy="5414831"/>
+          </a:xfrm>
+        </p:grpSpPr>
+        <p:sp>
+          <p:nvSpPr>
+            <p:cNvPr id="5" name="TextBox 25"/>
+            <p:cNvSpPr txBox="1"/>
+            <p:nvPr/>
+          </p:nvSpPr>
+          <p:spPr>
+            <a:xfrm>
+              <a:off x="620563" y="2333151"/>
+              <a:ext cx="1767100" cy="337191"/>
+            </a:xfrm>
+            <a:prstGeom prst="rect">
+              <a:avLst/>
+            </a:prstGeom>
+            <a:noFill/>
+            <a:ln>
+              <a:solidFill>
+                <a:schemeClr val="tx1"/>
+              </a:solidFill>
+            </a:ln>
+          </p:spPr>
+          <p:txBody>
+            <a:bodyPr wrap="square" rtlCol="0">
+              <a:spAutoFit/>
+            </a:bodyPr>
+            <a:p>
+              <a:pPr algn="ctr"/>
+              <a:r>
+                <a:rPr lang="en-US" sz="1600" b="1" smtClean="0">
+                  <a:solidFill>
+                    <a:srgbClr val="002060"/>
+                  </a:solidFill>
+                  <a:latin typeface="Arial" panose="020B0604020202020204" pitchFamily="34" charset="0"/>
+                  <a:cs typeface="Arial" panose="020B0604020202020204" pitchFamily="34" charset="0"/>
+                </a:rPr>
+                <a:t>XL_CONG_TY</a:t>
+              </a:r>
+              <a:endParaRPr lang="en-US" sz="1600" b="1">
+                <a:latin typeface="Arial" panose="020B0604020202020204" pitchFamily="34" charset="0"/>
+                <a:cs typeface="Arial" panose="020B0604020202020204" pitchFamily="34" charset="0"/>
+              </a:endParaRPr>
+            </a:p>
+          </p:txBody>
+        </p:sp>
+        <p:sp>
+          <p:nvSpPr>
+            <p:cNvPr id="6" name="TextBox 26"/>
+            <p:cNvSpPr txBox="1"/>
+            <p:nvPr/>
+          </p:nvSpPr>
+          <p:spPr>
+            <a:xfrm>
+              <a:off x="620563" y="2670435"/>
+              <a:ext cx="1767100" cy="5077547"/>
+            </a:xfrm>
+            <a:prstGeom prst="rect">
+              <a:avLst/>
+            </a:prstGeom>
+            <a:noFill/>
+            <a:ln>
+              <a:solidFill>
+                <a:schemeClr val="tx1"/>
+              </a:solidFill>
+            </a:ln>
+          </p:spPr>
+          <p:txBody>
+            <a:bodyPr wrap="square" rtlCol="0">
+              <a:spAutoFit/>
+            </a:bodyPr>
+            <a:p>
+              <a:r>
+                <a:rPr lang="en-US" sz="1200" smtClean="0">
+                  <a:latin typeface="Arial" panose="020B0604020202020204" pitchFamily="34" charset="0"/>
+                  <a:cs typeface="Arial" panose="020B0604020202020204" pitchFamily="34" charset="0"/>
+                </a:rPr>
+                <a:t>Ma_so,Ten</a:t>
+              </a:r>
+              <a:endParaRPr lang="en-US" sz="1200" smtClean="0">
+                <a:latin typeface="Arial" panose="020B0604020202020204" pitchFamily="34" charset="0"/>
+                <a:cs typeface="Arial" panose="020B0604020202020204" pitchFamily="34" charset="0"/>
+              </a:endParaRPr>
+            </a:p>
+            <a:p>
+              <a:r>
+                <a:rPr lang="en-US" sz="1200" smtClean="0">
+                  <a:latin typeface="Arial" panose="020B0604020202020204" pitchFamily="34" charset="0"/>
+                  <a:cs typeface="Arial" panose="020B0604020202020204" pitchFamily="34" charset="0"/>
+                </a:rPr>
+                <a:t>     Danh_sach_Nhom_Lap_top:</a:t>
+              </a:r>
+              <a:endParaRPr lang="en-US" sz="1200" smtClean="0">
+                <a:latin typeface="Arial" panose="020B0604020202020204" pitchFamily="34" charset="0"/>
+                <a:cs typeface="Arial" panose="020B0604020202020204" pitchFamily="34" charset="0"/>
+              </a:endParaRPr>
+            </a:p>
+            <a:p>
+              <a:r>
+                <a:rPr lang="en-US" sz="1200" smtClean="0">
+                  <a:latin typeface="Arial" panose="020B0604020202020204" pitchFamily="34" charset="0"/>
+                  <a:cs typeface="Arial" panose="020B0604020202020204" pitchFamily="34" charset="0"/>
+                </a:rPr>
+                <a:t>       * Nhom_Lap_top:Ma_so,Ten</a:t>
+              </a:r>
+              <a:endParaRPr lang="en-US" sz="1200" smtClean="0">
+                <a:latin typeface="Arial" panose="020B0604020202020204" pitchFamily="34" charset="0"/>
+                <a:cs typeface="Arial" panose="020B0604020202020204" pitchFamily="34" charset="0"/>
+              </a:endParaRPr>
+            </a:p>
+            <a:p>
+              <a:r>
+                <a:rPr lang="en-US" sz="1200" smtClean="0">
+                  <a:latin typeface="Arial" panose="020B0604020202020204" pitchFamily="34" charset="0"/>
+                  <a:cs typeface="Arial" panose="020B0604020202020204" pitchFamily="34" charset="0"/>
+                </a:rPr>
+                <a:t>     Danh_sach_Mau_sac:</a:t>
+              </a:r>
+              <a:endParaRPr lang="en-US" sz="1200" smtClean="0">
+                <a:latin typeface="Arial" panose="020B0604020202020204" pitchFamily="34" charset="0"/>
+                <a:cs typeface="Arial" panose="020B0604020202020204" pitchFamily="34" charset="0"/>
+              </a:endParaRPr>
+            </a:p>
+            <a:p>
+              <a:r>
+                <a:rPr lang="en-US" sz="1200" smtClean="0">
+                  <a:latin typeface="Arial" panose="020B0604020202020204" pitchFamily="34" charset="0"/>
+                  <a:cs typeface="Arial" panose="020B0604020202020204" pitchFamily="34" charset="0"/>
+                </a:rPr>
+                <a:t>       * Mau_sac:Ma_so,Ten</a:t>
+              </a:r>
+              <a:endParaRPr lang="en-US" sz="1200" smtClean="0">
+                <a:latin typeface="Arial" panose="020B0604020202020204" pitchFamily="34" charset="0"/>
+                <a:cs typeface="Arial" panose="020B0604020202020204" pitchFamily="34" charset="0"/>
+              </a:endParaRPr>
+            </a:p>
+            <a:p>
+              <a:r>
+                <a:rPr lang="en-US" sz="1200" smtClean="0">
+                  <a:latin typeface="Arial" panose="020B0604020202020204" pitchFamily="34" charset="0"/>
+                  <a:cs typeface="Arial" panose="020B0604020202020204" pitchFamily="34" charset="0"/>
+                </a:rPr>
+                <a:t>     Danh_sach_Tinh_nang:</a:t>
+              </a:r>
+              <a:endParaRPr lang="en-US" sz="1200" smtClean="0">
+                <a:latin typeface="Arial" panose="020B0604020202020204" pitchFamily="34" charset="0"/>
+                <a:cs typeface="Arial" panose="020B0604020202020204" pitchFamily="34" charset="0"/>
+              </a:endParaRPr>
+            </a:p>
+            <a:p>
+              <a:r>
+                <a:rPr lang="en-US" sz="1200" smtClean="0">
+                  <a:latin typeface="Arial" panose="020B0604020202020204" pitchFamily="34" charset="0"/>
+                  <a:cs typeface="Arial" panose="020B0604020202020204" pitchFamily="34" charset="0"/>
+                </a:rPr>
+                <a:t>       * Tinh_nang:Ma_so,Ten</a:t>
+              </a:r>
+              <a:endParaRPr lang="en-US" sz="1200" smtClean="0">
+                <a:latin typeface="Arial" panose="020B0604020202020204" pitchFamily="34" charset="0"/>
+                <a:cs typeface="Arial" panose="020B0604020202020204" pitchFamily="34" charset="0"/>
+              </a:endParaRPr>
+            </a:p>
+            <a:p>
+              <a:r>
+                <a:rPr lang="en-US" sz="1200" smtClean="0">
+                  <a:latin typeface="Arial" panose="020B0604020202020204" pitchFamily="34" charset="0"/>
+                  <a:cs typeface="Arial" panose="020B0604020202020204" pitchFamily="34" charset="0"/>
+                </a:rPr>
+                <a:t>     Danh_sach_CPU_Series:</a:t>
+              </a:r>
+              <a:endParaRPr lang="en-US" sz="1200" smtClean="0">
+                <a:latin typeface="Arial" panose="020B0604020202020204" pitchFamily="34" charset="0"/>
+                <a:cs typeface="Arial" panose="020B0604020202020204" pitchFamily="34" charset="0"/>
+              </a:endParaRPr>
+            </a:p>
+            <a:p>
+              <a:r>
+                <a:rPr lang="en-US" sz="1200" smtClean="0">
+                  <a:latin typeface="Arial" panose="020B0604020202020204" pitchFamily="34" charset="0"/>
+                  <a:cs typeface="Arial" panose="020B0604020202020204" pitchFamily="34" charset="0"/>
+                </a:rPr>
+                <a:t>       * CPU_Series:Ma_so,Ten</a:t>
+              </a:r>
+              <a:endParaRPr lang="en-US" sz="1200" smtClean="0">
+                <a:latin typeface="Arial" panose="020B0604020202020204" pitchFamily="34" charset="0"/>
+                <a:cs typeface="Arial" panose="020B0604020202020204" pitchFamily="34" charset="0"/>
+              </a:endParaRPr>
+            </a:p>
+            <a:p>
+              <a:r>
+                <a:rPr lang="en-US" sz="1200" smtClean="0">
+                  <a:latin typeface="Arial" panose="020B0604020202020204" pitchFamily="34" charset="0"/>
+                  <a:cs typeface="Arial" panose="020B0604020202020204" pitchFamily="34" charset="0"/>
+                </a:rPr>
+                <a:t>     Danh_sach_Card_Man_hinh_Ngoai:</a:t>
+              </a:r>
+              <a:endParaRPr lang="en-US" sz="1200" smtClean="0">
+                <a:latin typeface="Arial" panose="020B0604020202020204" pitchFamily="34" charset="0"/>
+                <a:cs typeface="Arial" panose="020B0604020202020204" pitchFamily="34" charset="0"/>
+              </a:endParaRPr>
+            </a:p>
+            <a:p>
+              <a:r>
+                <a:rPr lang="en-US" sz="1200" smtClean="0">
+                  <a:latin typeface="Arial" panose="020B0604020202020204" pitchFamily="34" charset="0"/>
+                  <a:cs typeface="Arial" panose="020B0604020202020204" pitchFamily="34" charset="0"/>
+                </a:rPr>
+                <a:t>       * Card_Man_hinh_Ngoai:Ma_so,Ten</a:t>
+              </a:r>
+              <a:endParaRPr lang="en-US" sz="1200" smtClean="0">
+                <a:latin typeface="Arial" panose="020B0604020202020204" pitchFamily="34" charset="0"/>
+                <a:cs typeface="Arial" panose="020B0604020202020204" pitchFamily="34" charset="0"/>
+              </a:endParaRPr>
+            </a:p>
+            <a:p>
+              <a:r>
+                <a:rPr lang="en-US" sz="1200" smtClean="0">
+                  <a:latin typeface="Arial" panose="020B0604020202020204" pitchFamily="34" charset="0"/>
+                  <a:cs typeface="Arial" panose="020B0604020202020204" pitchFamily="34" charset="0"/>
+                </a:rPr>
+                <a:t>     Danh_sach_Chuan_Man_hinh:</a:t>
+              </a:r>
+              <a:endParaRPr lang="en-US" sz="1200" smtClean="0">
+                <a:latin typeface="Arial" panose="020B0604020202020204" pitchFamily="34" charset="0"/>
+                <a:cs typeface="Arial" panose="020B0604020202020204" pitchFamily="34" charset="0"/>
+              </a:endParaRPr>
+            </a:p>
+            <a:p>
+              <a:r>
+                <a:rPr lang="en-US" sz="1200" smtClean="0">
+                  <a:latin typeface="Arial" panose="020B0604020202020204" pitchFamily="34" charset="0"/>
+                  <a:cs typeface="Arial" panose="020B0604020202020204" pitchFamily="34" charset="0"/>
+                </a:rPr>
+                <a:t>       * Chuan_Man_hinh:Ma_so,Ten</a:t>
+              </a:r>
+              <a:endParaRPr lang="en-US" sz="1200" smtClean="0">
+                <a:latin typeface="Arial" panose="020B0604020202020204" pitchFamily="34" charset="0"/>
+                <a:cs typeface="Arial" panose="020B0604020202020204" pitchFamily="34" charset="0"/>
+              </a:endParaRPr>
+            </a:p>
+            <a:p>
+              <a:r>
+                <a:rPr lang="en-US" sz="1200" smtClean="0">
+                  <a:latin typeface="Arial" panose="020B0604020202020204" pitchFamily="34" charset="0"/>
+                  <a:cs typeface="Arial" panose="020B0604020202020204" pitchFamily="34" charset="0"/>
+                </a:rPr>
+                <a:t>     Danh_sach_Kich_thuoc_Man_hinh:</a:t>
+              </a:r>
+              <a:endParaRPr lang="en-US" sz="1200" smtClean="0">
+                <a:latin typeface="Arial" panose="020B0604020202020204" pitchFamily="34" charset="0"/>
+                <a:cs typeface="Arial" panose="020B0604020202020204" pitchFamily="34" charset="0"/>
+              </a:endParaRPr>
+            </a:p>
+            <a:p>
+              <a:r>
+                <a:rPr lang="en-US" sz="1200" smtClean="0">
+                  <a:latin typeface="Arial" panose="020B0604020202020204" pitchFamily="34" charset="0"/>
+                  <a:cs typeface="Arial" panose="020B0604020202020204" pitchFamily="34" charset="0"/>
+                </a:rPr>
+                <a:t>       * Kich_thuoc_Man_hinh:Ma_so,Ten</a:t>
+              </a:r>
+              <a:endParaRPr lang="en-US" sz="1200" smtClean="0">
+                <a:latin typeface="Arial" panose="020B0604020202020204" pitchFamily="34" charset="0"/>
+                <a:cs typeface="Arial" panose="020B0604020202020204" pitchFamily="34" charset="0"/>
+              </a:endParaRPr>
+            </a:p>
+            <a:p>
+              <a:r>
+                <a:rPr lang="en-US" sz="1200" smtClean="0">
+                  <a:latin typeface="Arial" panose="020B0604020202020204" pitchFamily="34" charset="0"/>
+                  <a:cs typeface="Arial" panose="020B0604020202020204" pitchFamily="34" charset="0"/>
+                </a:rPr>
+                <a:t>     Danh_sach_Dung_luong_Ram:</a:t>
+              </a:r>
+              <a:endParaRPr lang="en-US" sz="1200" smtClean="0">
+                <a:latin typeface="Arial" panose="020B0604020202020204" pitchFamily="34" charset="0"/>
+                <a:cs typeface="Arial" panose="020B0604020202020204" pitchFamily="34" charset="0"/>
+              </a:endParaRPr>
+            </a:p>
+            <a:p>
+              <a:r>
+                <a:rPr lang="en-US" sz="1200" smtClean="0">
+                  <a:latin typeface="Arial" panose="020B0604020202020204" pitchFamily="34" charset="0"/>
+                  <a:cs typeface="Arial" panose="020B0604020202020204" pitchFamily="34" charset="0"/>
+                </a:rPr>
+                <a:t>       * Dung_luong_Ram:Ma_so,Ten</a:t>
+              </a:r>
+              <a:endParaRPr lang="en-US" sz="1200" smtClean="0">
+                <a:latin typeface="Arial" panose="020B0604020202020204" pitchFamily="34" charset="0"/>
+                <a:cs typeface="Arial" panose="020B0604020202020204" pitchFamily="34" charset="0"/>
+              </a:endParaRPr>
+            </a:p>
+            <a:p>
+              <a:r>
+                <a:rPr lang="en-US" sz="1200" smtClean="0">
+                  <a:latin typeface="Arial" panose="020B0604020202020204" pitchFamily="34" charset="0"/>
+                  <a:cs typeface="Arial" panose="020B0604020202020204" pitchFamily="34" charset="0"/>
+                </a:rPr>
+                <a:t>     Danh_sach_HDD:</a:t>
+              </a:r>
+              <a:endParaRPr lang="en-US" sz="1200" smtClean="0">
+                <a:latin typeface="Arial" panose="020B0604020202020204" pitchFamily="34" charset="0"/>
+                <a:cs typeface="Arial" panose="020B0604020202020204" pitchFamily="34" charset="0"/>
+              </a:endParaRPr>
+            </a:p>
+            <a:p>
+              <a:r>
+                <a:rPr lang="en-US" sz="1200" smtClean="0">
+                  <a:latin typeface="Arial" panose="020B0604020202020204" pitchFamily="34" charset="0"/>
+                  <a:cs typeface="Arial" panose="020B0604020202020204" pitchFamily="34" charset="0"/>
+                </a:rPr>
+                <a:t>       * HDD:Ma_so,Ten</a:t>
+              </a:r>
+              <a:endParaRPr lang="en-US" sz="1200" smtClean="0">
+                <a:latin typeface="Arial" panose="020B0604020202020204" pitchFamily="34" charset="0"/>
+                <a:cs typeface="Arial" panose="020B0604020202020204" pitchFamily="34" charset="0"/>
+              </a:endParaRPr>
+            </a:p>
+            <a:p>
+              <a:r>
+                <a:rPr lang="en-US" sz="1200" smtClean="0">
+                  <a:latin typeface="Arial" panose="020B0604020202020204" pitchFamily="34" charset="0"/>
+                  <a:cs typeface="Arial" panose="020B0604020202020204" pitchFamily="34" charset="0"/>
+                </a:rPr>
+                <a:t>     Danh_sach_SDD:</a:t>
+              </a:r>
+              <a:endParaRPr lang="en-US" sz="1200" smtClean="0">
+                <a:latin typeface="Arial" panose="020B0604020202020204" pitchFamily="34" charset="0"/>
+                <a:cs typeface="Arial" panose="020B0604020202020204" pitchFamily="34" charset="0"/>
+              </a:endParaRPr>
+            </a:p>
+            <a:p>
+              <a:r>
+                <a:rPr lang="en-US" sz="1200" smtClean="0">
+                  <a:latin typeface="Arial" panose="020B0604020202020204" pitchFamily="34" charset="0"/>
+                  <a:cs typeface="Arial" panose="020B0604020202020204" pitchFamily="34" charset="0"/>
+                </a:rPr>
+                <a:t>       * SSD:Ma_so,Ten</a:t>
+              </a:r>
+              <a:endParaRPr lang="en-US" sz="1200" smtClean="0">
+                <a:latin typeface="Arial" panose="020B0604020202020204" pitchFamily="34" charset="0"/>
+                <a:cs typeface="Arial" panose="020B0604020202020204" pitchFamily="34" charset="0"/>
+              </a:endParaRPr>
+            </a:p>
+            <a:p>
+              <a:r>
+                <a:rPr lang="en-US" sz="1200" smtClean="0">
+                  <a:latin typeface="Arial" panose="020B0604020202020204" pitchFamily="34" charset="0"/>
+                  <a:cs typeface="Arial" panose="020B0604020202020204" pitchFamily="34" charset="0"/>
+                </a:rPr>
+                <a:t>     Danh_sach_Cua_hang:</a:t>
+              </a:r>
+              <a:endParaRPr lang="en-US" sz="1200" smtClean="0">
+                <a:latin typeface="Arial" panose="020B0604020202020204" pitchFamily="34" charset="0"/>
+                <a:cs typeface="Arial" panose="020B0604020202020204" pitchFamily="34" charset="0"/>
+              </a:endParaRPr>
+            </a:p>
+            <a:p>
+              <a:r>
+                <a:rPr lang="en-US" sz="1200" smtClean="0">
+                  <a:latin typeface="Arial" panose="020B0604020202020204" pitchFamily="34" charset="0"/>
+                  <a:cs typeface="Arial" panose="020B0604020202020204" pitchFamily="34" charset="0"/>
+                </a:rPr>
+                <a:t>       * Cua_hang:Ma_so,Ten, Dia_chi, So_dien_thoai</a:t>
+              </a:r>
+              <a:endParaRPr lang="en-US" sz="1200" smtClean="0">
+                <a:latin typeface="Arial" panose="020B0604020202020204" pitchFamily="34" charset="0"/>
+                <a:cs typeface="Arial" panose="020B0604020202020204" pitchFamily="34" charset="0"/>
+              </a:endParaRPr>
+            </a:p>
+            <a:p>
+              <a:r>
+                <a:rPr lang="en-US" sz="1200" smtClean="0">
+                  <a:latin typeface="Arial" panose="020B0604020202020204" pitchFamily="34" charset="0"/>
+                  <a:cs typeface="Arial" panose="020B0604020202020204" pitchFamily="34" charset="0"/>
+                </a:rPr>
+                <a:t>     Danh_sach_Nhan_vien_Nhap_hang</a:t>
+              </a:r>
+              <a:endParaRPr lang="en-US" sz="1200" smtClean="0">
+                <a:latin typeface="Arial" panose="020B0604020202020204" pitchFamily="34" charset="0"/>
+                <a:cs typeface="Arial" panose="020B0604020202020204" pitchFamily="34" charset="0"/>
+              </a:endParaRPr>
+            </a:p>
+            <a:p>
+              <a:pPr lvl="1"/>
+              <a:r>
+                <a:rPr lang="en-US" sz="1200" smtClean="0">
+                  <a:latin typeface="Arial" panose="020B0604020202020204" pitchFamily="34" charset="0"/>
+                  <a:cs typeface="Arial" panose="020B0604020202020204" pitchFamily="34" charset="0"/>
+                  <a:sym typeface="+mn-ea"/>
+                </a:rPr>
+                <a:t>Nhan_vien :Ma_so,Ho_ten,Ten_Dang_nhap,Mat_khau</a:t>
+              </a:r>
+              <a:endParaRPr lang="en-US" sz="1200" smtClean="0">
+                <a:latin typeface="Arial" panose="020B0604020202020204" pitchFamily="34" charset="0"/>
+                <a:cs typeface="Arial" panose="020B0604020202020204" pitchFamily="34" charset="0"/>
+              </a:endParaRPr>
+            </a:p>
+            <a:p>
+              <a:pPr lvl="1"/>
+              <a:r>
+                <a:rPr lang="en-US" sz="1200" smtClean="0">
+                  <a:latin typeface="Arial" panose="020B0604020202020204" pitchFamily="34" charset="0"/>
+                  <a:cs typeface="Arial" panose="020B0604020202020204" pitchFamily="34" charset="0"/>
+                  <a:sym typeface="+mn-ea"/>
+                </a:rPr>
+                <a:t>          Nhom_Nhan_vien:Ma_so,Ten</a:t>
+              </a:r>
+              <a:endParaRPr lang="en-US" sz="1200" smtClean="0">
+                <a:latin typeface="Arial" panose="020B0604020202020204" pitchFamily="34" charset="0"/>
+                <a:cs typeface="Arial" panose="020B0604020202020204" pitchFamily="34" charset="0"/>
+              </a:endParaRPr>
+            </a:p>
+            <a:p>
+              <a:pPr lvl="1"/>
+              <a:r>
+                <a:rPr lang="en-US" sz="1200" smtClean="0">
+                  <a:latin typeface="Arial" panose="020B0604020202020204" pitchFamily="34" charset="0"/>
+                  <a:cs typeface="Arial" panose="020B0604020202020204" pitchFamily="34" charset="0"/>
+                  <a:sym typeface="+mn-ea"/>
+                </a:rPr>
+                <a:t>          Cua_hang:Ma_so,Ten, Dia_chi, So_dien_thoai</a:t>
+              </a:r>
+              <a:endParaRPr lang="en-US" sz="1200" smtClean="0">
+                <a:latin typeface="Arial" panose="020B0604020202020204" pitchFamily="34" charset="0"/>
+                <a:cs typeface="Arial" panose="020B0604020202020204" pitchFamily="34" charset="0"/>
+              </a:endParaRPr>
+            </a:p>
+          </p:txBody>
+        </p:sp>
+      </p:grpSp>
+      <p:grpSp>
+        <p:nvGrpSpPr>
+          <p:cNvPr id="7" name="Group 6"/>
+          <p:cNvGrpSpPr/>
+          <p:nvPr/>
+        </p:nvGrpSpPr>
+        <p:grpSpPr>
+          <a:xfrm>
+            <a:off x="5929398" y="4965707"/>
+            <a:ext cx="5173080" cy="2830294"/>
+            <a:chOff x="903567" y="2937671"/>
+            <a:chExt cx="1767100" cy="2830294"/>
+          </a:xfrm>
+        </p:grpSpPr>
+        <p:sp>
+          <p:nvSpPr>
+            <p:cNvPr id="8" name="TextBox 28"/>
+            <p:cNvSpPr txBox="1"/>
+            <p:nvPr/>
+          </p:nvSpPr>
+          <p:spPr>
+            <a:xfrm>
+              <a:off x="903567" y="2937671"/>
+              <a:ext cx="1767100" cy="337185"/>
+            </a:xfrm>
+            <a:prstGeom prst="rect">
+              <a:avLst/>
+            </a:prstGeom>
+            <a:noFill/>
+            <a:ln>
+              <a:solidFill>
+                <a:schemeClr val="tx1"/>
+              </a:solidFill>
+            </a:ln>
+          </p:spPr>
+          <p:txBody>
+            <a:bodyPr wrap="square" rtlCol="0">
+              <a:spAutoFit/>
+            </a:bodyPr>
+            <a:p>
+              <a:pPr algn="ctr"/>
+              <a:r>
+                <a:rPr lang="en-US" sz="1600" b="1" smtClean="0">
+                  <a:solidFill>
+                    <a:srgbClr val="002060"/>
+                  </a:solidFill>
+                  <a:latin typeface="Arial" panose="020B0604020202020204" pitchFamily="34" charset="0"/>
+                  <a:cs typeface="Arial" panose="020B0604020202020204" pitchFamily="34" charset="0"/>
+                </a:rPr>
+                <a:t>XL_LAPTOP </a:t>
+              </a:r>
+              <a:endParaRPr lang="en-US" sz="1600" b="1">
+                <a:latin typeface="Arial" panose="020B0604020202020204" pitchFamily="34" charset="0"/>
+                <a:cs typeface="Arial" panose="020B0604020202020204" pitchFamily="34" charset="0"/>
+              </a:endParaRPr>
+            </a:p>
+          </p:txBody>
+        </p:sp>
+        <p:sp>
+          <p:nvSpPr>
+            <p:cNvPr id="9" name="TextBox 29"/>
+            <p:cNvSpPr txBox="1"/>
+            <p:nvPr/>
+          </p:nvSpPr>
+          <p:spPr>
+            <a:xfrm>
+              <a:off x="903567" y="3276225"/>
+              <a:ext cx="1767100" cy="2491740"/>
+            </a:xfrm>
+            <a:prstGeom prst="rect">
+              <a:avLst/>
+            </a:prstGeom>
+            <a:noFill/>
+            <a:ln>
+              <a:solidFill>
+                <a:schemeClr val="tx1"/>
+              </a:solidFill>
+            </a:ln>
+          </p:spPr>
+          <p:txBody>
+            <a:bodyPr wrap="square" rtlCol="0">
+              <a:spAutoFit/>
+            </a:bodyPr>
+            <a:p>
+              <a:r>
+                <a:rPr lang="en-US" sz="1200" u="sng">
+                  <a:latin typeface="Arial" panose="020B0604020202020204" pitchFamily="34" charset="0"/>
+                  <a:cs typeface="Arial" panose="020B0604020202020204" pitchFamily="34" charset="0"/>
+                </a:rPr>
+                <a:t>Số lượng Tồn </a:t>
+              </a:r>
+              <a:endParaRPr lang="en-US" sz="1200" u="sng">
+                <a:latin typeface="Arial" panose="020B0604020202020204" pitchFamily="34" charset="0"/>
+                <a:cs typeface="Arial" panose="020B0604020202020204" pitchFamily="34" charset="0"/>
+              </a:endParaRPr>
+            </a:p>
+            <a:p>
+              <a:r>
+                <a:rPr lang="en-US" sz="1200">
+                  <a:latin typeface="Arial" panose="020B0604020202020204" pitchFamily="34" charset="0"/>
+                  <a:cs typeface="Arial" panose="020B0604020202020204" pitchFamily="34" charset="0"/>
+                </a:rPr>
+                <a:t>Ma_so,Ten,Don_gia_Ban,,Don_gia_Nhap,CPU,Loai_Ram,Card_Man_hinh_Onboard,He_dieu_hanh,Trong_luong,Bao_hanh</a:t>
+              </a:r>
+              <a:endParaRPr lang="en-US" sz="1200">
+                <a:latin typeface="Arial" panose="020B0604020202020204" pitchFamily="34" charset="0"/>
+                <a:cs typeface="Arial" panose="020B0604020202020204" pitchFamily="34" charset="0"/>
+              </a:endParaRPr>
+            </a:p>
+            <a:p>
+              <a:r>
+                <a:rPr lang="en-US" sz="1200">
+                  <a:latin typeface="Arial" panose="020B0604020202020204" pitchFamily="34" charset="0"/>
+                  <a:cs typeface="Arial" panose="020B0604020202020204" pitchFamily="34" charset="0"/>
+                </a:rPr>
+                <a:t>          Nhom_Lap_top:Ma_so,Ten</a:t>
+              </a:r>
+              <a:endParaRPr lang="en-US" sz="1200">
+                <a:latin typeface="Arial" panose="020B0604020202020204" pitchFamily="34" charset="0"/>
+                <a:cs typeface="Arial" panose="020B0604020202020204" pitchFamily="34" charset="0"/>
+              </a:endParaRPr>
+            </a:p>
+            <a:p>
+              <a:r>
+                <a:rPr lang="en-US" sz="1200">
+                  <a:latin typeface="Arial" panose="020B0604020202020204" pitchFamily="34" charset="0"/>
+                  <a:cs typeface="Arial" panose="020B0604020202020204" pitchFamily="34" charset="0"/>
+                </a:rPr>
+                <a:t>          Tinh_nang:Ma_so,Ten</a:t>
+              </a:r>
+              <a:endParaRPr lang="en-US" sz="1200">
+                <a:latin typeface="Arial" panose="020B0604020202020204" pitchFamily="34" charset="0"/>
+                <a:cs typeface="Arial" panose="020B0604020202020204" pitchFamily="34" charset="0"/>
+              </a:endParaRPr>
+            </a:p>
+            <a:p>
+              <a:r>
+                <a:rPr lang="en-US" sz="1200">
+                  <a:latin typeface="Arial" panose="020B0604020202020204" pitchFamily="34" charset="0"/>
+                  <a:cs typeface="Arial" panose="020B0604020202020204" pitchFamily="34" charset="0"/>
+                </a:rPr>
+                <a:t>          CPU_Series:Ma_so,Ten</a:t>
+              </a:r>
+              <a:endParaRPr lang="en-US" sz="1200">
+                <a:latin typeface="Arial" panose="020B0604020202020204" pitchFamily="34" charset="0"/>
+                <a:cs typeface="Arial" panose="020B0604020202020204" pitchFamily="34" charset="0"/>
+              </a:endParaRPr>
+            </a:p>
+            <a:p>
+              <a:r>
+                <a:rPr lang="en-US" sz="1200">
+                  <a:latin typeface="Arial" panose="020B0604020202020204" pitchFamily="34" charset="0"/>
+                  <a:cs typeface="Arial" panose="020B0604020202020204" pitchFamily="34" charset="0"/>
+                </a:rPr>
+                <a:t>          Chuan_Man_hinh:Ma_so,Ten</a:t>
+              </a:r>
+              <a:endParaRPr lang="en-US" sz="1200">
+                <a:latin typeface="Arial" panose="020B0604020202020204" pitchFamily="34" charset="0"/>
+                <a:cs typeface="Arial" panose="020B0604020202020204" pitchFamily="34" charset="0"/>
+              </a:endParaRPr>
+            </a:p>
+            <a:p>
+              <a:r>
+                <a:rPr lang="en-US" sz="1200">
+                  <a:latin typeface="Arial" panose="020B0604020202020204" pitchFamily="34" charset="0"/>
+                  <a:cs typeface="Arial" panose="020B0604020202020204" pitchFamily="34" charset="0"/>
+                </a:rPr>
+                <a:t>          Mau_sac:Ma_so,Ten</a:t>
+              </a:r>
+              <a:endParaRPr lang="en-US" sz="1200">
+                <a:latin typeface="Arial" panose="020B0604020202020204" pitchFamily="34" charset="0"/>
+                <a:cs typeface="Arial" panose="020B0604020202020204" pitchFamily="34" charset="0"/>
+              </a:endParaRPr>
+            </a:p>
+            <a:p>
+              <a:r>
+                <a:rPr lang="en-US" sz="1200">
+                  <a:latin typeface="Arial" panose="020B0604020202020204" pitchFamily="34" charset="0"/>
+                  <a:cs typeface="Arial" panose="020B0604020202020204" pitchFamily="34" charset="0"/>
+                </a:rPr>
+                <a:t>          Kich_thuoc_Man_hinh:Ma_so,Ten</a:t>
+              </a:r>
+              <a:endParaRPr lang="en-US" sz="1200">
+                <a:latin typeface="Arial" panose="020B0604020202020204" pitchFamily="34" charset="0"/>
+                <a:cs typeface="Arial" panose="020B0604020202020204" pitchFamily="34" charset="0"/>
+              </a:endParaRPr>
+            </a:p>
+            <a:p>
+              <a:r>
+                <a:rPr lang="en-US" sz="1200">
+                  <a:latin typeface="Arial" panose="020B0604020202020204" pitchFamily="34" charset="0"/>
+                  <a:cs typeface="Arial" panose="020B0604020202020204" pitchFamily="34" charset="0"/>
+                </a:rPr>
+                <a:t>          Dung_luong_Ram:Ma_so,Ten</a:t>
+              </a:r>
+              <a:endParaRPr lang="en-US" sz="1200">
+                <a:latin typeface="Arial" panose="020B0604020202020204" pitchFamily="34" charset="0"/>
+                <a:cs typeface="Arial" panose="020B0604020202020204" pitchFamily="34" charset="0"/>
+              </a:endParaRPr>
+            </a:p>
+            <a:p>
+              <a:r>
+                <a:rPr lang="en-US" sz="1200">
+                  <a:latin typeface="Arial" panose="020B0604020202020204" pitchFamily="34" charset="0"/>
+                  <a:cs typeface="Arial" panose="020B0604020202020204" pitchFamily="34" charset="0"/>
+                </a:rPr>
+                <a:t>          Card_Man_hinh_Ngoai:Ma_so,Ten</a:t>
+              </a:r>
+              <a:endParaRPr lang="en-US" sz="1200">
+                <a:latin typeface="Arial" panose="020B0604020202020204" pitchFamily="34" charset="0"/>
+                <a:cs typeface="Arial" panose="020B0604020202020204" pitchFamily="34" charset="0"/>
+              </a:endParaRPr>
+            </a:p>
+            <a:p>
+              <a:r>
+                <a:rPr lang="en-US" sz="1200">
+                  <a:latin typeface="Arial" panose="020B0604020202020204" pitchFamily="34" charset="0"/>
+                  <a:cs typeface="Arial" panose="020B0604020202020204" pitchFamily="34" charset="0"/>
+                </a:rPr>
+                <a:t>          HDD:Ma_so,Ten</a:t>
+              </a:r>
+              <a:endParaRPr lang="en-US" sz="1200">
+                <a:latin typeface="Arial" panose="020B0604020202020204" pitchFamily="34" charset="0"/>
+                <a:cs typeface="Arial" panose="020B0604020202020204" pitchFamily="34" charset="0"/>
+              </a:endParaRPr>
+            </a:p>
+            <a:p>
+              <a:r>
+                <a:rPr lang="en-US" sz="1200">
+                  <a:latin typeface="Arial" panose="020B0604020202020204" pitchFamily="34" charset="0"/>
+                  <a:cs typeface="Arial" panose="020B0604020202020204" pitchFamily="34" charset="0"/>
+                </a:rPr>
+                <a:t>          SSD:Ma_so,Ten</a:t>
+              </a:r>
+              <a:endParaRPr lang="en-US" sz="1200">
+                <a:latin typeface="Arial" panose="020B0604020202020204" pitchFamily="34" charset="0"/>
+                <a:cs typeface="Arial" panose="020B0604020202020204" pitchFamily="34" charset="0"/>
+              </a:endParaRPr>
+            </a:p>
+          </p:txBody>
+        </p:sp>
+      </p:grpSp>
+      <p:sp>
+        <p:nvSpPr>
+          <p:cNvPr id="34" name="Text Box 33"/>
+          <p:cNvSpPr txBox="1"/>
+          <p:nvPr/>
+        </p:nvSpPr>
+        <p:spPr>
+          <a:xfrm>
+            <a:off x="4826000" y="3106420"/>
+            <a:ext cx="2540000" cy="645160"/>
+          </a:xfrm>
+          <a:prstGeom prst="rect">
+            <a:avLst/>
+          </a:prstGeom>
+          <a:noFill/>
+        </p:spPr>
+        <p:txBody>
+          <a:bodyPr wrap="square" rtlCol="0" anchor="t">
+            <a:spAutoFit/>
+          </a:bodyPr>
+          <a:p>
+            <a:r>
+              <a:rPr lang="en-US"/>
+              <a:t>Queens Of The Stone Age - In My Head</a:t>
+            </a:r>
+            <a:endParaRPr lang="en-US"/>
+          </a:p>
+        </p:txBody>
+      </p:sp>
     </p:spTree>
   </p:cSld>
   <p:clrMapOvr>

</xml_diff>

<commit_message>
Cap nhat mo hinh doi tuong Nhan_vien_Giao_hang
</commit_message>
<xml_diff>
--- a/Laptop_Phong_Vu_Mo_hinh_Doi_tuong.pptx
+++ b/Laptop_Phong_Vu_Mo_hinh_Doi_tuong.pptx
@@ -5,16 +5,17 @@
     <p:sldMasterId id="2147483648" r:id="rId1"/>
   </p:sldMasterIdLst>
   <p:notesMasterIdLst>
-    <p:notesMasterId r:id="rId4"/>
+    <p:notesMasterId r:id="rId7"/>
   </p:notesMasterIdLst>
   <p:handoutMasterIdLst>
     <p:handoutMasterId r:id="rId8"/>
   </p:handoutMasterIdLst>
   <p:sldIdLst>
-    <p:sldId id="293" r:id="rId3"/>
-    <p:sldId id="305" r:id="rId5"/>
-    <p:sldId id="306" r:id="rId6"/>
-    <p:sldId id="307" r:id="rId7"/>
+    <p:sldId id="293" r:id="rId2"/>
+    <p:sldId id="305" r:id="rId3"/>
+    <p:sldId id="306" r:id="rId4"/>
+    <p:sldId id="307" r:id="rId5"/>
+    <p:sldId id="308" r:id="rId6"/>
   </p:sldIdLst>
   <p:sldSz cx="12192000" cy="6858000"/>
   <p:notesSz cx="6858000" cy="9144000"/>
@@ -113,6 +114,11 @@
       </a:defRPr>
     </a:lvl9pPr>
   </p:defaultTextStyle>
+  <p:extLst>
+    <p:ext uri="{EFAFB233-063F-42B5-8137-9DF3F51BA10A}">
+      <p15:sldGuideLst xmlns:p15="http://schemas.microsoft.com/office/powerpoint/2012/main"/>
+    </p:ext>
+  </p:extLst>
 </p:presentation>
 </file>
 
@@ -198,6 +204,7 @@
           <a:p>
             <a:fld id="{696C064A-D61B-4B21-B757-51A9B82445B8}" type="datetimeFigureOut">
               <a:rPr lang="en-US" smtClean="0"/>
+              <a:t>3/13/2018</a:t>
             </a:fld>
             <a:endParaRPr lang="en-US"/>
           </a:p>
@@ -263,6 +270,7 @@
           <a:p>
             <a:fld id="{50305E07-67EA-4042-A3F6-853A8AD8D209}" type="slidenum">
               <a:rPr lang="en-US" smtClean="0"/>
+              <a:t>‹#›</a:t>
             </a:fld>
             <a:endParaRPr lang="en-US"/>
           </a:p>
@@ -356,6 +364,7 @@
           <a:p>
             <a:fld id="{AEB6B815-3999-499D-80CF-2EC02897F6EF}" type="datetimeFigureOut">
               <a:rPr lang="en-US" smtClean="0"/>
+              <a:t>3/13/2018</a:t>
             </a:fld>
             <a:endParaRPr lang="en-US"/>
           </a:p>
@@ -422,7 +431,6 @@
               <a:rPr lang="en-US" smtClean="0"/>
               <a:t>Click to edit Master text styles</a:t>
             </a:r>
-            <a:endParaRPr lang="en-US" smtClean="0"/>
           </a:p>
           <a:p>
             <a:pPr lvl="1"/>
@@ -430,7 +438,6 @@
               <a:rPr lang="en-US" smtClean="0"/>
               <a:t>Second level</a:t>
             </a:r>
-            <a:endParaRPr lang="en-US" smtClean="0"/>
           </a:p>
           <a:p>
             <a:pPr lvl="2"/>
@@ -438,7 +445,6 @@
               <a:rPr lang="en-US" smtClean="0"/>
               <a:t>Third level</a:t>
             </a:r>
-            <a:endParaRPr lang="en-US" smtClean="0"/>
           </a:p>
           <a:p>
             <a:pPr lvl="3"/>
@@ -446,7 +452,6 @@
               <a:rPr lang="en-US" smtClean="0"/>
               <a:t>Fourth level</a:t>
             </a:r>
-            <a:endParaRPr lang="en-US" smtClean="0"/>
           </a:p>
           <a:p>
             <a:pPr lvl="4"/>
@@ -518,6 +523,7 @@
           <a:p>
             <a:fld id="{04E23E14-C304-42FB-937A-51A7CC2C63E6}" type="slidenum">
               <a:rPr lang="en-US" smtClean="0"/>
+              <a:t>‹#›</a:t>
             </a:fld>
             <a:endParaRPr lang="en-US"/>
           </a:p>
@@ -690,6 +696,7 @@
                   <a:prstClr val="black"/>
                 </a:solidFill>
               </a:rPr>
+              <a:t>1</a:t>
             </a:fld>
             <a:endParaRPr lang="vi-VN">
               <a:solidFill>
@@ -776,6 +783,7 @@
                   <a:prstClr val="black"/>
                 </a:solidFill>
               </a:rPr>
+              <a:t>2</a:t>
             </a:fld>
             <a:endParaRPr lang="vi-VN">
               <a:solidFill>
@@ -862,6 +870,7 @@
                   <a:prstClr val="black"/>
                 </a:solidFill>
               </a:rPr>
+              <a:t>3</a:t>
             </a:fld>
             <a:endParaRPr lang="vi-VN">
               <a:solidFill>
@@ -948,6 +957,7 @@
                   <a:prstClr val="black"/>
                 </a:solidFill>
               </a:rPr>
+              <a:t>4</a:t>
             </a:fld>
             <a:endParaRPr lang="vi-VN">
               <a:solidFill>
@@ -958,6 +968,98 @@
         </p:txBody>
       </p:sp>
     </p:spTree>
+  </p:cSld>
+  <p:clrMapOvr>
+    <a:masterClrMapping/>
+  </p:clrMapOvr>
+</p:notes>
+</file>
+
+<file path=ppt/notesSlides/notesSlide5.xml><?xml version="1.0" encoding="utf-8"?>
+<p:notes xmlns:a="http://schemas.openxmlformats.org/drawingml/2006/main" xmlns:r="http://schemas.openxmlformats.org/officeDocument/2006/relationships" xmlns:p="http://schemas.openxmlformats.org/presentationml/2006/main">
+  <p:cSld>
+    <p:spTree>
+      <p:nvGrpSpPr>
+        <p:cNvPr id="1" name=""/>
+        <p:cNvGrpSpPr/>
+        <p:nvPr/>
+      </p:nvGrpSpPr>
+      <p:grpSpPr>
+        <a:xfrm>
+          <a:off x="0" y="0"/>
+          <a:ext cx="0" cy="0"/>
+          <a:chOff x="0" y="0"/>
+          <a:chExt cx="0" cy="0"/>
+        </a:xfrm>
+      </p:grpSpPr>
+      <p:sp>
+        <p:nvSpPr>
+          <p:cNvPr id="2" name="Slide Image Placeholder 1"/>
+          <p:cNvSpPr>
+            <a:spLocks noGrp="1" noRot="1" noChangeAspect="1"/>
+          </p:cNvSpPr>
+          <p:nvPr>
+            <p:ph type="sldImg"/>
+          </p:nvPr>
+        </p:nvSpPr>
+        <p:spPr/>
+      </p:sp>
+      <p:sp>
+        <p:nvSpPr>
+          <p:cNvPr id="3" name="Notes Placeholder 2"/>
+          <p:cNvSpPr>
+            <a:spLocks noGrp="1"/>
+          </p:cNvSpPr>
+          <p:nvPr>
+            <p:ph type="body" idx="1"/>
+          </p:nvPr>
+        </p:nvSpPr>
+        <p:spPr/>
+        <p:txBody>
+          <a:bodyPr/>
+          <a:lstStyle/>
+          <a:p>
+            <a:endParaRPr lang="en-US"/>
+          </a:p>
+        </p:txBody>
+      </p:sp>
+      <p:sp>
+        <p:nvSpPr>
+          <p:cNvPr id="4" name="Slide Number Placeholder 3"/>
+          <p:cNvSpPr>
+            <a:spLocks noGrp="1"/>
+          </p:cNvSpPr>
+          <p:nvPr>
+            <p:ph type="sldNum" sz="quarter" idx="10"/>
+          </p:nvPr>
+        </p:nvSpPr>
+        <p:spPr/>
+        <p:txBody>
+          <a:bodyPr/>
+          <a:lstStyle/>
+          <a:p>
+            <a:fld id="{1C6F55E1-8FA1-4431-8CCD-46EFB1EBE07A}" type="slidenum">
+              <a:rPr lang="vi-VN" smtClean="0">
+                <a:solidFill>
+                  <a:prstClr val="black"/>
+                </a:solidFill>
+              </a:rPr>
+              <a:t>5</a:t>
+            </a:fld>
+            <a:endParaRPr lang="vi-VN">
+              <a:solidFill>
+                <a:prstClr val="black"/>
+              </a:solidFill>
+            </a:endParaRPr>
+          </a:p>
+        </p:txBody>
+      </p:sp>
+    </p:spTree>
+    <p:extLst>
+      <p:ext uri="{BB962C8B-B14F-4D97-AF65-F5344CB8AC3E}">
+        <p14:creationId xmlns:p14="http://schemas.microsoft.com/office/powerpoint/2010/main" val="1591223447"/>
+      </p:ext>
+    </p:extLst>
   </p:cSld>
   <p:clrMapOvr>
     <a:masterClrMapping/>
@@ -1096,6 +1198,7 @@
           <a:p>
             <a:fld id="{57843E3B-2D41-45B5-8308-A22CC26B131A}" type="datetime1">
               <a:rPr lang="en-US" smtClean="0"/>
+              <a:t>3/13/2018</a:t>
             </a:fld>
             <a:endParaRPr lang="en-US"/>
           </a:p>
@@ -1141,6 +1244,7 @@
           <a:p>
             <a:fld id="{441BF3E4-0CA8-4285-94DC-B5457A2A1DF6}" type="slidenum">
               <a:rPr lang="en-US" smtClean="0"/>
+              <a:t>‹#›</a:t>
             </a:fld>
             <a:endParaRPr lang="en-US"/>
           </a:p>
@@ -1214,7 +1318,6 @@
               <a:rPr lang="en-US" smtClean="0"/>
               <a:t>Click to edit Master text styles</a:t>
             </a:r>
-            <a:endParaRPr lang="en-US" smtClean="0"/>
           </a:p>
           <a:p>
             <a:pPr lvl="1"/>
@@ -1222,7 +1325,6 @@
               <a:rPr lang="en-US" smtClean="0"/>
               <a:t>Second level</a:t>
             </a:r>
-            <a:endParaRPr lang="en-US" smtClean="0"/>
           </a:p>
           <a:p>
             <a:pPr lvl="2"/>
@@ -1230,7 +1332,6 @@
               <a:rPr lang="en-US" smtClean="0"/>
               <a:t>Third level</a:t>
             </a:r>
-            <a:endParaRPr lang="en-US" smtClean="0"/>
           </a:p>
           <a:p>
             <a:pPr lvl="3"/>
@@ -1238,7 +1339,6 @@
               <a:rPr lang="en-US" smtClean="0"/>
               <a:t>Fourth level</a:t>
             </a:r>
-            <a:endParaRPr lang="en-US" smtClean="0"/>
           </a:p>
           <a:p>
             <a:pPr lvl="4"/>
@@ -1267,6 +1367,7 @@
           <a:p>
             <a:fld id="{83644E8E-E1C9-425A-8622-E178101C66C3}" type="datetime1">
               <a:rPr lang="en-US" smtClean="0"/>
+              <a:t>3/13/2018</a:t>
             </a:fld>
             <a:endParaRPr lang="en-US"/>
           </a:p>
@@ -1312,6 +1413,7 @@
           <a:p>
             <a:fld id="{441BF3E4-0CA8-4285-94DC-B5457A2A1DF6}" type="slidenum">
               <a:rPr lang="en-US" smtClean="0"/>
+              <a:t>‹#›</a:t>
             </a:fld>
             <a:endParaRPr lang="en-US"/>
           </a:p>
@@ -1395,7 +1497,6 @@
               <a:rPr lang="en-US" smtClean="0"/>
               <a:t>Click to edit Master text styles</a:t>
             </a:r>
-            <a:endParaRPr lang="en-US" smtClean="0"/>
           </a:p>
           <a:p>
             <a:pPr lvl="1"/>
@@ -1403,7 +1504,6 @@
               <a:rPr lang="en-US" smtClean="0"/>
               <a:t>Second level</a:t>
             </a:r>
-            <a:endParaRPr lang="en-US" smtClean="0"/>
           </a:p>
           <a:p>
             <a:pPr lvl="2"/>
@@ -1411,7 +1511,6 @@
               <a:rPr lang="en-US" smtClean="0"/>
               <a:t>Third level</a:t>
             </a:r>
-            <a:endParaRPr lang="en-US" smtClean="0"/>
           </a:p>
           <a:p>
             <a:pPr lvl="3"/>
@@ -1419,7 +1518,6 @@
               <a:rPr lang="en-US" smtClean="0"/>
               <a:t>Fourth level</a:t>
             </a:r>
-            <a:endParaRPr lang="en-US" smtClean="0"/>
           </a:p>
           <a:p>
             <a:pPr lvl="4"/>
@@ -1448,6 +1546,7 @@
           <a:p>
             <a:fld id="{2733FD58-BFC4-4D8C-8B65-98128402B886}" type="datetime1">
               <a:rPr lang="en-US" smtClean="0"/>
+              <a:t>3/13/2018</a:t>
             </a:fld>
             <a:endParaRPr lang="en-US"/>
           </a:p>
@@ -1493,6 +1592,7 @@
           <a:p>
             <a:fld id="{441BF3E4-0CA8-4285-94DC-B5457A2A1DF6}" type="slidenum">
               <a:rPr lang="en-US" smtClean="0"/>
+              <a:t>‹#›</a:t>
             </a:fld>
             <a:endParaRPr lang="en-US"/>
           </a:p>
@@ -1566,7 +1666,6 @@
               <a:rPr lang="en-US" smtClean="0"/>
               <a:t>Click to edit Master text styles</a:t>
             </a:r>
-            <a:endParaRPr lang="en-US" smtClean="0"/>
           </a:p>
           <a:p>
             <a:pPr lvl="1"/>
@@ -1574,7 +1673,6 @@
               <a:rPr lang="en-US" smtClean="0"/>
               <a:t>Second level</a:t>
             </a:r>
-            <a:endParaRPr lang="en-US" smtClean="0"/>
           </a:p>
           <a:p>
             <a:pPr lvl="2"/>
@@ -1582,7 +1680,6 @@
               <a:rPr lang="en-US" smtClean="0"/>
               <a:t>Third level</a:t>
             </a:r>
-            <a:endParaRPr lang="en-US" smtClean="0"/>
           </a:p>
           <a:p>
             <a:pPr lvl="3"/>
@@ -1590,7 +1687,6 @@
               <a:rPr lang="en-US" smtClean="0"/>
               <a:t>Fourth level</a:t>
             </a:r>
-            <a:endParaRPr lang="en-US" smtClean="0"/>
           </a:p>
           <a:p>
             <a:pPr lvl="4"/>
@@ -1619,6 +1715,7 @@
           <a:p>
             <a:fld id="{4C9D577A-C555-4047-8599-27F8672B5A9B}" type="datetime1">
               <a:rPr lang="en-US" smtClean="0"/>
+              <a:t>3/13/2018</a:t>
             </a:fld>
             <a:endParaRPr lang="en-US"/>
           </a:p>
@@ -1664,6 +1761,7 @@
           <a:p>
             <a:fld id="{441BF3E4-0CA8-4285-94DC-B5457A2A1DF6}" type="slidenum">
               <a:rPr lang="en-US" smtClean="0"/>
+              <a:t>‹#›</a:t>
             </a:fld>
             <a:endParaRPr lang="en-US"/>
           </a:p>
@@ -1842,7 +1940,6 @@
               <a:rPr lang="en-US" smtClean="0"/>
               <a:t>Click to edit Master text styles</a:t>
             </a:r>
-            <a:endParaRPr lang="en-US" smtClean="0"/>
           </a:p>
         </p:txBody>
       </p:sp>
@@ -1863,6 +1960,7 @@
           <a:p>
             <a:fld id="{28612BB8-5967-4A73-A6F4-4383ECD464AA}" type="datetime1">
               <a:rPr lang="en-US" smtClean="0"/>
+              <a:t>3/13/2018</a:t>
             </a:fld>
             <a:endParaRPr lang="en-US"/>
           </a:p>
@@ -1908,6 +2006,7 @@
           <a:p>
             <a:fld id="{441BF3E4-0CA8-4285-94DC-B5457A2A1DF6}" type="slidenum">
               <a:rPr lang="en-US" smtClean="0"/>
+              <a:t>‹#›</a:t>
             </a:fld>
             <a:endParaRPr lang="en-US"/>
           </a:p>
@@ -1986,7 +2085,6 @@
               <a:rPr lang="en-US" smtClean="0"/>
               <a:t>Click to edit Master text styles</a:t>
             </a:r>
-            <a:endParaRPr lang="en-US" smtClean="0"/>
           </a:p>
           <a:p>
             <a:pPr lvl="1"/>
@@ -1994,7 +2092,6 @@
               <a:rPr lang="en-US" smtClean="0"/>
               <a:t>Second level</a:t>
             </a:r>
-            <a:endParaRPr lang="en-US" smtClean="0"/>
           </a:p>
           <a:p>
             <a:pPr lvl="2"/>
@@ -2002,7 +2099,6 @@
               <a:rPr lang="en-US" smtClean="0"/>
               <a:t>Third level</a:t>
             </a:r>
-            <a:endParaRPr lang="en-US" smtClean="0"/>
           </a:p>
           <a:p>
             <a:pPr lvl="3"/>
@@ -2010,7 +2106,6 @@
               <a:rPr lang="en-US" smtClean="0"/>
               <a:t>Fourth level</a:t>
             </a:r>
-            <a:endParaRPr lang="en-US" smtClean="0"/>
           </a:p>
           <a:p>
             <a:pPr lvl="4"/>
@@ -2047,7 +2142,6 @@
               <a:rPr lang="en-US" smtClean="0"/>
               <a:t>Click to edit Master text styles</a:t>
             </a:r>
-            <a:endParaRPr lang="en-US" smtClean="0"/>
           </a:p>
           <a:p>
             <a:pPr lvl="1"/>
@@ -2055,7 +2149,6 @@
               <a:rPr lang="en-US" smtClean="0"/>
               <a:t>Second level</a:t>
             </a:r>
-            <a:endParaRPr lang="en-US" smtClean="0"/>
           </a:p>
           <a:p>
             <a:pPr lvl="2"/>
@@ -2063,7 +2156,6 @@
               <a:rPr lang="en-US" smtClean="0"/>
               <a:t>Third level</a:t>
             </a:r>
-            <a:endParaRPr lang="en-US" smtClean="0"/>
           </a:p>
           <a:p>
             <a:pPr lvl="3"/>
@@ -2071,7 +2163,6 @@
               <a:rPr lang="en-US" smtClean="0"/>
               <a:t>Fourth level</a:t>
             </a:r>
-            <a:endParaRPr lang="en-US" smtClean="0"/>
           </a:p>
           <a:p>
             <a:pPr lvl="4"/>
@@ -2100,6 +2191,7 @@
           <a:p>
             <a:fld id="{F8B2B2ED-5E4D-4394-AE56-A0A91AFA2E75}" type="datetime1">
               <a:rPr lang="en-US" smtClean="0"/>
+              <a:t>3/13/2018</a:t>
             </a:fld>
             <a:endParaRPr lang="en-US"/>
           </a:p>
@@ -2145,6 +2237,7 @@
           <a:p>
             <a:fld id="{441BF3E4-0CA8-4285-94DC-B5457A2A1DF6}" type="slidenum">
               <a:rPr lang="en-US" smtClean="0"/>
+              <a:t>‹#›</a:t>
             </a:fld>
             <a:endParaRPr lang="en-US"/>
           </a:p>
@@ -2265,7 +2358,6 @@
               <a:rPr lang="en-US" smtClean="0"/>
               <a:t>Click to edit Master text styles</a:t>
             </a:r>
-            <a:endParaRPr lang="en-US" smtClean="0"/>
           </a:p>
         </p:txBody>
       </p:sp>
@@ -2294,7 +2386,6 @@
               <a:rPr lang="en-US" smtClean="0"/>
               <a:t>Click to edit Master text styles</a:t>
             </a:r>
-            <a:endParaRPr lang="en-US" smtClean="0"/>
           </a:p>
           <a:p>
             <a:pPr lvl="1"/>
@@ -2302,7 +2393,6 @@
               <a:rPr lang="en-US" smtClean="0"/>
               <a:t>Second level</a:t>
             </a:r>
-            <a:endParaRPr lang="en-US" smtClean="0"/>
           </a:p>
           <a:p>
             <a:pPr lvl="2"/>
@@ -2310,7 +2400,6 @@
               <a:rPr lang="en-US" smtClean="0"/>
               <a:t>Third level</a:t>
             </a:r>
-            <a:endParaRPr lang="en-US" smtClean="0"/>
           </a:p>
           <a:p>
             <a:pPr lvl="3"/>
@@ -2318,7 +2407,6 @@
               <a:rPr lang="en-US" smtClean="0"/>
               <a:t>Fourth level</a:t>
             </a:r>
-            <a:endParaRPr lang="en-US" smtClean="0"/>
           </a:p>
           <a:p>
             <a:pPr lvl="4"/>
@@ -2392,7 +2480,6 @@
               <a:rPr lang="en-US" smtClean="0"/>
               <a:t>Click to edit Master text styles</a:t>
             </a:r>
-            <a:endParaRPr lang="en-US" smtClean="0"/>
           </a:p>
         </p:txBody>
       </p:sp>
@@ -2421,7 +2508,6 @@
               <a:rPr lang="en-US" smtClean="0"/>
               <a:t>Click to edit Master text styles</a:t>
             </a:r>
-            <a:endParaRPr lang="en-US" smtClean="0"/>
           </a:p>
           <a:p>
             <a:pPr lvl="1"/>
@@ -2429,7 +2515,6 @@
               <a:rPr lang="en-US" smtClean="0"/>
               <a:t>Second level</a:t>
             </a:r>
-            <a:endParaRPr lang="en-US" smtClean="0"/>
           </a:p>
           <a:p>
             <a:pPr lvl="2"/>
@@ -2437,7 +2522,6 @@
               <a:rPr lang="en-US" smtClean="0"/>
               <a:t>Third level</a:t>
             </a:r>
-            <a:endParaRPr lang="en-US" smtClean="0"/>
           </a:p>
           <a:p>
             <a:pPr lvl="3"/>
@@ -2445,7 +2529,6 @@
               <a:rPr lang="en-US" smtClean="0"/>
               <a:t>Fourth level</a:t>
             </a:r>
-            <a:endParaRPr lang="en-US" smtClean="0"/>
           </a:p>
           <a:p>
             <a:pPr lvl="4"/>
@@ -2474,6 +2557,7 @@
           <a:p>
             <a:fld id="{36A732D0-6C61-4355-803A-D77B2B2155DD}" type="datetime1">
               <a:rPr lang="en-US" smtClean="0"/>
+              <a:t>3/13/2018</a:t>
             </a:fld>
             <a:endParaRPr lang="en-US"/>
           </a:p>
@@ -2519,6 +2603,7 @@
           <a:p>
             <a:fld id="{441BF3E4-0CA8-4285-94DC-B5457A2A1DF6}" type="slidenum">
               <a:rPr lang="en-US" smtClean="0"/>
+              <a:t>‹#›</a:t>
             </a:fld>
             <a:endParaRPr lang="en-US"/>
           </a:p>
@@ -2589,6 +2674,7 @@
           <a:p>
             <a:fld id="{2887CDC5-5117-42E9-82C7-95D82324F93E}" type="datetime1">
               <a:rPr lang="en-US" smtClean="0"/>
+              <a:t>3/13/2018</a:t>
             </a:fld>
             <a:endParaRPr lang="en-US"/>
           </a:p>
@@ -2634,6 +2720,7 @@
           <a:p>
             <a:fld id="{441BF3E4-0CA8-4285-94DC-B5457A2A1DF6}" type="slidenum">
               <a:rPr lang="en-US" smtClean="0"/>
+              <a:t>‹#›</a:t>
             </a:fld>
             <a:endParaRPr lang="en-US"/>
           </a:p>
@@ -2681,6 +2768,7 @@
           <a:p>
             <a:fld id="{0459332C-0CAA-40C4-A1E0-D91EB938B5D9}" type="datetime1">
               <a:rPr lang="en-US" smtClean="0"/>
+              <a:t>3/13/2018</a:t>
             </a:fld>
             <a:endParaRPr lang="en-US"/>
           </a:p>
@@ -2726,6 +2814,7 @@
           <a:p>
             <a:fld id="{441BF3E4-0CA8-4285-94DC-B5457A2A1DF6}" type="slidenum">
               <a:rPr lang="en-US" smtClean="0"/>
+              <a:t>‹#›</a:t>
             </a:fld>
             <a:endParaRPr lang="en-US"/>
           </a:p>
@@ -2841,7 +2930,6 @@
               <a:rPr lang="en-US" smtClean="0"/>
               <a:t>Click to edit Master text styles</a:t>
             </a:r>
-            <a:endParaRPr lang="en-US" smtClean="0"/>
           </a:p>
           <a:p>
             <a:pPr lvl="1"/>
@@ -2849,7 +2937,6 @@
               <a:rPr lang="en-US" smtClean="0"/>
               <a:t>Second level</a:t>
             </a:r>
-            <a:endParaRPr lang="en-US" smtClean="0"/>
           </a:p>
           <a:p>
             <a:pPr lvl="2"/>
@@ -2857,7 +2944,6 @@
               <a:rPr lang="en-US" smtClean="0"/>
               <a:t>Third level</a:t>
             </a:r>
-            <a:endParaRPr lang="en-US" smtClean="0"/>
           </a:p>
           <a:p>
             <a:pPr lvl="3"/>
@@ -2865,7 +2951,6 @@
               <a:rPr lang="en-US" smtClean="0"/>
               <a:t>Fourth level</a:t>
             </a:r>
-            <a:endParaRPr lang="en-US" smtClean="0"/>
           </a:p>
           <a:p>
             <a:pPr lvl="4"/>
@@ -2939,7 +3024,6 @@
               <a:rPr lang="en-US" smtClean="0"/>
               <a:t>Click to edit Master text styles</a:t>
             </a:r>
-            <a:endParaRPr lang="en-US" smtClean="0"/>
           </a:p>
         </p:txBody>
       </p:sp>
@@ -2960,6 +3044,7 @@
           <a:p>
             <a:fld id="{70E76B4D-C069-48F1-B2DD-8A8F89BDA716}" type="datetime1">
               <a:rPr lang="en-US" smtClean="0"/>
+              <a:t>3/13/2018</a:t>
             </a:fld>
             <a:endParaRPr lang="en-US"/>
           </a:p>
@@ -3005,6 +3090,7 @@
           <a:p>
             <a:fld id="{441BF3E4-0CA8-4285-94DC-B5457A2A1DF6}" type="slidenum">
               <a:rPr lang="en-US" smtClean="0"/>
+              <a:t>‹#›</a:t>
             </a:fld>
             <a:endParaRPr lang="en-US"/>
           </a:p>
@@ -3190,7 +3276,6 @@
               <a:rPr lang="en-US" smtClean="0"/>
               <a:t>Click to edit Master text styles</a:t>
             </a:r>
-            <a:endParaRPr lang="en-US" smtClean="0"/>
           </a:p>
         </p:txBody>
       </p:sp>
@@ -3211,6 +3296,7 @@
           <a:p>
             <a:fld id="{7A9A29D8-8095-4B56-B282-8FDA4C5DCFFC}" type="datetime1">
               <a:rPr lang="en-US" smtClean="0"/>
+              <a:t>3/13/2018</a:t>
             </a:fld>
             <a:endParaRPr lang="en-US"/>
           </a:p>
@@ -3256,6 +3342,7 @@
           <a:p>
             <a:fld id="{441BF3E4-0CA8-4285-94DC-B5457A2A1DF6}" type="slidenum">
               <a:rPr lang="en-US" smtClean="0"/>
+              <a:t>‹#›</a:t>
             </a:fld>
             <a:endParaRPr lang="en-US"/>
           </a:p>
@@ -3354,7 +3441,6 @@
               <a:rPr lang="en-US" smtClean="0"/>
               <a:t>Click to edit Master text styles</a:t>
             </a:r>
-            <a:endParaRPr lang="en-US" smtClean="0"/>
           </a:p>
           <a:p>
             <a:pPr lvl="1"/>
@@ -3362,7 +3448,6 @@
               <a:rPr lang="en-US" smtClean="0"/>
               <a:t>Second level</a:t>
             </a:r>
-            <a:endParaRPr lang="en-US" smtClean="0"/>
           </a:p>
           <a:p>
             <a:pPr lvl="2"/>
@@ -3370,7 +3455,6 @@
               <a:rPr lang="en-US" smtClean="0"/>
               <a:t>Third level</a:t>
             </a:r>
-            <a:endParaRPr lang="en-US" smtClean="0"/>
           </a:p>
           <a:p>
             <a:pPr lvl="3"/>
@@ -3378,7 +3462,6 @@
               <a:rPr lang="en-US" smtClean="0"/>
               <a:t>Fourth level</a:t>
             </a:r>
-            <a:endParaRPr lang="en-US" smtClean="0"/>
           </a:p>
           <a:p>
             <a:pPr lvl="4"/>
@@ -3425,6 +3508,7 @@
           <a:p>
             <a:fld id="{265B18C2-D0C8-4837-89F4-FB5823145B08}" type="datetime1">
               <a:rPr lang="en-US" smtClean="0"/>
+              <a:t>3/13/2018</a:t>
             </a:fld>
             <a:endParaRPr lang="en-US"/>
           </a:p>
@@ -3506,6 +3590,7 @@
           <a:p>
             <a:fld id="{441BF3E4-0CA8-4285-94DC-B5457A2A1DF6}" type="slidenum">
               <a:rPr lang="en-US" smtClean="0"/>
+              <a:t>‹#›</a:t>
             </a:fld>
             <a:endParaRPr lang="en-US"/>
           </a:p>
@@ -3878,6 +3963,16 @@
               </a:rPr>
               <a:t>Ngữ cảnh </a:t>
             </a:r>
+            <a:r>
+              <a:rPr lang="en-US" sz="1400" smtClean="0">
+                <a:solidFill>
+                  <a:prstClr val="black"/>
+                </a:solidFill>
+                <a:latin typeface="Arial" panose="020B0604020202020204" pitchFamily="34" charset="0"/>
+                <a:cs typeface="Arial" panose="020B0604020202020204" pitchFamily="34" charset="0"/>
+              </a:rPr>
+              <a:t/>
+            </a:r>
             <a:br>
               <a:rPr lang="en-US" sz="1400" smtClean="0">
                 <a:solidFill>
@@ -3917,13 +4012,6 @@
               </a:rPr>
               <a:t>đang kinh doanh bán Laptop với 3 cửa hàng và các thông tin cần quản lý bao gồm : Tên, Đơn giá Bán, Đơn giá Nhập, Hình. </a:t>
             </a:r>
-            <a:endParaRPr lang="en-US" sz="1400" smtClean="0">
-              <a:solidFill>
-                <a:prstClr val="black"/>
-              </a:solidFill>
-              <a:latin typeface="Arial" panose="020B0604020202020204" pitchFamily="34" charset="0"/>
-              <a:cs typeface="Arial" panose="020B0604020202020204" pitchFamily="34" charset="0"/>
-            </a:endParaRPr>
           </a:p>
           <a:p>
             <a:pPr fontAlgn="auto">
@@ -4172,20 +4260,7 @@
                 <a:cs typeface="Arial" panose="020B0604020202020204" pitchFamily="34" charset="0"/>
                 <a:sym typeface="+mn-ea"/>
               </a:rPr>
-              <a:t>, mỗi cửa hàng có 1 nhân viên, 2</a:t>
-            </a:r>
-            <a:r>
-              <a:rPr lang="en-US" sz="1400" b="1" smtClean="0">
-                <a:solidFill>
-                  <a:schemeClr val="accent2">
-                    <a:lumMod val="50000"/>
-                  </a:schemeClr>
-                </a:solidFill>
-                <a:latin typeface="Arial" panose="020B0604020202020204" pitchFamily="34" charset="0"/>
-                <a:cs typeface="Arial" panose="020B0604020202020204" pitchFamily="34" charset="0"/>
-                <a:sym typeface="+mn-ea"/>
-              </a:rPr>
-              <a:t> </a:t>
+              <a:t>, mỗi cửa hàng có 1 nhân viên, 2 </a:t>
             </a:r>
             <a:r>
               <a:rPr lang="en-US" sz="1400" smtClean="0">
@@ -4446,13 +4521,6 @@
               </a:rPr>
               <a:t>Đặt hàng</a:t>
             </a:r>
-            <a:endParaRPr lang="en-US" sz="1400" smtClean="0">
-              <a:solidFill>
-                <a:srgbClr val="FF0000"/>
-              </a:solidFill>
-              <a:latin typeface="Arial" panose="020B0604020202020204" pitchFamily="34" charset="0"/>
-              <a:cs typeface="Arial" panose="020B0604020202020204" pitchFamily="34" charset="0"/>
-            </a:endParaRPr>
           </a:p>
           <a:p>
             <a:pPr>
@@ -4593,14 +4661,6 @@
               </a:rPr>
               <a:t> tình trạng laptop đã giao.</a:t>
             </a:r>
-            <a:endParaRPr lang="en-US" sz="1400" smtClean="0">
-              <a:solidFill>
-                <a:srgbClr val="002060"/>
-              </a:solidFill>
-              <a:latin typeface="Arial" panose="020B0604020202020204" pitchFamily="34" charset="0"/>
-              <a:cs typeface="Arial" panose="020B0604020202020204" pitchFamily="34" charset="0"/>
-              <a:sym typeface="+mn-ea"/>
-            </a:endParaRPr>
           </a:p>
           <a:p>
             <a:pPr>
@@ -4784,6 +4844,16 @@
               </a:rPr>
               <a:t> </a:t>
             </a:r>
+            <a:r>
+              <a:rPr lang="en-US" sz="1400" b="1" smtClean="0">
+                <a:solidFill>
+                  <a:srgbClr val="002060"/>
+                </a:solidFill>
+                <a:latin typeface="Arial" panose="020B0604020202020204" pitchFamily="34" charset="0"/>
+                <a:cs typeface="Arial" panose="020B0604020202020204" pitchFamily="34" charset="0"/>
+              </a:rPr>
+              <a:t/>
+            </a:r>
             <a:br>
               <a:rPr lang="en-US" sz="1400" b="1" smtClean="0">
                 <a:solidFill>
@@ -5004,13 +5074,6 @@
               </a:rPr>
               <a:t> </a:t>
             </a:r>
-            <a:endParaRPr lang="en-US" sz="1400" smtClean="0">
-              <a:solidFill>
-                <a:srgbClr val="002060"/>
-              </a:solidFill>
-              <a:latin typeface="Arial" panose="020B0604020202020204" pitchFamily="34" charset="0"/>
-              <a:cs typeface="Arial" panose="020B0604020202020204" pitchFamily="34" charset="0"/>
-            </a:endParaRPr>
           </a:p>
           <a:p>
             <a:pPr>
@@ -5073,6 +5136,16 @@
               </a:rPr>
               <a:t>chính mình   </a:t>
             </a:r>
+            <a:r>
+              <a:rPr lang="en-US" sz="1400" b="1" smtClean="0">
+                <a:solidFill>
+                  <a:srgbClr val="002060"/>
+                </a:solidFill>
+                <a:latin typeface="Arial" panose="020B0604020202020204" pitchFamily="34" charset="0"/>
+                <a:cs typeface="Arial" panose="020B0604020202020204" pitchFamily="34" charset="0"/>
+              </a:rPr>
+              <a:t/>
+            </a:r>
             <a:br>
               <a:rPr lang="en-US" sz="1400" b="1" smtClean="0">
                 <a:solidFill>
@@ -5119,6 +5192,13 @@
                 <a:cs typeface="Arial" panose="020B0604020202020204" pitchFamily="34" charset="0"/>
               </a:rPr>
               <a:t>theo Phiếu Bán </a:t>
+            </a:r>
+            <a:r>
+              <a:rPr lang="en-US" sz="1400" smtClean="0">
+                <a:latin typeface="Arial" panose="020B0604020202020204" pitchFamily="34" charset="0"/>
+                <a:cs typeface="Arial" panose="020B0604020202020204" pitchFamily="34" charset="0"/>
+              </a:rPr>
+              <a:t/>
             </a:r>
             <a:br>
               <a:rPr lang="en-US" sz="1400" smtClean="0">
@@ -5209,6 +5289,16 @@
                 <a:sym typeface="+mn-ea"/>
               </a:rPr>
               <a:t>Phiếu đặt</a:t>
+            </a:r>
+            <a:r>
+              <a:rPr lang="en-US" sz="1400" b="1" smtClean="0">
+                <a:solidFill>
+                  <a:srgbClr val="002060"/>
+                </a:solidFill>
+                <a:latin typeface="Arial" panose="020B0604020202020204" pitchFamily="34" charset="0"/>
+                <a:cs typeface="Arial" panose="020B0604020202020204" pitchFamily="34" charset="0"/>
+              </a:rPr>
+              <a:t/>
             </a:r>
             <a:br>
               <a:rPr lang="en-US" sz="1400" b="1" smtClean="0">
@@ -5265,6 +5355,16 @@
                 <a:cs typeface="Arial" panose="020B0604020202020204" pitchFamily="34" charset="0"/>
               </a:rPr>
               <a:t>theo phiếu đặt</a:t>
+            </a:r>
+            <a:r>
+              <a:rPr lang="en-US" sz="1400" b="1" smtClean="0">
+                <a:solidFill>
+                  <a:srgbClr val="002060"/>
+                </a:solidFill>
+                <a:latin typeface="Arial" panose="020B0604020202020204" pitchFamily="34" charset="0"/>
+                <a:cs typeface="Arial" panose="020B0604020202020204" pitchFamily="34" charset="0"/>
+              </a:rPr>
+              <a:t/>
             </a:r>
             <a:br>
               <a:rPr lang="en-US" sz="1400" b="1" smtClean="0">
@@ -5593,7 +5693,7 @@
       <p:sp>
         <p:nvSpPr>
           <p:cNvPr id="69" name="Rounded Rectangle 68">
-            <a:hlinkClick r:id="rId1" action="ppaction://hlinksldjump"/>
+            <a:hlinkClick r:id="rId3" action="ppaction://hlinksldjump"/>
           </p:cNvPr>
           <p:cNvSpPr/>
           <p:nvPr/>
@@ -5702,13 +5802,6 @@
               </a:rPr>
               <a:t>)</a:t>
             </a:r>
-            <a:endParaRPr lang="en-US" sz="1600" smtClean="0">
-              <a:solidFill>
-                <a:prstClr val="white"/>
-              </a:solidFill>
-              <a:latin typeface="Arial" panose="020B0604020202020204" pitchFamily="34" charset="0"/>
-              <a:cs typeface="Arial" panose="020B0604020202020204" pitchFamily="34" charset="0"/>
-            </a:endParaRPr>
           </a:p>
           <a:p>
             <a:pPr algn="ctr"/>
@@ -5770,9 +5863,6 @@
               </a:rPr>
               <a:t>Phiếu bán</a:t>
             </a:r>
-            <a:endParaRPr lang="en-US" sz="1400" b="1">
-              <a:sym typeface="+mn-ea"/>
-            </a:endParaRPr>
           </a:p>
           <a:p>
             <a:pPr fontAlgn="auto">
@@ -6006,13 +6096,6 @@
               </a:rPr>
               <a:t>......</a:t>
             </a:r>
-            <a:endParaRPr lang="en-US" sz="1200" smtClean="0">
-              <a:solidFill>
-                <a:prstClr val="black"/>
-              </a:solidFill>
-              <a:latin typeface="Arial" panose="020B0604020202020204" pitchFamily="34" charset="0"/>
-              <a:cs typeface="Arial" panose="020B0604020202020204" pitchFamily="34" charset="0"/>
-            </a:endParaRPr>
           </a:p>
           <a:p>
             <a:pPr fontAlgn="auto">
@@ -6034,13 +6117,6 @@
               </a:rPr>
               <a:t>......</a:t>
             </a:r>
-            <a:endParaRPr lang="en-US" sz="1200" smtClean="0">
-              <a:solidFill>
-                <a:prstClr val="black"/>
-              </a:solidFill>
-              <a:latin typeface="Arial" panose="020B0604020202020204" pitchFamily="34" charset="0"/>
-              <a:cs typeface="Arial" panose="020B0604020202020204" pitchFamily="34" charset="0"/>
-            </a:endParaRPr>
           </a:p>
           <a:p>
             <a:pPr algn="r"/>
@@ -6126,55 +6202,49 @@
           <a:bodyPr wrap="square" rtlCol="0">
             <a:spAutoFit/>
           </a:bodyPr>
+          <a:lstStyle/>
           <a:p>
             <a:pPr algn="ctr"/>
             <a:r>
               <a:rPr lang="en-US" sz="1200" b="1"/>
               <a:t>Phiếu đặt</a:t>
             </a:r>
-            <a:endParaRPr lang="en-US" sz="1200" b="1"/>
           </a:p>
           <a:p>
             <a:r>
               <a:rPr lang="en-US" sz="1200"/>
               <a:t>Họ tên: ...  Điện thoại:....</a:t>
             </a:r>
-            <a:endParaRPr lang="en-US" sz="1200"/>
           </a:p>
           <a:p>
             <a:r>
               <a:rPr lang="en-US" sz="1200"/>
               <a:t>Địa chỉ:.... Email:....</a:t>
             </a:r>
-            <a:endParaRPr lang="en-US" sz="1200"/>
           </a:p>
           <a:p>
             <a:r>
               <a:rPr lang="en-US" sz="1200"/>
               <a:t>Ngày đặt.... Ngày giao:....</a:t>
             </a:r>
-            <a:endParaRPr lang="en-US" sz="1200"/>
           </a:p>
           <a:p>
             <a:r>
               <a:rPr lang="en-US" sz="1200"/>
               <a:t>Mặt hàng Sốlượng Đơn giá Tiền</a:t>
             </a:r>
-            <a:endParaRPr lang="en-US" sz="1200"/>
           </a:p>
           <a:p>
             <a:r>
               <a:rPr lang="en-US" sz="1200"/>
               <a:t>....</a:t>
             </a:r>
-            <a:endParaRPr lang="en-US" sz="1200"/>
           </a:p>
           <a:p>
             <a:r>
               <a:rPr lang="en-US" sz="1200"/>
               <a:t>....</a:t>
             </a:r>
-            <a:endParaRPr lang="en-US" sz="1200"/>
           </a:p>
           <a:p>
             <a:pPr algn="r"/>
@@ -6182,7 +6252,6 @@
               <a:rPr lang="en-US" sz="1200"/>
               <a:t>Tổng tiền:....</a:t>
             </a:r>
-            <a:endParaRPr lang="en-US" sz="1200"/>
           </a:p>
           <a:p>
             <a:pPr algn="r"/>
@@ -6190,7 +6259,6 @@
               <a:rPr lang="en-US" sz="1200"/>
               <a:t>Họ tên Quản lý:...</a:t>
             </a:r>
-            <a:endParaRPr lang="en-US" sz="1200"/>
           </a:p>
           <a:p>
             <a:pPr algn="r"/>
@@ -6198,7 +6266,6 @@
               <a:rPr lang="en-US" sz="1200"/>
               <a:t>Họ tên NV giao hàng:...</a:t>
             </a:r>
-            <a:endParaRPr lang="en-US" sz="1200"/>
           </a:p>
         </p:txBody>
       </p:sp>
@@ -6237,7 +6304,7 @@
       <p:sp>
         <p:nvSpPr>
           <p:cNvPr id="69" name="Rounded Rectangle 68">
-            <a:hlinkClick r:id="rId1" action="ppaction://hlinksldjump"/>
+            <a:hlinkClick r:id="rId3" action="ppaction://hlinksldjump"/>
           </p:cNvPr>
           <p:cNvSpPr/>
           <p:nvPr/>
@@ -6587,6 +6654,16 @@
                 </a:rPr>
                 <a:t>Du_lieu</a:t>
               </a:r>
+              <a:r>
+                <a:rPr lang="en-US" sz="1400" smtClean="0">
+                  <a:solidFill>
+                    <a:srgbClr val="002060"/>
+                  </a:solidFill>
+                  <a:latin typeface="Arial" panose="020B0604020202020204" pitchFamily="34" charset="0"/>
+                  <a:cs typeface="Arial" panose="020B0604020202020204" pitchFamily="34" charset="0"/>
+                </a:rPr>
+                <a:t/>
+              </a:r>
               <a:br>
                 <a:rPr lang="en-US" sz="1400" smtClean="0">
                   <a:solidFill>
@@ -6605,6 +6682,16 @@
                   <a:cs typeface="Arial" panose="020B0604020202020204" pitchFamily="34" charset="0"/>
                 </a:rPr>
                 <a:t> Cong_ty</a:t>
+              </a:r>
+              <a:r>
+                <a:rPr lang="en-US" sz="1400" b="1" smtClean="0">
+                  <a:solidFill>
+                    <a:srgbClr val="002060"/>
+                  </a:solidFill>
+                  <a:latin typeface="Arial" panose="020B0604020202020204" pitchFamily="34" charset="0"/>
+                  <a:cs typeface="Arial" panose="020B0604020202020204" pitchFamily="34" charset="0"/>
+                </a:rPr>
+                <a:t/>
               </a:r>
               <a:br>
                 <a:rPr lang="en-US" sz="1400" b="1" smtClean="0">
@@ -7035,6 +7122,230 @@
                 </a:rPr>
                 <a:t>Ma_so,Ten</a:t>
               </a:r>
+            </a:p>
+            <a:p>
+              <a:r>
+                <a:rPr lang="en-US" sz="1200" smtClean="0">
+                  <a:latin typeface="Arial" panose="020B0604020202020204" pitchFamily="34" charset="0"/>
+                  <a:cs typeface="Arial" panose="020B0604020202020204" pitchFamily="34" charset="0"/>
+                </a:rPr>
+                <a:t>     Danh_sach_Nhom_Lap_top:</a:t>
+              </a:r>
+            </a:p>
+            <a:p>
+              <a:r>
+                <a:rPr lang="en-US" sz="1200" smtClean="0">
+                  <a:latin typeface="Arial" panose="020B0604020202020204" pitchFamily="34" charset="0"/>
+                  <a:cs typeface="Arial" panose="020B0604020202020204" pitchFamily="34" charset="0"/>
+                </a:rPr>
+                <a:t>       * Nhom_Lap_top:Ma_so,Ten</a:t>
+              </a:r>
+            </a:p>
+            <a:p>
+              <a:r>
+                <a:rPr lang="en-US" sz="1200" smtClean="0">
+                  <a:latin typeface="Arial" panose="020B0604020202020204" pitchFamily="34" charset="0"/>
+                  <a:cs typeface="Arial" panose="020B0604020202020204" pitchFamily="34" charset="0"/>
+                </a:rPr>
+                <a:t>     Danh_sach_Mau_sac:</a:t>
+              </a:r>
+            </a:p>
+            <a:p>
+              <a:r>
+                <a:rPr lang="en-US" sz="1200" smtClean="0">
+                  <a:latin typeface="Arial" panose="020B0604020202020204" pitchFamily="34" charset="0"/>
+                  <a:cs typeface="Arial" panose="020B0604020202020204" pitchFamily="34" charset="0"/>
+                </a:rPr>
+                <a:t>       * Mau_sac:Ma_so,Ten</a:t>
+              </a:r>
+            </a:p>
+            <a:p>
+              <a:r>
+                <a:rPr lang="en-US" sz="1200" smtClean="0">
+                  <a:latin typeface="Arial" panose="020B0604020202020204" pitchFamily="34" charset="0"/>
+                  <a:cs typeface="Arial" panose="020B0604020202020204" pitchFamily="34" charset="0"/>
+                </a:rPr>
+                <a:t>     Danh_sach_Tinh_nang:</a:t>
+              </a:r>
+            </a:p>
+            <a:p>
+              <a:r>
+                <a:rPr lang="en-US" sz="1200" smtClean="0">
+                  <a:latin typeface="Arial" panose="020B0604020202020204" pitchFamily="34" charset="0"/>
+                  <a:cs typeface="Arial" panose="020B0604020202020204" pitchFamily="34" charset="0"/>
+                </a:rPr>
+                <a:t>       * Tinh_nang:Ma_so,Ten</a:t>
+              </a:r>
+            </a:p>
+            <a:p>
+              <a:r>
+                <a:rPr lang="en-US" sz="1200" smtClean="0">
+                  <a:latin typeface="Arial" panose="020B0604020202020204" pitchFamily="34" charset="0"/>
+                  <a:cs typeface="Arial" panose="020B0604020202020204" pitchFamily="34" charset="0"/>
+                </a:rPr>
+                <a:t>     Danh_sach_CPU_Series:</a:t>
+              </a:r>
+            </a:p>
+            <a:p>
+              <a:r>
+                <a:rPr lang="en-US" sz="1200" smtClean="0">
+                  <a:latin typeface="Arial" panose="020B0604020202020204" pitchFamily="34" charset="0"/>
+                  <a:cs typeface="Arial" panose="020B0604020202020204" pitchFamily="34" charset="0"/>
+                </a:rPr>
+                <a:t>       * CPU_Series:Ma_so,Ten</a:t>
+              </a:r>
+            </a:p>
+            <a:p>
+              <a:r>
+                <a:rPr lang="en-US" sz="1200" smtClean="0">
+                  <a:latin typeface="Arial" panose="020B0604020202020204" pitchFamily="34" charset="0"/>
+                  <a:cs typeface="Arial" panose="020B0604020202020204" pitchFamily="34" charset="0"/>
+                </a:rPr>
+                <a:t>     Danh_sach_Card_Man_hinh_Ngoai:</a:t>
+              </a:r>
+            </a:p>
+            <a:p>
+              <a:r>
+                <a:rPr lang="en-US" sz="1200" smtClean="0">
+                  <a:latin typeface="Arial" panose="020B0604020202020204" pitchFamily="34" charset="0"/>
+                  <a:cs typeface="Arial" panose="020B0604020202020204" pitchFamily="34" charset="0"/>
+                </a:rPr>
+                <a:t>       * Card_Man_hinh_Ngoai:Ma_so,Ten</a:t>
+              </a:r>
+            </a:p>
+            <a:p>
+              <a:r>
+                <a:rPr lang="en-US" sz="1200" smtClean="0">
+                  <a:latin typeface="Arial" panose="020B0604020202020204" pitchFamily="34" charset="0"/>
+                  <a:cs typeface="Arial" panose="020B0604020202020204" pitchFamily="34" charset="0"/>
+                </a:rPr>
+                <a:t>     Danh_sach_Chuan_Man_hinh:</a:t>
+              </a:r>
+            </a:p>
+            <a:p>
+              <a:r>
+                <a:rPr lang="en-US" sz="1200" smtClean="0">
+                  <a:latin typeface="Arial" panose="020B0604020202020204" pitchFamily="34" charset="0"/>
+                  <a:cs typeface="Arial" panose="020B0604020202020204" pitchFamily="34" charset="0"/>
+                </a:rPr>
+                <a:t>       * Chuan_Man_hinh:Ma_so,Ten</a:t>
+              </a:r>
+            </a:p>
+            <a:p>
+              <a:r>
+                <a:rPr lang="en-US" sz="1200" smtClean="0">
+                  <a:latin typeface="Arial" panose="020B0604020202020204" pitchFamily="34" charset="0"/>
+                  <a:cs typeface="Arial" panose="020B0604020202020204" pitchFamily="34" charset="0"/>
+                </a:rPr>
+                <a:t>     Danh_sach_Kich_thuoc_Man_hinh:</a:t>
+              </a:r>
+            </a:p>
+            <a:p>
+              <a:r>
+                <a:rPr lang="en-US" sz="1200" smtClean="0">
+                  <a:latin typeface="Arial" panose="020B0604020202020204" pitchFamily="34" charset="0"/>
+                  <a:cs typeface="Arial" panose="020B0604020202020204" pitchFamily="34" charset="0"/>
+                </a:rPr>
+                <a:t>       * Kich_thuoc_Man_hinh:Ma_so,Ten</a:t>
+              </a:r>
+            </a:p>
+            <a:p>
+              <a:r>
+                <a:rPr lang="en-US" sz="1200" smtClean="0">
+                  <a:latin typeface="Arial" panose="020B0604020202020204" pitchFamily="34" charset="0"/>
+                  <a:cs typeface="Arial" panose="020B0604020202020204" pitchFamily="34" charset="0"/>
+                </a:rPr>
+                <a:t>     Danh_sach_Dung_luong_Ram:</a:t>
+              </a:r>
+            </a:p>
+            <a:p>
+              <a:r>
+                <a:rPr lang="en-US" sz="1200" smtClean="0">
+                  <a:latin typeface="Arial" panose="020B0604020202020204" pitchFamily="34" charset="0"/>
+                  <a:cs typeface="Arial" panose="020B0604020202020204" pitchFamily="34" charset="0"/>
+                </a:rPr>
+                <a:t>       * Dung_luong_Ram:Ma_so,Ten</a:t>
+              </a:r>
+            </a:p>
+            <a:p>
+              <a:r>
+                <a:rPr lang="en-US" sz="1200" smtClean="0">
+                  <a:latin typeface="Arial" panose="020B0604020202020204" pitchFamily="34" charset="0"/>
+                  <a:cs typeface="Arial" panose="020B0604020202020204" pitchFamily="34" charset="0"/>
+                </a:rPr>
+                <a:t>     Danh_sach_HDD:</a:t>
+              </a:r>
+            </a:p>
+            <a:p>
+              <a:r>
+                <a:rPr lang="en-US" sz="1200" smtClean="0">
+                  <a:latin typeface="Arial" panose="020B0604020202020204" pitchFamily="34" charset="0"/>
+                  <a:cs typeface="Arial" panose="020B0604020202020204" pitchFamily="34" charset="0"/>
+                </a:rPr>
+                <a:t>       * HDD:Ma_so,Ten</a:t>
+              </a:r>
+            </a:p>
+            <a:p>
+              <a:r>
+                <a:rPr lang="en-US" sz="1200" smtClean="0">
+                  <a:latin typeface="Arial" panose="020B0604020202020204" pitchFamily="34" charset="0"/>
+                  <a:cs typeface="Arial" panose="020B0604020202020204" pitchFamily="34" charset="0"/>
+                </a:rPr>
+                <a:t>     Danh_sach_SDD:</a:t>
+              </a:r>
+            </a:p>
+            <a:p>
+              <a:r>
+                <a:rPr lang="en-US" sz="1200" smtClean="0">
+                  <a:latin typeface="Arial" panose="020B0604020202020204" pitchFamily="34" charset="0"/>
+                  <a:cs typeface="Arial" panose="020B0604020202020204" pitchFamily="34" charset="0"/>
+                </a:rPr>
+                <a:t>       * SSD:Ma_so,Ten</a:t>
+              </a:r>
+            </a:p>
+            <a:p>
+              <a:r>
+                <a:rPr lang="en-US" sz="1200" smtClean="0">
+                  <a:latin typeface="Arial" panose="020B0604020202020204" pitchFamily="34" charset="0"/>
+                  <a:cs typeface="Arial" panose="020B0604020202020204" pitchFamily="34" charset="0"/>
+                </a:rPr>
+                <a:t>     Danh_sach_Cua_hang:</a:t>
+              </a:r>
+            </a:p>
+            <a:p>
+              <a:r>
+                <a:rPr lang="en-US" sz="1200" smtClean="0">
+                  <a:latin typeface="Arial" panose="020B0604020202020204" pitchFamily="34" charset="0"/>
+                  <a:cs typeface="Arial" panose="020B0604020202020204" pitchFamily="34" charset="0"/>
+                </a:rPr>
+                <a:t>       * Cua_hang:Ma_so,Ten, Dia_chi, So_dien_thoai</a:t>
+              </a:r>
+            </a:p>
+            <a:p>
+              <a:r>
+                <a:rPr lang="en-US" sz="1200" smtClean="0">
+                  <a:latin typeface="Arial" panose="020B0604020202020204" pitchFamily="34" charset="0"/>
+                  <a:cs typeface="Arial" panose="020B0604020202020204" pitchFamily="34" charset="0"/>
+                </a:rPr>
+                <a:t>     Danh_sach_Nhan_vien:</a:t>
+              </a:r>
+            </a:p>
+            <a:p>
+              <a:r>
+                <a:rPr lang="en-US" sz="1200" smtClean="0">
+                  <a:latin typeface="Arial" panose="020B0604020202020204" pitchFamily="34" charset="0"/>
+                  <a:cs typeface="Arial" panose="020B0604020202020204" pitchFamily="34" charset="0"/>
+                </a:rPr>
+                <a:t>       * </a:t>
+              </a:r>
+              <a:r>
+                <a:rPr lang="en-US" sz="1200" smtClean="0">
+                  <a:latin typeface="Arial" panose="020B0604020202020204" pitchFamily="34" charset="0"/>
+                  <a:cs typeface="Arial" panose="020B0604020202020204" pitchFamily="34" charset="0"/>
+                  <a:sym typeface="+mn-ea"/>
+                </a:rPr>
+                <a:t>Nhan_vien :Ma_so,Ho_ten,Ten_Dang_nhap,Mat_khau</a:t>
+              </a:r>
               <a:endParaRPr lang="en-US" sz="1200" smtClean="0">
                 <a:latin typeface="Arial" panose="020B0604020202020204" pitchFamily="34" charset="0"/>
                 <a:cs typeface="Arial" panose="020B0604020202020204" pitchFamily="34" charset="0"/>
@@ -7045,8 +7356,9 @@
                 <a:rPr lang="en-US" sz="1200" smtClean="0">
                   <a:latin typeface="Arial" panose="020B0604020202020204" pitchFamily="34" charset="0"/>
                   <a:cs typeface="Arial" panose="020B0604020202020204" pitchFamily="34" charset="0"/>
-                </a:rPr>
-                <a:t>     Danh_sach_Nhom_Lap_top:</a:t>
+                  <a:sym typeface="+mn-ea"/>
+                </a:rPr>
+                <a:t>          Nhom_Nhan_vien:Ma_so,Ten</a:t>
               </a:r>
               <a:endParaRPr lang="en-US" sz="1200" smtClean="0">
                 <a:latin typeface="Arial" panose="020B0604020202020204" pitchFamily="34" charset="0"/>
@@ -7058,8 +7370,9 @@
                 <a:rPr lang="en-US" sz="1200" smtClean="0">
                   <a:latin typeface="Arial" panose="020B0604020202020204" pitchFamily="34" charset="0"/>
                   <a:cs typeface="Arial" panose="020B0604020202020204" pitchFamily="34" charset="0"/>
-                </a:rPr>
-                <a:t>       * Nhom_Lap_top:Ma_so,Ten</a:t>
+                  <a:sym typeface="+mn-ea"/>
+                </a:rPr>
+                <a:t>          Cua_hang:Ma_so,Ten, Dia_chi, So_dien_thoai</a:t>
               </a:r>
               <a:endParaRPr lang="en-US" sz="1200" smtClean="0">
                 <a:latin typeface="Arial" panose="020B0604020202020204" pitchFamily="34" charset="0"/>
@@ -7071,8 +7384,9 @@
                 <a:rPr lang="en-US" sz="1200" smtClean="0">
                   <a:latin typeface="Arial" panose="020B0604020202020204" pitchFamily="34" charset="0"/>
                   <a:cs typeface="Arial" panose="020B0604020202020204" pitchFamily="34" charset="0"/>
-                </a:rPr>
-                <a:t>     Danh_sach_Mau_sac:</a:t>
+                  <a:sym typeface="+mn-ea"/>
+                </a:rPr>
+                <a:t>          Danh_sach_Nhom_Lap_top:</a:t>
               </a:r>
               <a:endParaRPr lang="en-US" sz="1200" smtClean="0">
                 <a:latin typeface="Arial" panose="020B0604020202020204" pitchFamily="34" charset="0"/>
@@ -7084,26 +7398,20 @@
                 <a:rPr lang="en-US" sz="1200" smtClean="0">
                   <a:latin typeface="Arial" panose="020B0604020202020204" pitchFamily="34" charset="0"/>
                   <a:cs typeface="Arial" panose="020B0604020202020204" pitchFamily="34" charset="0"/>
-                </a:rPr>
-                <a:t>       * Mau_sac:Ma_so,Ten</a:t>
-              </a:r>
-              <a:endParaRPr lang="en-US" sz="1200" smtClean="0">
-                <a:latin typeface="Arial" panose="020B0604020202020204" pitchFamily="34" charset="0"/>
-                <a:cs typeface="Arial" panose="020B0604020202020204" pitchFamily="34" charset="0"/>
-              </a:endParaRPr>
+                  <a:sym typeface="+mn-ea"/>
+                </a:rPr>
+                <a:t>           * Nhom_Lap_top:Ma_so,Ten</a:t>
+              </a:r>
             </a:p>
             <a:p>
               <a:r>
                 <a:rPr lang="en-US" sz="1200" smtClean="0">
                   <a:latin typeface="Arial" panose="020B0604020202020204" pitchFamily="34" charset="0"/>
                   <a:cs typeface="Arial" panose="020B0604020202020204" pitchFamily="34" charset="0"/>
-                </a:rPr>
-                <a:t>     Danh_sach_Tinh_nang:</a:t>
-              </a:r>
-              <a:endParaRPr lang="en-US" sz="1200" smtClean="0">
-                <a:latin typeface="Arial" panose="020B0604020202020204" pitchFamily="34" charset="0"/>
-                <a:cs typeface="Arial" panose="020B0604020202020204" pitchFamily="34" charset="0"/>
-              </a:endParaRPr>
+                  <a:sym typeface="+mn-ea"/>
+                </a:rPr>
+                <a:t>Quan_ly: Ma_so,Ho_ten,Ten_Dang_nhap,Mat_khau</a:t>
+              </a:r>
             </a:p>
             <a:p>
               <a:r>
@@ -7111,339 +7419,8 @@
                   <a:latin typeface="Arial" panose="020B0604020202020204" pitchFamily="34" charset="0"/>
                   <a:cs typeface="Arial" panose="020B0604020202020204" pitchFamily="34" charset="0"/>
                 </a:rPr>
-                <a:t>       * Tinh_nang:Ma_so,Ten</a:t>
-              </a:r>
-              <a:endParaRPr lang="en-US" sz="1200" smtClean="0">
-                <a:latin typeface="Arial" panose="020B0604020202020204" pitchFamily="34" charset="0"/>
-                <a:cs typeface="Arial" panose="020B0604020202020204" pitchFamily="34" charset="0"/>
-              </a:endParaRPr>
-            </a:p>
-            <a:p>
-              <a:r>
-                <a:rPr lang="en-US" sz="1200" smtClean="0">
-                  <a:latin typeface="Arial" panose="020B0604020202020204" pitchFamily="34" charset="0"/>
-                  <a:cs typeface="Arial" panose="020B0604020202020204" pitchFamily="34" charset="0"/>
-                </a:rPr>
-                <a:t>     Danh_sach_CPU_Series:</a:t>
-              </a:r>
-              <a:endParaRPr lang="en-US" sz="1200" smtClean="0">
-                <a:latin typeface="Arial" panose="020B0604020202020204" pitchFamily="34" charset="0"/>
-                <a:cs typeface="Arial" panose="020B0604020202020204" pitchFamily="34" charset="0"/>
-              </a:endParaRPr>
-            </a:p>
-            <a:p>
-              <a:r>
-                <a:rPr lang="en-US" sz="1200" smtClean="0">
-                  <a:latin typeface="Arial" panose="020B0604020202020204" pitchFamily="34" charset="0"/>
-                  <a:cs typeface="Arial" panose="020B0604020202020204" pitchFamily="34" charset="0"/>
-                </a:rPr>
-                <a:t>       * CPU_Series:Ma_so,Ten</a:t>
-              </a:r>
-              <a:endParaRPr lang="en-US" sz="1200" smtClean="0">
-                <a:latin typeface="Arial" panose="020B0604020202020204" pitchFamily="34" charset="0"/>
-                <a:cs typeface="Arial" panose="020B0604020202020204" pitchFamily="34" charset="0"/>
-              </a:endParaRPr>
-            </a:p>
-            <a:p>
-              <a:r>
-                <a:rPr lang="en-US" sz="1200" smtClean="0">
-                  <a:latin typeface="Arial" panose="020B0604020202020204" pitchFamily="34" charset="0"/>
-                  <a:cs typeface="Arial" panose="020B0604020202020204" pitchFamily="34" charset="0"/>
-                </a:rPr>
-                <a:t>     Danh_sach_Card_Man_hinh_Ngoai:</a:t>
-              </a:r>
-              <a:endParaRPr lang="en-US" sz="1200" smtClean="0">
-                <a:latin typeface="Arial" panose="020B0604020202020204" pitchFamily="34" charset="0"/>
-                <a:cs typeface="Arial" panose="020B0604020202020204" pitchFamily="34" charset="0"/>
-              </a:endParaRPr>
-            </a:p>
-            <a:p>
-              <a:r>
-                <a:rPr lang="en-US" sz="1200" smtClean="0">
-                  <a:latin typeface="Arial" panose="020B0604020202020204" pitchFamily="34" charset="0"/>
-                  <a:cs typeface="Arial" panose="020B0604020202020204" pitchFamily="34" charset="0"/>
-                </a:rPr>
-                <a:t>       * Card_Man_hinh_Ngoai:Ma_so,Ten</a:t>
-              </a:r>
-              <a:endParaRPr lang="en-US" sz="1200" smtClean="0">
-                <a:latin typeface="Arial" panose="020B0604020202020204" pitchFamily="34" charset="0"/>
-                <a:cs typeface="Arial" panose="020B0604020202020204" pitchFamily="34" charset="0"/>
-              </a:endParaRPr>
-            </a:p>
-            <a:p>
-              <a:r>
-                <a:rPr lang="en-US" sz="1200" smtClean="0">
-                  <a:latin typeface="Arial" panose="020B0604020202020204" pitchFamily="34" charset="0"/>
-                  <a:cs typeface="Arial" panose="020B0604020202020204" pitchFamily="34" charset="0"/>
-                </a:rPr>
-                <a:t>     Danh_sach_Chuan_Man_hinh:</a:t>
-              </a:r>
-              <a:endParaRPr lang="en-US" sz="1200" smtClean="0">
-                <a:latin typeface="Arial" panose="020B0604020202020204" pitchFamily="34" charset="0"/>
-                <a:cs typeface="Arial" panose="020B0604020202020204" pitchFamily="34" charset="0"/>
-              </a:endParaRPr>
-            </a:p>
-            <a:p>
-              <a:r>
-                <a:rPr lang="en-US" sz="1200" smtClean="0">
-                  <a:latin typeface="Arial" panose="020B0604020202020204" pitchFamily="34" charset="0"/>
-                  <a:cs typeface="Arial" panose="020B0604020202020204" pitchFamily="34" charset="0"/>
-                </a:rPr>
-                <a:t>       * Chuan_Man_hinh:Ma_so,Ten</a:t>
-              </a:r>
-              <a:endParaRPr lang="en-US" sz="1200" smtClean="0">
-                <a:latin typeface="Arial" panose="020B0604020202020204" pitchFamily="34" charset="0"/>
-                <a:cs typeface="Arial" panose="020B0604020202020204" pitchFamily="34" charset="0"/>
-              </a:endParaRPr>
-            </a:p>
-            <a:p>
-              <a:r>
-                <a:rPr lang="en-US" sz="1200" smtClean="0">
-                  <a:latin typeface="Arial" panose="020B0604020202020204" pitchFamily="34" charset="0"/>
-                  <a:cs typeface="Arial" panose="020B0604020202020204" pitchFamily="34" charset="0"/>
-                </a:rPr>
-                <a:t>     Danh_sach_Kich_thuoc_Man_hinh:</a:t>
-              </a:r>
-              <a:endParaRPr lang="en-US" sz="1200" smtClean="0">
-                <a:latin typeface="Arial" panose="020B0604020202020204" pitchFamily="34" charset="0"/>
-                <a:cs typeface="Arial" panose="020B0604020202020204" pitchFamily="34" charset="0"/>
-              </a:endParaRPr>
-            </a:p>
-            <a:p>
-              <a:r>
-                <a:rPr lang="en-US" sz="1200" smtClean="0">
-                  <a:latin typeface="Arial" panose="020B0604020202020204" pitchFamily="34" charset="0"/>
-                  <a:cs typeface="Arial" panose="020B0604020202020204" pitchFamily="34" charset="0"/>
-                </a:rPr>
-                <a:t>       * Kich_thuoc_Man_hinh:Ma_so,Ten</a:t>
-              </a:r>
-              <a:endParaRPr lang="en-US" sz="1200" smtClean="0">
-                <a:latin typeface="Arial" panose="020B0604020202020204" pitchFamily="34" charset="0"/>
-                <a:cs typeface="Arial" panose="020B0604020202020204" pitchFamily="34" charset="0"/>
-              </a:endParaRPr>
-            </a:p>
-            <a:p>
-              <a:r>
-                <a:rPr lang="en-US" sz="1200" smtClean="0">
-                  <a:latin typeface="Arial" panose="020B0604020202020204" pitchFamily="34" charset="0"/>
-                  <a:cs typeface="Arial" panose="020B0604020202020204" pitchFamily="34" charset="0"/>
-                </a:rPr>
-                <a:t>     Danh_sach_Dung_luong_Ram:</a:t>
-              </a:r>
-              <a:endParaRPr lang="en-US" sz="1200" smtClean="0">
-                <a:latin typeface="Arial" panose="020B0604020202020204" pitchFamily="34" charset="0"/>
-                <a:cs typeface="Arial" panose="020B0604020202020204" pitchFamily="34" charset="0"/>
-              </a:endParaRPr>
-            </a:p>
-            <a:p>
-              <a:r>
-                <a:rPr lang="en-US" sz="1200" smtClean="0">
-                  <a:latin typeface="Arial" panose="020B0604020202020204" pitchFamily="34" charset="0"/>
-                  <a:cs typeface="Arial" panose="020B0604020202020204" pitchFamily="34" charset="0"/>
-                </a:rPr>
-                <a:t>       * Dung_luong_Ram:Ma_so,Ten</a:t>
-              </a:r>
-              <a:endParaRPr lang="en-US" sz="1200" smtClean="0">
-                <a:latin typeface="Arial" panose="020B0604020202020204" pitchFamily="34" charset="0"/>
-                <a:cs typeface="Arial" panose="020B0604020202020204" pitchFamily="34" charset="0"/>
-              </a:endParaRPr>
-            </a:p>
-            <a:p>
-              <a:r>
-                <a:rPr lang="en-US" sz="1200" smtClean="0">
-                  <a:latin typeface="Arial" panose="020B0604020202020204" pitchFamily="34" charset="0"/>
-                  <a:cs typeface="Arial" panose="020B0604020202020204" pitchFamily="34" charset="0"/>
-                </a:rPr>
-                <a:t>     Danh_sach_HDD:</a:t>
-              </a:r>
-              <a:endParaRPr lang="en-US" sz="1200" smtClean="0">
-                <a:latin typeface="Arial" panose="020B0604020202020204" pitchFamily="34" charset="0"/>
-                <a:cs typeface="Arial" panose="020B0604020202020204" pitchFamily="34" charset="0"/>
-              </a:endParaRPr>
-            </a:p>
-            <a:p>
-              <a:r>
-                <a:rPr lang="en-US" sz="1200" smtClean="0">
-                  <a:latin typeface="Arial" panose="020B0604020202020204" pitchFamily="34" charset="0"/>
-                  <a:cs typeface="Arial" panose="020B0604020202020204" pitchFamily="34" charset="0"/>
-                </a:rPr>
-                <a:t>       * HDD:Ma_so,Ten</a:t>
-              </a:r>
-              <a:endParaRPr lang="en-US" sz="1200" smtClean="0">
-                <a:latin typeface="Arial" panose="020B0604020202020204" pitchFamily="34" charset="0"/>
-                <a:cs typeface="Arial" panose="020B0604020202020204" pitchFamily="34" charset="0"/>
-              </a:endParaRPr>
-            </a:p>
-            <a:p>
-              <a:r>
-                <a:rPr lang="en-US" sz="1200" smtClean="0">
-                  <a:latin typeface="Arial" panose="020B0604020202020204" pitchFamily="34" charset="0"/>
-                  <a:cs typeface="Arial" panose="020B0604020202020204" pitchFamily="34" charset="0"/>
-                </a:rPr>
-                <a:t>     Danh_sach_SDD:</a:t>
-              </a:r>
-              <a:endParaRPr lang="en-US" sz="1200" smtClean="0">
-                <a:latin typeface="Arial" panose="020B0604020202020204" pitchFamily="34" charset="0"/>
-                <a:cs typeface="Arial" panose="020B0604020202020204" pitchFamily="34" charset="0"/>
-              </a:endParaRPr>
-            </a:p>
-            <a:p>
-              <a:r>
-                <a:rPr lang="en-US" sz="1200" smtClean="0">
-                  <a:latin typeface="Arial" panose="020B0604020202020204" pitchFamily="34" charset="0"/>
-                  <a:cs typeface="Arial" panose="020B0604020202020204" pitchFamily="34" charset="0"/>
-                </a:rPr>
-                <a:t>       * SSD:Ma_so,Ten</a:t>
-              </a:r>
-              <a:endParaRPr lang="en-US" sz="1200" smtClean="0">
-                <a:latin typeface="Arial" panose="020B0604020202020204" pitchFamily="34" charset="0"/>
-                <a:cs typeface="Arial" panose="020B0604020202020204" pitchFamily="34" charset="0"/>
-              </a:endParaRPr>
-            </a:p>
-            <a:p>
-              <a:r>
-                <a:rPr lang="en-US" sz="1200" smtClean="0">
-                  <a:latin typeface="Arial" panose="020B0604020202020204" pitchFamily="34" charset="0"/>
-                  <a:cs typeface="Arial" panose="020B0604020202020204" pitchFamily="34" charset="0"/>
-                </a:rPr>
-                <a:t>     Danh_sach_Cua_hang:</a:t>
-              </a:r>
-              <a:endParaRPr lang="en-US" sz="1200" smtClean="0">
-                <a:latin typeface="Arial" panose="020B0604020202020204" pitchFamily="34" charset="0"/>
-                <a:cs typeface="Arial" panose="020B0604020202020204" pitchFamily="34" charset="0"/>
-              </a:endParaRPr>
-            </a:p>
-            <a:p>
-              <a:r>
-                <a:rPr lang="en-US" sz="1200" smtClean="0">
-                  <a:latin typeface="Arial" panose="020B0604020202020204" pitchFamily="34" charset="0"/>
-                  <a:cs typeface="Arial" panose="020B0604020202020204" pitchFamily="34" charset="0"/>
-                </a:rPr>
-                <a:t>       * Cua_hang:Ma_so,Ten, Dia_chi, So_dien_thoai</a:t>
-              </a:r>
-              <a:endParaRPr lang="en-US" sz="1200" smtClean="0">
-                <a:latin typeface="Arial" panose="020B0604020202020204" pitchFamily="34" charset="0"/>
-                <a:cs typeface="Arial" panose="020B0604020202020204" pitchFamily="34" charset="0"/>
-              </a:endParaRPr>
-            </a:p>
-            <a:p>
-              <a:r>
-                <a:rPr lang="en-US" sz="1200" smtClean="0">
-                  <a:latin typeface="Arial" panose="020B0604020202020204" pitchFamily="34" charset="0"/>
-                  <a:cs typeface="Arial" panose="020B0604020202020204" pitchFamily="34" charset="0"/>
-                </a:rPr>
-                <a:t>     Danh_sach_Nhan_vien:</a:t>
-              </a:r>
-              <a:endParaRPr lang="en-US" sz="1200" smtClean="0">
-                <a:latin typeface="Arial" panose="020B0604020202020204" pitchFamily="34" charset="0"/>
-                <a:cs typeface="Arial" panose="020B0604020202020204" pitchFamily="34" charset="0"/>
-              </a:endParaRPr>
-            </a:p>
-            <a:p>
-              <a:r>
-                <a:rPr lang="en-US" sz="1200" smtClean="0">
-                  <a:latin typeface="Arial" panose="020B0604020202020204" pitchFamily="34" charset="0"/>
-                  <a:cs typeface="Arial" panose="020B0604020202020204" pitchFamily="34" charset="0"/>
-                </a:rPr>
-                <a:t>       * </a:t>
-              </a:r>
-              <a:r>
-                <a:rPr lang="en-US" sz="1200" smtClean="0">
-                  <a:latin typeface="Arial" panose="020B0604020202020204" pitchFamily="34" charset="0"/>
-                  <a:cs typeface="Arial" panose="020B0604020202020204" pitchFamily="34" charset="0"/>
-                  <a:sym typeface="+mn-ea"/>
-                </a:rPr>
-                <a:t>Nhan_vien :Ma_so,Ho_ten,Ten_Dang_nhap,Mat_khau</a:t>
-              </a:r>
-              <a:endParaRPr lang="en-US" sz="1200" smtClean="0">
-                <a:latin typeface="Arial" panose="020B0604020202020204" pitchFamily="34" charset="0"/>
-                <a:cs typeface="Arial" panose="020B0604020202020204" pitchFamily="34" charset="0"/>
-              </a:endParaRPr>
-            </a:p>
-            <a:p>
-              <a:r>
-                <a:rPr lang="en-US" sz="1200" smtClean="0">
-                  <a:latin typeface="Arial" panose="020B0604020202020204" pitchFamily="34" charset="0"/>
-                  <a:cs typeface="Arial" panose="020B0604020202020204" pitchFamily="34" charset="0"/>
-                  <a:sym typeface="+mn-ea"/>
-                </a:rPr>
-                <a:t>          Nhom_Nhan_vien:Ma_so,Ten</a:t>
-              </a:r>
-              <a:endParaRPr lang="en-US" sz="1200" smtClean="0">
-                <a:latin typeface="Arial" panose="020B0604020202020204" pitchFamily="34" charset="0"/>
-                <a:cs typeface="Arial" panose="020B0604020202020204" pitchFamily="34" charset="0"/>
-              </a:endParaRPr>
-            </a:p>
-            <a:p>
-              <a:r>
-                <a:rPr lang="en-US" sz="1200" smtClean="0">
-                  <a:latin typeface="Arial" panose="020B0604020202020204" pitchFamily="34" charset="0"/>
-                  <a:cs typeface="Arial" panose="020B0604020202020204" pitchFamily="34" charset="0"/>
-                  <a:sym typeface="+mn-ea"/>
-                </a:rPr>
-                <a:t>          Cua_hang:Ma_so,Ten, Dia_chi, So_dien_thoai</a:t>
-              </a:r>
-              <a:endParaRPr lang="en-US" sz="1200" smtClean="0">
-                <a:latin typeface="Arial" panose="020B0604020202020204" pitchFamily="34" charset="0"/>
-                <a:cs typeface="Arial" panose="020B0604020202020204" pitchFamily="34" charset="0"/>
-              </a:endParaRPr>
-            </a:p>
-            <a:p>
-              <a:r>
-                <a:rPr lang="en-US" sz="1200" smtClean="0">
-                  <a:latin typeface="Arial" panose="020B0604020202020204" pitchFamily="34" charset="0"/>
-                  <a:cs typeface="Arial" panose="020B0604020202020204" pitchFamily="34" charset="0"/>
-                  <a:sym typeface="+mn-ea"/>
-                </a:rPr>
-                <a:t>          Danh_sach_Nhom_Lap_top:</a:t>
-              </a:r>
-              <a:endParaRPr lang="en-US" sz="1200" smtClean="0">
-                <a:latin typeface="Arial" panose="020B0604020202020204" pitchFamily="34" charset="0"/>
-                <a:cs typeface="Arial" panose="020B0604020202020204" pitchFamily="34" charset="0"/>
-              </a:endParaRPr>
-            </a:p>
-            <a:p>
-              <a:r>
-                <a:rPr lang="en-US" sz="1200" smtClean="0">
-                  <a:latin typeface="Arial" panose="020B0604020202020204" pitchFamily="34" charset="0"/>
-                  <a:cs typeface="Arial" panose="020B0604020202020204" pitchFamily="34" charset="0"/>
-                  <a:sym typeface="+mn-ea"/>
-                </a:rPr>
-                <a:t>           * Nhom_Lap_top:Ma_so,Ten</a:t>
-              </a:r>
-              <a:endParaRPr lang="en-US" sz="1200" smtClean="0">
-                <a:latin typeface="Arial" panose="020B0604020202020204" pitchFamily="34" charset="0"/>
-                <a:cs typeface="Arial" panose="020B0604020202020204" pitchFamily="34" charset="0"/>
-                <a:sym typeface="+mn-ea"/>
-              </a:endParaRPr>
-            </a:p>
-            <a:p>
-              <a:r>
-                <a:rPr lang="en-US" sz="1200" smtClean="0">
-                  <a:latin typeface="Arial" panose="020B0604020202020204" pitchFamily="34" charset="0"/>
-                  <a:cs typeface="Arial" panose="020B0604020202020204" pitchFamily="34" charset="0"/>
-                  <a:sym typeface="+mn-ea"/>
-                </a:rPr>
-                <a:t>Quan_ly: Ma_so,Ho_ten,Ten_Dang_nhap,Mat_khau</a:t>
-              </a:r>
-              <a:endParaRPr lang="en-US" sz="1200" smtClean="0">
-                <a:latin typeface="Arial" panose="020B0604020202020204" pitchFamily="34" charset="0"/>
-                <a:cs typeface="Arial" panose="020B0604020202020204" pitchFamily="34" charset="0"/>
-                <a:sym typeface="+mn-ea"/>
-              </a:endParaRPr>
-            </a:p>
-            <a:p>
-              <a:r>
-                <a:rPr lang="en-US" sz="1200" smtClean="0">
-                  <a:latin typeface="Arial" panose="020B0604020202020204" pitchFamily="34" charset="0"/>
-                  <a:cs typeface="Arial" panose="020B0604020202020204" pitchFamily="34" charset="0"/>
-                </a:rPr>
                 <a:t>          Nhom_Quan_ly:Ma_so,Ten</a:t>
               </a:r>
-              <a:endParaRPr lang="en-US" sz="1200" smtClean="0">
-                <a:latin typeface="Arial" panose="020B0604020202020204" pitchFamily="34" charset="0"/>
-                <a:cs typeface="Arial" panose="020B0604020202020204" pitchFamily="34" charset="0"/>
-              </a:endParaRPr>
             </a:p>
             <a:p>
               <a:r>
@@ -7555,6 +7532,182 @@
                 </a:rPr>
                 <a:t>Ma_so,Ten,Don_gia_Ban,,Don_gia_Nhap,CPU,Loai_Ram,Card_Man_hinh_Onboard,He_dieu_hanh,Trong_luong,Bao_hanh</a:t>
               </a:r>
+            </a:p>
+            <a:p>
+              <a:r>
+                <a:rPr lang="en-US" sz="1200">
+                  <a:latin typeface="Arial" panose="020B0604020202020204" pitchFamily="34" charset="0"/>
+                  <a:cs typeface="Arial" panose="020B0604020202020204" pitchFamily="34" charset="0"/>
+                </a:rPr>
+                <a:t>          Nhom_Lap_top:Ma_so,Ten</a:t>
+              </a:r>
+            </a:p>
+            <a:p>
+              <a:r>
+                <a:rPr lang="en-US" sz="1200">
+                  <a:latin typeface="Arial" panose="020B0604020202020204" pitchFamily="34" charset="0"/>
+                  <a:cs typeface="Arial" panose="020B0604020202020204" pitchFamily="34" charset="0"/>
+                </a:rPr>
+                <a:t>          Tinh_nang:Ma_so,Ten</a:t>
+              </a:r>
+            </a:p>
+            <a:p>
+              <a:r>
+                <a:rPr lang="en-US" sz="1200">
+                  <a:latin typeface="Arial" panose="020B0604020202020204" pitchFamily="34" charset="0"/>
+                  <a:cs typeface="Arial" panose="020B0604020202020204" pitchFamily="34" charset="0"/>
+                </a:rPr>
+                <a:t>          CPU_Series:Ma_so,Ten</a:t>
+              </a:r>
+            </a:p>
+            <a:p>
+              <a:r>
+                <a:rPr lang="en-US" sz="1200">
+                  <a:latin typeface="Arial" panose="020B0604020202020204" pitchFamily="34" charset="0"/>
+                  <a:cs typeface="Arial" panose="020B0604020202020204" pitchFamily="34" charset="0"/>
+                </a:rPr>
+                <a:t>          Chuan_Man_hinh:Ma_so,Ten</a:t>
+              </a:r>
+            </a:p>
+            <a:p>
+              <a:r>
+                <a:rPr lang="en-US" sz="1200">
+                  <a:latin typeface="Arial" panose="020B0604020202020204" pitchFamily="34" charset="0"/>
+                  <a:cs typeface="Arial" panose="020B0604020202020204" pitchFamily="34" charset="0"/>
+                </a:rPr>
+                <a:t>          Mau_sac:Ma_so,Ten</a:t>
+              </a:r>
+            </a:p>
+            <a:p>
+              <a:r>
+                <a:rPr lang="en-US" sz="1200">
+                  <a:latin typeface="Arial" panose="020B0604020202020204" pitchFamily="34" charset="0"/>
+                  <a:cs typeface="Arial" panose="020B0604020202020204" pitchFamily="34" charset="0"/>
+                </a:rPr>
+                <a:t>          Kich_thuoc_Man_hinh:Ma_so,Ten</a:t>
+              </a:r>
+            </a:p>
+            <a:p>
+              <a:r>
+                <a:rPr lang="en-US" sz="1200">
+                  <a:latin typeface="Arial" panose="020B0604020202020204" pitchFamily="34" charset="0"/>
+                  <a:cs typeface="Arial" panose="020B0604020202020204" pitchFamily="34" charset="0"/>
+                </a:rPr>
+                <a:t>          Dung_luong_Ram:Ma_so,Ten</a:t>
+              </a:r>
+            </a:p>
+            <a:p>
+              <a:r>
+                <a:rPr lang="en-US" sz="1200">
+                  <a:latin typeface="Arial" panose="020B0604020202020204" pitchFamily="34" charset="0"/>
+                  <a:cs typeface="Arial" panose="020B0604020202020204" pitchFamily="34" charset="0"/>
+                </a:rPr>
+                <a:t>          Card_Man_hinh_Ngoai:Ma_so,Ten</a:t>
+              </a:r>
+            </a:p>
+            <a:p>
+              <a:r>
+                <a:rPr lang="en-US" sz="1200">
+                  <a:latin typeface="Arial" panose="020B0604020202020204" pitchFamily="34" charset="0"/>
+                  <a:cs typeface="Arial" panose="020B0604020202020204" pitchFamily="34" charset="0"/>
+                </a:rPr>
+                <a:t>          HDD:Ma_so,Ten</a:t>
+              </a:r>
+            </a:p>
+            <a:p>
+              <a:r>
+                <a:rPr lang="en-US" sz="1200">
+                  <a:latin typeface="Arial" panose="020B0604020202020204" pitchFamily="34" charset="0"/>
+                  <a:cs typeface="Arial" panose="020B0604020202020204" pitchFamily="34" charset="0"/>
+                </a:rPr>
+                <a:t>          SSD:Ma_so,Ten</a:t>
+              </a:r>
+            </a:p>
+            <a:p>
+              <a:r>
+                <a:rPr lang="en-US" sz="1200">
+                  <a:latin typeface="Arial" panose="020B0604020202020204" pitchFamily="34" charset="0"/>
+                  <a:cs typeface="Arial" panose="020B0604020202020204" pitchFamily="34" charset="0"/>
+                </a:rPr>
+                <a:t>          Danh_sach_Dat_hang:</a:t>
+              </a:r>
+            </a:p>
+            <a:p>
+              <a:r>
+                <a:rPr lang="en-US" sz="1200">
+                  <a:latin typeface="Arial" panose="020B0604020202020204" pitchFamily="34" charset="0"/>
+                  <a:cs typeface="Arial" panose="020B0604020202020204" pitchFamily="34" charset="0"/>
+                </a:rPr>
+                <a:t>            * Dat_hang : Ngay_Dat,Ngay_Phan_cong,Ngay_Thanh_toan,Ngay_Huy,So_luong,Don_gia,Tien,Cua_hang,Trang_thai</a:t>
+              </a:r>
+            </a:p>
+            <a:p>
+              <a:r>
+                <a:rPr lang="en-US" sz="1200">
+                  <a:latin typeface="Arial" panose="020B0604020202020204" pitchFamily="34" charset="0"/>
+                  <a:cs typeface="Arial" panose="020B0604020202020204" pitchFamily="34" charset="0"/>
+                </a:rPr>
+                <a:t>                  Khach_hang: Ho_ten, Dia_chi, So_Dien_thoai</a:t>
+              </a:r>
+            </a:p>
+            <a:p>
+              <a:r>
+                <a:rPr lang="en-US" sz="1200">
+                  <a:latin typeface="Arial" panose="020B0604020202020204" pitchFamily="34" charset="0"/>
+                  <a:cs typeface="Arial" panose="020B0604020202020204" pitchFamily="34" charset="0"/>
+                </a:rPr>
+                <a:t>          Danh_sach_Ban_hang:</a:t>
+              </a:r>
+            </a:p>
+            <a:p>
+              <a:r>
+                <a:rPr lang="en-US" sz="1200">
+                  <a:latin typeface="Arial" panose="020B0604020202020204" pitchFamily="34" charset="0"/>
+                  <a:cs typeface="Arial" panose="020B0604020202020204" pitchFamily="34" charset="0"/>
+                </a:rPr>
+                <a:t>            * Ban_hang : Ngay,So_luong,Don_gia,Tien</a:t>
+              </a:r>
+            </a:p>
+            <a:p>
+              <a:pPr lvl="2"/>
+              <a:r>
+                <a:rPr lang="en-US" sz="1200" smtClean="0">
+                  <a:latin typeface="Arial" panose="020B0604020202020204" pitchFamily="34" charset="0"/>
+                  <a:cs typeface="Arial" panose="020B0604020202020204" pitchFamily="34" charset="0"/>
+                  <a:sym typeface="+mn-ea"/>
+                </a:rPr>
+                <a:t>Nhan_vien :Ma_so,Ho_ten,Ten_Dang_nhap,Mat_khau</a:t>
+              </a:r>
+              <a:endParaRPr lang="en-US" sz="1200" smtClean="0">
+                <a:latin typeface="Arial" panose="020B0604020202020204" pitchFamily="34" charset="0"/>
+                <a:cs typeface="Arial" panose="020B0604020202020204" pitchFamily="34" charset="0"/>
+              </a:endParaRPr>
+            </a:p>
+            <a:p>
+              <a:pPr lvl="2"/>
+              <a:r>
+                <a:rPr lang="en-US" sz="1200" smtClean="0">
+                  <a:latin typeface="Arial" panose="020B0604020202020204" pitchFamily="34" charset="0"/>
+                  <a:cs typeface="Arial" panose="020B0604020202020204" pitchFamily="34" charset="0"/>
+                  <a:sym typeface="+mn-ea"/>
+                </a:rPr>
+                <a:t>          Nhom_Nhan_vien:Ma_so,Ten</a:t>
+              </a:r>
+              <a:endParaRPr lang="en-US" sz="1200" smtClean="0">
+                <a:latin typeface="Arial" panose="020B0604020202020204" pitchFamily="34" charset="0"/>
+                <a:cs typeface="Arial" panose="020B0604020202020204" pitchFamily="34" charset="0"/>
+              </a:endParaRPr>
+            </a:p>
+            <a:p>
+              <a:pPr lvl="2"/>
+              <a:r>
+                <a:rPr lang="en-US" sz="1200" smtClean="0">
+                  <a:latin typeface="Arial" panose="020B0604020202020204" pitchFamily="34" charset="0"/>
+                  <a:cs typeface="Arial" panose="020B0604020202020204" pitchFamily="34" charset="0"/>
+                  <a:sym typeface="+mn-ea"/>
+                </a:rPr>
+                <a:t>          Cua_hang:Ma_so,Ten, Dia_chi, So_dien_thoai</a:t>
+              </a:r>
               <a:endParaRPr lang="en-US" sz="1200">
                 <a:latin typeface="Arial" panose="020B0604020202020204" pitchFamily="34" charset="0"/>
                 <a:cs typeface="Arial" panose="020B0604020202020204" pitchFamily="34" charset="0"/>
@@ -7566,12 +7719,8 @@
                   <a:latin typeface="Arial" panose="020B0604020202020204" pitchFamily="34" charset="0"/>
                   <a:cs typeface="Arial" panose="020B0604020202020204" pitchFamily="34" charset="0"/>
                 </a:rPr>
-                <a:t>          Nhom_Lap_top:Ma_so,Ten</a:t>
-              </a:r>
-              <a:endParaRPr lang="en-US" sz="1200">
-                <a:latin typeface="Arial" panose="020B0604020202020204" pitchFamily="34" charset="0"/>
-                <a:cs typeface="Arial" panose="020B0604020202020204" pitchFamily="34" charset="0"/>
-              </a:endParaRPr>
+                <a:t>          Danh_sach_Nhap hang:</a:t>
+              </a:r>
             </a:p>
             <a:p>
               <a:r>
@@ -7579,252 +7728,8 @@
                   <a:latin typeface="Arial" panose="020B0604020202020204" pitchFamily="34" charset="0"/>
                   <a:cs typeface="Arial" panose="020B0604020202020204" pitchFamily="34" charset="0"/>
                 </a:rPr>
-                <a:t>          Tinh_nang:Ma_so,Ten</a:t>
-              </a:r>
-              <a:endParaRPr lang="en-US" sz="1200">
-                <a:latin typeface="Arial" panose="020B0604020202020204" pitchFamily="34" charset="0"/>
-                <a:cs typeface="Arial" panose="020B0604020202020204" pitchFamily="34" charset="0"/>
-              </a:endParaRPr>
-            </a:p>
-            <a:p>
-              <a:r>
-                <a:rPr lang="en-US" sz="1200">
-                  <a:latin typeface="Arial" panose="020B0604020202020204" pitchFamily="34" charset="0"/>
-                  <a:cs typeface="Arial" panose="020B0604020202020204" pitchFamily="34" charset="0"/>
-                </a:rPr>
-                <a:t>          CPU_Series:Ma_so,Ten</a:t>
-              </a:r>
-              <a:endParaRPr lang="en-US" sz="1200">
-                <a:latin typeface="Arial" panose="020B0604020202020204" pitchFamily="34" charset="0"/>
-                <a:cs typeface="Arial" panose="020B0604020202020204" pitchFamily="34" charset="0"/>
-              </a:endParaRPr>
-            </a:p>
-            <a:p>
-              <a:r>
-                <a:rPr lang="en-US" sz="1200">
-                  <a:latin typeface="Arial" panose="020B0604020202020204" pitchFamily="34" charset="0"/>
-                  <a:cs typeface="Arial" panose="020B0604020202020204" pitchFamily="34" charset="0"/>
-                </a:rPr>
-                <a:t>          Chuan_Man_hinh:Ma_so,Ten</a:t>
-              </a:r>
-              <a:endParaRPr lang="en-US" sz="1200">
-                <a:latin typeface="Arial" panose="020B0604020202020204" pitchFamily="34" charset="0"/>
-                <a:cs typeface="Arial" panose="020B0604020202020204" pitchFamily="34" charset="0"/>
-              </a:endParaRPr>
-            </a:p>
-            <a:p>
-              <a:r>
-                <a:rPr lang="en-US" sz="1200">
-                  <a:latin typeface="Arial" panose="020B0604020202020204" pitchFamily="34" charset="0"/>
-                  <a:cs typeface="Arial" panose="020B0604020202020204" pitchFamily="34" charset="0"/>
-                </a:rPr>
-                <a:t>          Mau_sac:Ma_so,Ten</a:t>
-              </a:r>
-              <a:endParaRPr lang="en-US" sz="1200">
-                <a:latin typeface="Arial" panose="020B0604020202020204" pitchFamily="34" charset="0"/>
-                <a:cs typeface="Arial" panose="020B0604020202020204" pitchFamily="34" charset="0"/>
-              </a:endParaRPr>
-            </a:p>
-            <a:p>
-              <a:r>
-                <a:rPr lang="en-US" sz="1200">
-                  <a:latin typeface="Arial" panose="020B0604020202020204" pitchFamily="34" charset="0"/>
-                  <a:cs typeface="Arial" panose="020B0604020202020204" pitchFamily="34" charset="0"/>
-                </a:rPr>
-                <a:t>          Kich_thuoc_Man_hinh:Ma_so,Ten</a:t>
-              </a:r>
-              <a:endParaRPr lang="en-US" sz="1200">
-                <a:latin typeface="Arial" panose="020B0604020202020204" pitchFamily="34" charset="0"/>
-                <a:cs typeface="Arial" panose="020B0604020202020204" pitchFamily="34" charset="0"/>
-              </a:endParaRPr>
-            </a:p>
-            <a:p>
-              <a:r>
-                <a:rPr lang="en-US" sz="1200">
-                  <a:latin typeface="Arial" panose="020B0604020202020204" pitchFamily="34" charset="0"/>
-                  <a:cs typeface="Arial" panose="020B0604020202020204" pitchFamily="34" charset="0"/>
-                </a:rPr>
-                <a:t>          Dung_luong_Ram:Ma_so,Ten</a:t>
-              </a:r>
-              <a:endParaRPr lang="en-US" sz="1200">
-                <a:latin typeface="Arial" panose="020B0604020202020204" pitchFamily="34" charset="0"/>
-                <a:cs typeface="Arial" panose="020B0604020202020204" pitchFamily="34" charset="0"/>
-              </a:endParaRPr>
-            </a:p>
-            <a:p>
-              <a:r>
-                <a:rPr lang="en-US" sz="1200">
-                  <a:latin typeface="Arial" panose="020B0604020202020204" pitchFamily="34" charset="0"/>
-                  <a:cs typeface="Arial" panose="020B0604020202020204" pitchFamily="34" charset="0"/>
-                </a:rPr>
-                <a:t>          Card_Man_hinh_Ngoai:Ma_so,Ten</a:t>
-              </a:r>
-              <a:endParaRPr lang="en-US" sz="1200">
-                <a:latin typeface="Arial" panose="020B0604020202020204" pitchFamily="34" charset="0"/>
-                <a:cs typeface="Arial" panose="020B0604020202020204" pitchFamily="34" charset="0"/>
-              </a:endParaRPr>
-            </a:p>
-            <a:p>
-              <a:r>
-                <a:rPr lang="en-US" sz="1200">
-                  <a:latin typeface="Arial" panose="020B0604020202020204" pitchFamily="34" charset="0"/>
-                  <a:cs typeface="Arial" panose="020B0604020202020204" pitchFamily="34" charset="0"/>
-                </a:rPr>
-                <a:t>          HDD:Ma_so,Ten</a:t>
-              </a:r>
-              <a:endParaRPr lang="en-US" sz="1200">
-                <a:latin typeface="Arial" panose="020B0604020202020204" pitchFamily="34" charset="0"/>
-                <a:cs typeface="Arial" panose="020B0604020202020204" pitchFamily="34" charset="0"/>
-              </a:endParaRPr>
-            </a:p>
-            <a:p>
-              <a:r>
-                <a:rPr lang="en-US" sz="1200">
-                  <a:latin typeface="Arial" panose="020B0604020202020204" pitchFamily="34" charset="0"/>
-                  <a:cs typeface="Arial" panose="020B0604020202020204" pitchFamily="34" charset="0"/>
-                </a:rPr>
-                <a:t>          SSD:Ma_so,Ten</a:t>
-              </a:r>
-              <a:endParaRPr lang="en-US" sz="1200">
-                <a:latin typeface="Arial" panose="020B0604020202020204" pitchFamily="34" charset="0"/>
-                <a:cs typeface="Arial" panose="020B0604020202020204" pitchFamily="34" charset="0"/>
-              </a:endParaRPr>
-            </a:p>
-            <a:p>
-              <a:r>
-                <a:rPr lang="en-US" sz="1200">
-                  <a:latin typeface="Arial" panose="020B0604020202020204" pitchFamily="34" charset="0"/>
-                  <a:cs typeface="Arial" panose="020B0604020202020204" pitchFamily="34" charset="0"/>
-                </a:rPr>
-                <a:t>          Danh_sach_Dat_hang:</a:t>
-              </a:r>
-              <a:endParaRPr lang="en-US" sz="1200">
-                <a:latin typeface="Arial" panose="020B0604020202020204" pitchFamily="34" charset="0"/>
-                <a:cs typeface="Arial" panose="020B0604020202020204" pitchFamily="34" charset="0"/>
-              </a:endParaRPr>
-            </a:p>
-            <a:p>
-              <a:r>
-                <a:rPr lang="en-US" sz="1200">
-                  <a:latin typeface="Arial" panose="020B0604020202020204" pitchFamily="34" charset="0"/>
-                  <a:cs typeface="Arial" panose="020B0604020202020204" pitchFamily="34" charset="0"/>
-                </a:rPr>
-                <a:t>            * Dat_hang : Ngay_Dat,Ngay_Phan_cong,Ngay_Thanh_toan,Ngay_Huy,So_luong,Don_gia,Tien,Cua_hang,Trang_thai</a:t>
-              </a:r>
-              <a:endParaRPr lang="en-US" sz="1200">
-                <a:latin typeface="Arial" panose="020B0604020202020204" pitchFamily="34" charset="0"/>
-                <a:cs typeface="Arial" panose="020B0604020202020204" pitchFamily="34" charset="0"/>
-              </a:endParaRPr>
-            </a:p>
-            <a:p>
-              <a:r>
-                <a:rPr lang="en-US" sz="1200">
-                  <a:latin typeface="Arial" panose="020B0604020202020204" pitchFamily="34" charset="0"/>
-                  <a:cs typeface="Arial" panose="020B0604020202020204" pitchFamily="34" charset="0"/>
-                </a:rPr>
-                <a:t>                  Khach_hang: Ho_ten, Dia_chi, So_Dien_thoai</a:t>
-              </a:r>
-              <a:endParaRPr lang="en-US" sz="1200">
-                <a:latin typeface="Arial" panose="020B0604020202020204" pitchFamily="34" charset="0"/>
-                <a:cs typeface="Arial" panose="020B0604020202020204" pitchFamily="34" charset="0"/>
-              </a:endParaRPr>
-            </a:p>
-            <a:p>
-              <a:r>
-                <a:rPr lang="en-US" sz="1200">
-                  <a:latin typeface="Arial" panose="020B0604020202020204" pitchFamily="34" charset="0"/>
-                  <a:cs typeface="Arial" panose="020B0604020202020204" pitchFamily="34" charset="0"/>
-                </a:rPr>
-                <a:t>          Danh_sach_Ban_hang:</a:t>
-              </a:r>
-              <a:endParaRPr lang="en-US" sz="1200">
-                <a:latin typeface="Arial" panose="020B0604020202020204" pitchFamily="34" charset="0"/>
-                <a:cs typeface="Arial" panose="020B0604020202020204" pitchFamily="34" charset="0"/>
-              </a:endParaRPr>
-            </a:p>
-            <a:p>
-              <a:r>
-                <a:rPr lang="en-US" sz="1200">
-                  <a:latin typeface="Arial" panose="020B0604020202020204" pitchFamily="34" charset="0"/>
-                  <a:cs typeface="Arial" panose="020B0604020202020204" pitchFamily="34" charset="0"/>
-                </a:rPr>
-                <a:t>            * Ban_hang : Ngay,So_luong,Don_gia,Tien</a:t>
-              </a:r>
-              <a:endParaRPr lang="en-US" sz="1200">
-                <a:latin typeface="Arial" panose="020B0604020202020204" pitchFamily="34" charset="0"/>
-                <a:cs typeface="Arial" panose="020B0604020202020204" pitchFamily="34" charset="0"/>
-              </a:endParaRPr>
-            </a:p>
-            <a:p>
-              <a:pPr lvl="2"/>
-              <a:r>
-                <a:rPr lang="en-US" sz="1200" smtClean="0">
-                  <a:latin typeface="Arial" panose="020B0604020202020204" pitchFamily="34" charset="0"/>
-                  <a:cs typeface="Arial" panose="020B0604020202020204" pitchFamily="34" charset="0"/>
-                  <a:sym typeface="+mn-ea"/>
-                </a:rPr>
-                <a:t>Nhan_vien :Ma_so,Ho_ten,Ten_Dang_nhap,Mat_khau</a:t>
-              </a:r>
-              <a:endParaRPr lang="en-US" sz="1200" smtClean="0">
-                <a:latin typeface="Arial" panose="020B0604020202020204" pitchFamily="34" charset="0"/>
-                <a:cs typeface="Arial" panose="020B0604020202020204" pitchFamily="34" charset="0"/>
-              </a:endParaRPr>
-            </a:p>
-            <a:p>
-              <a:pPr lvl="2"/>
-              <a:r>
-                <a:rPr lang="en-US" sz="1200" smtClean="0">
-                  <a:latin typeface="Arial" panose="020B0604020202020204" pitchFamily="34" charset="0"/>
-                  <a:cs typeface="Arial" panose="020B0604020202020204" pitchFamily="34" charset="0"/>
-                  <a:sym typeface="+mn-ea"/>
-                </a:rPr>
-                <a:t>          Nhom_Nhan_vien:Ma_so,Ten</a:t>
-              </a:r>
-              <a:endParaRPr lang="en-US" sz="1200" smtClean="0">
-                <a:latin typeface="Arial" panose="020B0604020202020204" pitchFamily="34" charset="0"/>
-                <a:cs typeface="Arial" panose="020B0604020202020204" pitchFamily="34" charset="0"/>
-              </a:endParaRPr>
-            </a:p>
-            <a:p>
-              <a:pPr lvl="2"/>
-              <a:r>
-                <a:rPr lang="en-US" sz="1200" smtClean="0">
-                  <a:latin typeface="Arial" panose="020B0604020202020204" pitchFamily="34" charset="0"/>
-                  <a:cs typeface="Arial" panose="020B0604020202020204" pitchFamily="34" charset="0"/>
-                  <a:sym typeface="+mn-ea"/>
-                </a:rPr>
-                <a:t>          Cua_hang:Ma_so,Ten, Dia_chi, So_dien_thoai</a:t>
-              </a:r>
-              <a:endParaRPr lang="en-US" sz="1200">
-                <a:latin typeface="Arial" panose="020B0604020202020204" pitchFamily="34" charset="0"/>
-                <a:cs typeface="Arial" panose="020B0604020202020204" pitchFamily="34" charset="0"/>
-              </a:endParaRPr>
-            </a:p>
-            <a:p>
-              <a:r>
-                <a:rPr lang="en-US" sz="1200">
-                  <a:latin typeface="Arial" panose="020B0604020202020204" pitchFamily="34" charset="0"/>
-                  <a:cs typeface="Arial" panose="020B0604020202020204" pitchFamily="34" charset="0"/>
-                </a:rPr>
-                <a:t>          Danh_sach_Nhap hang:</a:t>
-              </a:r>
-              <a:endParaRPr lang="en-US" sz="1200">
-                <a:latin typeface="Arial" panose="020B0604020202020204" pitchFamily="34" charset="0"/>
-                <a:cs typeface="Arial" panose="020B0604020202020204" pitchFamily="34" charset="0"/>
-              </a:endParaRPr>
-            </a:p>
-            <a:p>
-              <a:r>
-                <a:rPr lang="en-US" sz="1200">
-                  <a:latin typeface="Arial" panose="020B0604020202020204" pitchFamily="34" charset="0"/>
-                  <a:cs typeface="Arial" panose="020B0604020202020204" pitchFamily="34" charset="0"/>
-                </a:rPr>
                 <a:t>            * Nhap_hang : Ngay,So_luong,Don_gia,Tien</a:t>
               </a:r>
-              <a:endParaRPr lang="en-US" sz="1200">
-                <a:latin typeface="Arial" panose="020B0604020202020204" pitchFamily="34" charset="0"/>
-                <a:cs typeface="Arial" panose="020B0604020202020204" pitchFamily="34" charset="0"/>
-              </a:endParaRPr>
             </a:p>
           </p:txBody>
         </p:sp>
@@ -7864,7 +7769,7 @@
       <p:sp>
         <p:nvSpPr>
           <p:cNvPr id="69" name="Rounded Rectangle 68">
-            <a:hlinkClick r:id="rId1" action="ppaction://hlinksldjump"/>
+            <a:hlinkClick r:id="rId3" action="ppaction://hlinksldjump"/>
           </p:cNvPr>
           <p:cNvSpPr/>
           <p:nvPr/>
@@ -8743,10 +8648,6 @@
               </a:rPr>
               <a:t>Du_lieu</a:t>
             </a:r>
-            <a:endParaRPr lang="en-US" sz="1400" smtClean="0">
-              <a:latin typeface="Arial" panose="020B0604020202020204" pitchFamily="34" charset="0"/>
-              <a:cs typeface="Arial" panose="020B0604020202020204" pitchFamily="34" charset="0"/>
-            </a:endParaRPr>
           </a:p>
         </p:txBody>
       </p:sp>
@@ -8929,6 +8830,7 @@
           <a:bodyPr wrap="square" rtlCol="0">
             <a:spAutoFit/>
           </a:bodyPr>
+          <a:lstStyle/>
           <a:p>
             <a:r>
               <a:rPr lang="en-US" sz="1400" b="1" smtClean="0">
@@ -8939,6 +8841,16 @@
                 <a:cs typeface="Arial" panose="020B0604020202020204" pitchFamily="34" charset="0"/>
               </a:rPr>
               <a:t>Du_lieu</a:t>
+            </a:r>
+            <a:r>
+              <a:rPr lang="en-US" sz="1400" smtClean="0">
+                <a:solidFill>
+                  <a:srgbClr val="002060"/>
+                </a:solidFill>
+                <a:latin typeface="Arial" panose="020B0604020202020204" pitchFamily="34" charset="0"/>
+                <a:cs typeface="Arial" panose="020B0604020202020204" pitchFamily="34" charset="0"/>
+              </a:rPr>
+              <a:t/>
             </a:r>
             <a:br>
               <a:rPr lang="en-US" sz="1400" smtClean="0">
@@ -8958,6 +8870,16 @@
                 <a:cs typeface="Arial" panose="020B0604020202020204" pitchFamily="34" charset="0"/>
               </a:rPr>
               <a:t> Cong_ty</a:t>
+            </a:r>
+            <a:r>
+              <a:rPr lang="en-US" sz="1400" b="1" smtClean="0">
+                <a:solidFill>
+                  <a:srgbClr val="002060"/>
+                </a:solidFill>
+                <a:latin typeface="Arial" panose="020B0604020202020204" pitchFamily="34" charset="0"/>
+                <a:cs typeface="Arial" panose="020B0604020202020204" pitchFamily="34" charset="0"/>
+              </a:rPr>
+              <a:t/>
             </a:r>
             <a:br>
               <a:rPr lang="en-US" sz="1400" b="1" smtClean="0">
@@ -9037,6 +8959,7 @@
             <a:bodyPr wrap="square" rtlCol="0">
               <a:spAutoFit/>
             </a:bodyPr>
+            <a:lstStyle/>
             <a:p>
               <a:pPr algn="ctr"/>
               <a:r>
@@ -9081,6 +9004,7 @@
             <a:bodyPr wrap="square" rtlCol="0">
               <a:spAutoFit/>
             </a:bodyPr>
+            <a:lstStyle/>
             <a:p>
               <a:r>
                 <a:rPr lang="en-US" sz="1200" smtClean="0">
@@ -9089,10 +9013,6 @@
                 </a:rPr>
                 <a:t>Ma_so,Ten</a:t>
               </a:r>
-              <a:endParaRPr lang="en-US" sz="1200" smtClean="0">
-                <a:latin typeface="Arial" panose="020B0604020202020204" pitchFamily="34" charset="0"/>
-                <a:cs typeface="Arial" panose="020B0604020202020204" pitchFamily="34" charset="0"/>
-              </a:endParaRPr>
             </a:p>
             <a:p>
               <a:r>
@@ -9102,10 +9022,6 @@
                 </a:rPr>
                 <a:t>     Danh_sach_Nhom_Lap_top:</a:t>
               </a:r>
-              <a:endParaRPr lang="en-US" sz="1200" smtClean="0">
-                <a:latin typeface="Arial" panose="020B0604020202020204" pitchFamily="34" charset="0"/>
-                <a:cs typeface="Arial" panose="020B0604020202020204" pitchFamily="34" charset="0"/>
-              </a:endParaRPr>
             </a:p>
             <a:p>
               <a:r>
@@ -9115,10 +9031,6 @@
                 </a:rPr>
                 <a:t>       * Nhom_Lap_top:Ma_so,Ten</a:t>
               </a:r>
-              <a:endParaRPr lang="en-US" sz="1200" smtClean="0">
-                <a:latin typeface="Arial" panose="020B0604020202020204" pitchFamily="34" charset="0"/>
-                <a:cs typeface="Arial" panose="020B0604020202020204" pitchFamily="34" charset="0"/>
-              </a:endParaRPr>
             </a:p>
             <a:p>
               <a:r>
@@ -9128,10 +9040,6 @@
                 </a:rPr>
                 <a:t>     Danh_sach_Mau_sac:</a:t>
               </a:r>
-              <a:endParaRPr lang="en-US" sz="1200" smtClean="0">
-                <a:latin typeface="Arial" panose="020B0604020202020204" pitchFamily="34" charset="0"/>
-                <a:cs typeface="Arial" panose="020B0604020202020204" pitchFamily="34" charset="0"/>
-              </a:endParaRPr>
             </a:p>
             <a:p>
               <a:r>
@@ -9141,10 +9049,6 @@
                 </a:rPr>
                 <a:t>       * Mau_sac:Ma_so,Ten</a:t>
               </a:r>
-              <a:endParaRPr lang="en-US" sz="1200" smtClean="0">
-                <a:latin typeface="Arial" panose="020B0604020202020204" pitchFamily="34" charset="0"/>
-                <a:cs typeface="Arial" panose="020B0604020202020204" pitchFamily="34" charset="0"/>
-              </a:endParaRPr>
             </a:p>
             <a:p>
               <a:r>
@@ -9154,10 +9058,6 @@
                 </a:rPr>
                 <a:t>     Danh_sach_Tinh_nang:</a:t>
               </a:r>
-              <a:endParaRPr lang="en-US" sz="1200" smtClean="0">
-                <a:latin typeface="Arial" panose="020B0604020202020204" pitchFamily="34" charset="0"/>
-                <a:cs typeface="Arial" panose="020B0604020202020204" pitchFamily="34" charset="0"/>
-              </a:endParaRPr>
             </a:p>
             <a:p>
               <a:r>
@@ -9167,10 +9067,6 @@
                 </a:rPr>
                 <a:t>       * Tinh_nang:Ma_so,Ten</a:t>
               </a:r>
-              <a:endParaRPr lang="en-US" sz="1200" smtClean="0">
-                <a:latin typeface="Arial" panose="020B0604020202020204" pitchFamily="34" charset="0"/>
-                <a:cs typeface="Arial" panose="020B0604020202020204" pitchFamily="34" charset="0"/>
-              </a:endParaRPr>
             </a:p>
             <a:p>
               <a:r>
@@ -9180,10 +9076,6 @@
                 </a:rPr>
                 <a:t>     Danh_sach_CPU_Series:</a:t>
               </a:r>
-              <a:endParaRPr lang="en-US" sz="1200" smtClean="0">
-                <a:latin typeface="Arial" panose="020B0604020202020204" pitchFamily="34" charset="0"/>
-                <a:cs typeface="Arial" panose="020B0604020202020204" pitchFamily="34" charset="0"/>
-              </a:endParaRPr>
             </a:p>
             <a:p>
               <a:r>
@@ -9193,10 +9085,6 @@
                 </a:rPr>
                 <a:t>       * CPU_Series:Ma_so,Ten</a:t>
               </a:r>
-              <a:endParaRPr lang="en-US" sz="1200" smtClean="0">
-                <a:latin typeface="Arial" panose="020B0604020202020204" pitchFamily="34" charset="0"/>
-                <a:cs typeface="Arial" panose="020B0604020202020204" pitchFamily="34" charset="0"/>
-              </a:endParaRPr>
             </a:p>
             <a:p>
               <a:r>
@@ -9206,10 +9094,6 @@
                 </a:rPr>
                 <a:t>     Danh_sach_Card_Man_hinh_Ngoai:</a:t>
               </a:r>
-              <a:endParaRPr lang="en-US" sz="1200" smtClean="0">
-                <a:latin typeface="Arial" panose="020B0604020202020204" pitchFamily="34" charset="0"/>
-                <a:cs typeface="Arial" panose="020B0604020202020204" pitchFamily="34" charset="0"/>
-              </a:endParaRPr>
             </a:p>
             <a:p>
               <a:r>
@@ -9219,10 +9103,6 @@
                 </a:rPr>
                 <a:t>       * Card_Man_hinh_Ngoai:Ma_so,Ten</a:t>
               </a:r>
-              <a:endParaRPr lang="en-US" sz="1200" smtClean="0">
-                <a:latin typeface="Arial" panose="020B0604020202020204" pitchFamily="34" charset="0"/>
-                <a:cs typeface="Arial" panose="020B0604020202020204" pitchFamily="34" charset="0"/>
-              </a:endParaRPr>
             </a:p>
             <a:p>
               <a:r>
@@ -9232,10 +9112,6 @@
                 </a:rPr>
                 <a:t>     Danh_sach_Chuan_Man_hinh:</a:t>
               </a:r>
-              <a:endParaRPr lang="en-US" sz="1200" smtClean="0">
-                <a:latin typeface="Arial" panose="020B0604020202020204" pitchFamily="34" charset="0"/>
-                <a:cs typeface="Arial" panose="020B0604020202020204" pitchFamily="34" charset="0"/>
-              </a:endParaRPr>
             </a:p>
             <a:p>
               <a:r>
@@ -9245,10 +9121,6 @@
                 </a:rPr>
                 <a:t>       * Chuan_Man_hinh:Ma_so,Ten</a:t>
               </a:r>
-              <a:endParaRPr lang="en-US" sz="1200" smtClean="0">
-                <a:latin typeface="Arial" panose="020B0604020202020204" pitchFamily="34" charset="0"/>
-                <a:cs typeface="Arial" panose="020B0604020202020204" pitchFamily="34" charset="0"/>
-              </a:endParaRPr>
             </a:p>
             <a:p>
               <a:r>
@@ -9258,10 +9130,6 @@
                 </a:rPr>
                 <a:t>     Danh_sach_Kich_thuoc_Man_hinh:</a:t>
               </a:r>
-              <a:endParaRPr lang="en-US" sz="1200" smtClean="0">
-                <a:latin typeface="Arial" panose="020B0604020202020204" pitchFamily="34" charset="0"/>
-                <a:cs typeface="Arial" panose="020B0604020202020204" pitchFamily="34" charset="0"/>
-              </a:endParaRPr>
             </a:p>
             <a:p>
               <a:r>
@@ -9271,10 +9139,6 @@
                 </a:rPr>
                 <a:t>       * Kich_thuoc_Man_hinh:Ma_so,Ten</a:t>
               </a:r>
-              <a:endParaRPr lang="en-US" sz="1200" smtClean="0">
-                <a:latin typeface="Arial" panose="020B0604020202020204" pitchFamily="34" charset="0"/>
-                <a:cs typeface="Arial" panose="020B0604020202020204" pitchFamily="34" charset="0"/>
-              </a:endParaRPr>
             </a:p>
             <a:p>
               <a:r>
@@ -9284,10 +9148,6 @@
                 </a:rPr>
                 <a:t>     Danh_sach_Dung_luong_Ram:</a:t>
               </a:r>
-              <a:endParaRPr lang="en-US" sz="1200" smtClean="0">
-                <a:latin typeface="Arial" panose="020B0604020202020204" pitchFamily="34" charset="0"/>
-                <a:cs typeface="Arial" panose="020B0604020202020204" pitchFamily="34" charset="0"/>
-              </a:endParaRPr>
             </a:p>
             <a:p>
               <a:r>
@@ -9297,10 +9157,6 @@
                 </a:rPr>
                 <a:t>       * Dung_luong_Ram:Ma_so,Ten</a:t>
               </a:r>
-              <a:endParaRPr lang="en-US" sz="1200" smtClean="0">
-                <a:latin typeface="Arial" panose="020B0604020202020204" pitchFamily="34" charset="0"/>
-                <a:cs typeface="Arial" panose="020B0604020202020204" pitchFamily="34" charset="0"/>
-              </a:endParaRPr>
             </a:p>
             <a:p>
               <a:r>
@@ -9310,10 +9166,6 @@
                 </a:rPr>
                 <a:t>     Danh_sach_HDD:</a:t>
               </a:r>
-              <a:endParaRPr lang="en-US" sz="1200" smtClean="0">
-                <a:latin typeface="Arial" panose="020B0604020202020204" pitchFamily="34" charset="0"/>
-                <a:cs typeface="Arial" panose="020B0604020202020204" pitchFamily="34" charset="0"/>
-              </a:endParaRPr>
             </a:p>
             <a:p>
               <a:r>
@@ -9323,10 +9175,6 @@
                 </a:rPr>
                 <a:t>       * HDD:Ma_so,Ten</a:t>
               </a:r>
-              <a:endParaRPr lang="en-US" sz="1200" smtClean="0">
-                <a:latin typeface="Arial" panose="020B0604020202020204" pitchFamily="34" charset="0"/>
-                <a:cs typeface="Arial" panose="020B0604020202020204" pitchFamily="34" charset="0"/>
-              </a:endParaRPr>
             </a:p>
             <a:p>
               <a:r>
@@ -9336,10 +9184,6 @@
                 </a:rPr>
                 <a:t>     Danh_sach_SDD:</a:t>
               </a:r>
-              <a:endParaRPr lang="en-US" sz="1200" smtClean="0">
-                <a:latin typeface="Arial" panose="020B0604020202020204" pitchFamily="34" charset="0"/>
-                <a:cs typeface="Arial" panose="020B0604020202020204" pitchFamily="34" charset="0"/>
-              </a:endParaRPr>
             </a:p>
             <a:p>
               <a:r>
@@ -9349,10 +9193,6 @@
                 </a:rPr>
                 <a:t>       * SSD:Ma_so,Ten</a:t>
               </a:r>
-              <a:endParaRPr lang="en-US" sz="1200" smtClean="0">
-                <a:latin typeface="Arial" panose="020B0604020202020204" pitchFamily="34" charset="0"/>
-                <a:cs typeface="Arial" panose="020B0604020202020204" pitchFamily="34" charset="0"/>
-              </a:endParaRPr>
             </a:p>
             <a:p>
               <a:r>
@@ -9362,10 +9202,6 @@
                 </a:rPr>
                 <a:t>     Danh_sach_Cua_hang:</a:t>
               </a:r>
-              <a:endParaRPr lang="en-US" sz="1200" smtClean="0">
-                <a:latin typeface="Arial" panose="020B0604020202020204" pitchFamily="34" charset="0"/>
-                <a:cs typeface="Arial" panose="020B0604020202020204" pitchFamily="34" charset="0"/>
-              </a:endParaRPr>
             </a:p>
             <a:p>
               <a:r>
@@ -9375,10 +9211,6 @@
                 </a:rPr>
                 <a:t>       * Cua_hang:Ma_so,Ten, Dia_chi, So_dien_thoai</a:t>
               </a:r>
-              <a:endParaRPr lang="en-US" sz="1200" smtClean="0">
-                <a:latin typeface="Arial" panose="020B0604020202020204" pitchFamily="34" charset="0"/>
-                <a:cs typeface="Arial" panose="020B0604020202020204" pitchFamily="34" charset="0"/>
-              </a:endParaRPr>
             </a:p>
           </p:txBody>
         </p:sp>
@@ -9422,6 +9254,7 @@
             <a:bodyPr wrap="square" rtlCol="0">
               <a:spAutoFit/>
             </a:bodyPr>
+            <a:lstStyle/>
             <a:p>
               <a:pPr algn="ctr"/>
               <a:r>
@@ -9466,6 +9299,7 @@
             <a:bodyPr wrap="square" rtlCol="0">
               <a:spAutoFit/>
             </a:bodyPr>
+            <a:lstStyle/>
             <a:p>
               <a:r>
                 <a:rPr lang="en-US" sz="1200" u="sng">
@@ -9488,10 +9322,6 @@
                 </a:rPr>
                 <a:t>Ma_so,Ten,Don_gia_Ban,,Don_gia_Nhap,CPU,Loai_Ram,Card_Man_hinh_Onboard,He_dieu_hanh,Trong_luong,Bao_hanh</a:t>
               </a:r>
-              <a:endParaRPr lang="en-US" sz="1200">
-                <a:latin typeface="Arial" panose="020B0604020202020204" pitchFamily="34" charset="0"/>
-                <a:cs typeface="Arial" panose="020B0604020202020204" pitchFamily="34" charset="0"/>
-              </a:endParaRPr>
             </a:p>
             <a:p>
               <a:r>
@@ -9501,10 +9331,6 @@
                 </a:rPr>
                 <a:t>          Nhom_Lap_top:Ma_so,Ten</a:t>
               </a:r>
-              <a:endParaRPr lang="en-US" sz="1200">
-                <a:latin typeface="Arial" panose="020B0604020202020204" pitchFamily="34" charset="0"/>
-                <a:cs typeface="Arial" panose="020B0604020202020204" pitchFamily="34" charset="0"/>
-              </a:endParaRPr>
             </a:p>
             <a:p>
               <a:r>
@@ -9514,10 +9340,6 @@
                 </a:rPr>
                 <a:t>          Tinh_nang:Ma_so,Ten</a:t>
               </a:r>
-              <a:endParaRPr lang="en-US" sz="1200">
-                <a:latin typeface="Arial" panose="020B0604020202020204" pitchFamily="34" charset="0"/>
-                <a:cs typeface="Arial" panose="020B0604020202020204" pitchFamily="34" charset="0"/>
-              </a:endParaRPr>
             </a:p>
             <a:p>
               <a:r>
@@ -9527,10 +9349,6 @@
                 </a:rPr>
                 <a:t>          CPU_Series:Ma_so,Ten</a:t>
               </a:r>
-              <a:endParaRPr lang="en-US" sz="1200">
-                <a:latin typeface="Arial" panose="020B0604020202020204" pitchFamily="34" charset="0"/>
-                <a:cs typeface="Arial" panose="020B0604020202020204" pitchFamily="34" charset="0"/>
-              </a:endParaRPr>
             </a:p>
             <a:p>
               <a:r>
@@ -9540,10 +9358,6 @@
                 </a:rPr>
                 <a:t>          Chuan_Man_hinh:Ma_so,Ten</a:t>
               </a:r>
-              <a:endParaRPr lang="en-US" sz="1200">
-                <a:latin typeface="Arial" panose="020B0604020202020204" pitchFamily="34" charset="0"/>
-                <a:cs typeface="Arial" panose="020B0604020202020204" pitchFamily="34" charset="0"/>
-              </a:endParaRPr>
             </a:p>
             <a:p>
               <a:r>
@@ -9553,10 +9367,6 @@
                 </a:rPr>
                 <a:t>          Mau_sac:Ma_so,Ten</a:t>
               </a:r>
-              <a:endParaRPr lang="en-US" sz="1200">
-                <a:latin typeface="Arial" panose="020B0604020202020204" pitchFamily="34" charset="0"/>
-                <a:cs typeface="Arial" panose="020B0604020202020204" pitchFamily="34" charset="0"/>
-              </a:endParaRPr>
             </a:p>
             <a:p>
               <a:r>
@@ -9566,10 +9376,6 @@
                 </a:rPr>
                 <a:t>          Kich_thuoc_Man_hinh:Ma_so,Ten</a:t>
               </a:r>
-              <a:endParaRPr lang="en-US" sz="1200">
-                <a:latin typeface="Arial" panose="020B0604020202020204" pitchFamily="34" charset="0"/>
-                <a:cs typeface="Arial" panose="020B0604020202020204" pitchFamily="34" charset="0"/>
-              </a:endParaRPr>
             </a:p>
             <a:p>
               <a:r>
@@ -9579,10 +9385,6 @@
                 </a:rPr>
                 <a:t>          Dung_luong_Ram:Ma_so,Ten</a:t>
               </a:r>
-              <a:endParaRPr lang="en-US" sz="1200">
-                <a:latin typeface="Arial" panose="020B0604020202020204" pitchFamily="34" charset="0"/>
-                <a:cs typeface="Arial" panose="020B0604020202020204" pitchFamily="34" charset="0"/>
-              </a:endParaRPr>
             </a:p>
             <a:p>
               <a:r>
@@ -9592,10 +9394,6 @@
                 </a:rPr>
                 <a:t>          Card_Man_hinh_Ngoai:Ma_so,Ten</a:t>
               </a:r>
-              <a:endParaRPr lang="en-US" sz="1200">
-                <a:latin typeface="Arial" panose="020B0604020202020204" pitchFamily="34" charset="0"/>
-                <a:cs typeface="Arial" panose="020B0604020202020204" pitchFamily="34" charset="0"/>
-              </a:endParaRPr>
             </a:p>
             <a:p>
               <a:r>
@@ -9605,10 +9403,6 @@
                 </a:rPr>
                 <a:t>          HDD:Ma_so,Ten</a:t>
               </a:r>
-              <a:endParaRPr lang="en-US" sz="1200">
-                <a:latin typeface="Arial" panose="020B0604020202020204" pitchFamily="34" charset="0"/>
-                <a:cs typeface="Arial" panose="020B0604020202020204" pitchFamily="34" charset="0"/>
-              </a:endParaRPr>
             </a:p>
             <a:p>
               <a:r>
@@ -9618,10 +9412,6 @@
                 </a:rPr>
                 <a:t>          SSD:Ma_so,Ten</a:t>
               </a:r>
-              <a:endParaRPr lang="en-US" sz="1200">
-                <a:latin typeface="Arial" panose="020B0604020202020204" pitchFamily="34" charset="0"/>
-                <a:cs typeface="Arial" panose="020B0604020202020204" pitchFamily="34" charset="0"/>
-              </a:endParaRPr>
             </a:p>
           </p:txBody>
         </p:sp>
@@ -9646,12 +9436,12 @@
           <a:bodyPr wrap="square" rtlCol="0" anchor="t">
             <a:spAutoFit/>
           </a:bodyPr>
+          <a:lstStyle/>
           <a:p>
             <a:r>
               <a:rPr lang="en-US"/>
               <a:t>Queens Of The Stone Age - In My Head</a:t>
             </a:r>
-            <a:endParaRPr lang="en-US"/>
           </a:p>
         </p:txBody>
       </p:sp>
@@ -9690,7 +9480,7 @@
       <p:sp>
         <p:nvSpPr>
           <p:cNvPr id="69" name="Rounded Rectangle 68">
-            <a:hlinkClick r:id="rId1" action="ppaction://hlinksldjump"/>
+            <a:hlinkClick r:id="rId3" action="ppaction://hlinksldjump"/>
           </p:cNvPr>
           <p:cNvSpPr/>
           <p:nvPr/>
@@ -10569,10 +10359,6 @@
               </a:rPr>
               <a:t>Du_lieu</a:t>
             </a:r>
-            <a:endParaRPr lang="en-US" sz="1400" smtClean="0">
-              <a:latin typeface="Arial" panose="020B0604020202020204" pitchFamily="34" charset="0"/>
-              <a:cs typeface="Arial" panose="020B0604020202020204" pitchFamily="34" charset="0"/>
-            </a:endParaRPr>
           </a:p>
         </p:txBody>
       </p:sp>
@@ -10755,6 +10541,7 @@
           <a:bodyPr wrap="square" rtlCol="0">
             <a:spAutoFit/>
           </a:bodyPr>
+          <a:lstStyle/>
           <a:p>
             <a:r>
               <a:rPr lang="en-US" sz="1400" b="1" smtClean="0">
@@ -10765,6 +10552,16 @@
                 <a:cs typeface="Arial" panose="020B0604020202020204" pitchFamily="34" charset="0"/>
               </a:rPr>
               <a:t>Du_lieu</a:t>
+            </a:r>
+            <a:r>
+              <a:rPr lang="en-US" sz="1400" smtClean="0">
+                <a:solidFill>
+                  <a:srgbClr val="002060"/>
+                </a:solidFill>
+                <a:latin typeface="Arial" panose="020B0604020202020204" pitchFamily="34" charset="0"/>
+                <a:cs typeface="Arial" panose="020B0604020202020204" pitchFamily="34" charset="0"/>
+              </a:rPr>
+              <a:t/>
             </a:r>
             <a:br>
               <a:rPr lang="en-US" sz="1400" smtClean="0">
@@ -10784,6 +10581,16 @@
                 <a:cs typeface="Arial" panose="020B0604020202020204" pitchFamily="34" charset="0"/>
               </a:rPr>
               <a:t> Cong_ty</a:t>
+            </a:r>
+            <a:r>
+              <a:rPr lang="en-US" sz="1400" b="1" smtClean="0">
+                <a:solidFill>
+                  <a:srgbClr val="002060"/>
+                </a:solidFill>
+                <a:latin typeface="Arial" panose="020B0604020202020204" pitchFamily="34" charset="0"/>
+                <a:cs typeface="Arial" panose="020B0604020202020204" pitchFamily="34" charset="0"/>
+              </a:rPr>
+              <a:t/>
             </a:r>
             <a:br>
               <a:rPr lang="en-US" sz="1400" b="1" smtClean="0">
@@ -10863,6 +10670,7 @@
             <a:bodyPr wrap="square" rtlCol="0">
               <a:spAutoFit/>
             </a:bodyPr>
+            <a:lstStyle/>
             <a:p>
               <a:pPr algn="ctr"/>
               <a:r>
@@ -10907,6 +10715,7 @@
             <a:bodyPr wrap="square" rtlCol="0">
               <a:spAutoFit/>
             </a:bodyPr>
+            <a:lstStyle/>
             <a:p>
               <a:r>
                 <a:rPr lang="en-US" sz="1200" smtClean="0">
@@ -10915,10 +10724,6 @@
                 </a:rPr>
                 <a:t>Ma_so,Ten</a:t>
               </a:r>
-              <a:endParaRPr lang="en-US" sz="1200" smtClean="0">
-                <a:latin typeface="Arial" panose="020B0604020202020204" pitchFamily="34" charset="0"/>
-                <a:cs typeface="Arial" panose="020B0604020202020204" pitchFamily="34" charset="0"/>
-              </a:endParaRPr>
             </a:p>
             <a:p>
               <a:r>
@@ -10928,10 +10733,6 @@
                 </a:rPr>
                 <a:t>     Danh_sach_Nhom_Lap_top:</a:t>
               </a:r>
-              <a:endParaRPr lang="en-US" sz="1200" smtClean="0">
-                <a:latin typeface="Arial" panose="020B0604020202020204" pitchFamily="34" charset="0"/>
-                <a:cs typeface="Arial" panose="020B0604020202020204" pitchFamily="34" charset="0"/>
-              </a:endParaRPr>
             </a:p>
             <a:p>
               <a:r>
@@ -10941,10 +10742,6 @@
                 </a:rPr>
                 <a:t>       * Nhom_Lap_top:Ma_so,Ten</a:t>
               </a:r>
-              <a:endParaRPr lang="en-US" sz="1200" smtClean="0">
-                <a:latin typeface="Arial" panose="020B0604020202020204" pitchFamily="34" charset="0"/>
-                <a:cs typeface="Arial" panose="020B0604020202020204" pitchFamily="34" charset="0"/>
-              </a:endParaRPr>
             </a:p>
             <a:p>
               <a:r>
@@ -10954,10 +10751,6 @@
                 </a:rPr>
                 <a:t>     Danh_sach_Mau_sac:</a:t>
               </a:r>
-              <a:endParaRPr lang="en-US" sz="1200" smtClean="0">
-                <a:latin typeface="Arial" panose="020B0604020202020204" pitchFamily="34" charset="0"/>
-                <a:cs typeface="Arial" panose="020B0604020202020204" pitchFamily="34" charset="0"/>
-              </a:endParaRPr>
             </a:p>
             <a:p>
               <a:r>
@@ -10967,10 +10760,6 @@
                 </a:rPr>
                 <a:t>       * Mau_sac:Ma_so,Ten</a:t>
               </a:r>
-              <a:endParaRPr lang="en-US" sz="1200" smtClean="0">
-                <a:latin typeface="Arial" panose="020B0604020202020204" pitchFamily="34" charset="0"/>
-                <a:cs typeface="Arial" panose="020B0604020202020204" pitchFamily="34" charset="0"/>
-              </a:endParaRPr>
             </a:p>
             <a:p>
               <a:r>
@@ -10980,10 +10769,6 @@
                 </a:rPr>
                 <a:t>     Danh_sach_Tinh_nang:</a:t>
               </a:r>
-              <a:endParaRPr lang="en-US" sz="1200" smtClean="0">
-                <a:latin typeface="Arial" panose="020B0604020202020204" pitchFamily="34" charset="0"/>
-                <a:cs typeface="Arial" panose="020B0604020202020204" pitchFamily="34" charset="0"/>
-              </a:endParaRPr>
             </a:p>
             <a:p>
               <a:r>
@@ -10993,10 +10778,6 @@
                 </a:rPr>
                 <a:t>       * Tinh_nang:Ma_so,Ten</a:t>
               </a:r>
-              <a:endParaRPr lang="en-US" sz="1200" smtClean="0">
-                <a:latin typeface="Arial" panose="020B0604020202020204" pitchFamily="34" charset="0"/>
-                <a:cs typeface="Arial" panose="020B0604020202020204" pitchFamily="34" charset="0"/>
-              </a:endParaRPr>
             </a:p>
             <a:p>
               <a:r>
@@ -11006,10 +10787,6 @@
                 </a:rPr>
                 <a:t>     Danh_sach_CPU_Series:</a:t>
               </a:r>
-              <a:endParaRPr lang="en-US" sz="1200" smtClean="0">
-                <a:latin typeface="Arial" panose="020B0604020202020204" pitchFamily="34" charset="0"/>
-                <a:cs typeface="Arial" panose="020B0604020202020204" pitchFamily="34" charset="0"/>
-              </a:endParaRPr>
             </a:p>
             <a:p>
               <a:r>
@@ -11019,10 +10796,6 @@
                 </a:rPr>
                 <a:t>       * CPU_Series:Ma_so,Ten</a:t>
               </a:r>
-              <a:endParaRPr lang="en-US" sz="1200" smtClean="0">
-                <a:latin typeface="Arial" panose="020B0604020202020204" pitchFamily="34" charset="0"/>
-                <a:cs typeface="Arial" panose="020B0604020202020204" pitchFamily="34" charset="0"/>
-              </a:endParaRPr>
             </a:p>
             <a:p>
               <a:r>
@@ -11032,10 +10805,6 @@
                 </a:rPr>
                 <a:t>     Danh_sach_Card_Man_hinh_Ngoai:</a:t>
               </a:r>
-              <a:endParaRPr lang="en-US" sz="1200" smtClean="0">
-                <a:latin typeface="Arial" panose="020B0604020202020204" pitchFamily="34" charset="0"/>
-                <a:cs typeface="Arial" panose="020B0604020202020204" pitchFamily="34" charset="0"/>
-              </a:endParaRPr>
             </a:p>
             <a:p>
               <a:r>
@@ -11045,10 +10814,6 @@
                 </a:rPr>
                 <a:t>       * Card_Man_hinh_Ngoai:Ma_so,Ten</a:t>
               </a:r>
-              <a:endParaRPr lang="en-US" sz="1200" smtClean="0">
-                <a:latin typeface="Arial" panose="020B0604020202020204" pitchFamily="34" charset="0"/>
-                <a:cs typeface="Arial" panose="020B0604020202020204" pitchFamily="34" charset="0"/>
-              </a:endParaRPr>
             </a:p>
             <a:p>
               <a:r>
@@ -11058,10 +10823,6 @@
                 </a:rPr>
                 <a:t>     Danh_sach_Chuan_Man_hinh:</a:t>
               </a:r>
-              <a:endParaRPr lang="en-US" sz="1200" smtClean="0">
-                <a:latin typeface="Arial" panose="020B0604020202020204" pitchFamily="34" charset="0"/>
-                <a:cs typeface="Arial" panose="020B0604020202020204" pitchFamily="34" charset="0"/>
-              </a:endParaRPr>
             </a:p>
             <a:p>
               <a:r>
@@ -11071,10 +10832,6 @@
                 </a:rPr>
                 <a:t>       * Chuan_Man_hinh:Ma_so,Ten</a:t>
               </a:r>
-              <a:endParaRPr lang="en-US" sz="1200" smtClean="0">
-                <a:latin typeface="Arial" panose="020B0604020202020204" pitchFamily="34" charset="0"/>
-                <a:cs typeface="Arial" panose="020B0604020202020204" pitchFamily="34" charset="0"/>
-              </a:endParaRPr>
             </a:p>
             <a:p>
               <a:r>
@@ -11084,10 +10841,6 @@
                 </a:rPr>
                 <a:t>     Danh_sach_Kich_thuoc_Man_hinh:</a:t>
               </a:r>
-              <a:endParaRPr lang="en-US" sz="1200" smtClean="0">
-                <a:latin typeface="Arial" panose="020B0604020202020204" pitchFamily="34" charset="0"/>
-                <a:cs typeface="Arial" panose="020B0604020202020204" pitchFamily="34" charset="0"/>
-              </a:endParaRPr>
             </a:p>
             <a:p>
               <a:r>
@@ -11097,10 +10850,6 @@
                 </a:rPr>
                 <a:t>       * Kich_thuoc_Man_hinh:Ma_so,Ten</a:t>
               </a:r>
-              <a:endParaRPr lang="en-US" sz="1200" smtClean="0">
-                <a:latin typeface="Arial" panose="020B0604020202020204" pitchFamily="34" charset="0"/>
-                <a:cs typeface="Arial" panose="020B0604020202020204" pitchFamily="34" charset="0"/>
-              </a:endParaRPr>
             </a:p>
             <a:p>
               <a:r>
@@ -11110,10 +10859,6 @@
                 </a:rPr>
                 <a:t>     Danh_sach_Dung_luong_Ram:</a:t>
               </a:r>
-              <a:endParaRPr lang="en-US" sz="1200" smtClean="0">
-                <a:latin typeface="Arial" panose="020B0604020202020204" pitchFamily="34" charset="0"/>
-                <a:cs typeface="Arial" panose="020B0604020202020204" pitchFamily="34" charset="0"/>
-              </a:endParaRPr>
             </a:p>
             <a:p>
               <a:r>
@@ -11123,10 +10868,6 @@
                 </a:rPr>
                 <a:t>       * Dung_luong_Ram:Ma_so,Ten</a:t>
               </a:r>
-              <a:endParaRPr lang="en-US" sz="1200" smtClean="0">
-                <a:latin typeface="Arial" panose="020B0604020202020204" pitchFamily="34" charset="0"/>
-                <a:cs typeface="Arial" panose="020B0604020202020204" pitchFamily="34" charset="0"/>
-              </a:endParaRPr>
             </a:p>
             <a:p>
               <a:r>
@@ -11136,10 +10877,6 @@
                 </a:rPr>
                 <a:t>     Danh_sach_HDD:</a:t>
               </a:r>
-              <a:endParaRPr lang="en-US" sz="1200" smtClean="0">
-                <a:latin typeface="Arial" panose="020B0604020202020204" pitchFamily="34" charset="0"/>
-                <a:cs typeface="Arial" panose="020B0604020202020204" pitchFamily="34" charset="0"/>
-              </a:endParaRPr>
             </a:p>
             <a:p>
               <a:r>
@@ -11149,10 +10886,6 @@
                 </a:rPr>
                 <a:t>       * HDD:Ma_so,Ten</a:t>
               </a:r>
-              <a:endParaRPr lang="en-US" sz="1200" smtClean="0">
-                <a:latin typeface="Arial" panose="020B0604020202020204" pitchFamily="34" charset="0"/>
-                <a:cs typeface="Arial" panose="020B0604020202020204" pitchFamily="34" charset="0"/>
-              </a:endParaRPr>
             </a:p>
             <a:p>
               <a:r>
@@ -11162,10 +10895,6 @@
                 </a:rPr>
                 <a:t>     Danh_sach_SDD:</a:t>
               </a:r>
-              <a:endParaRPr lang="en-US" sz="1200" smtClean="0">
-                <a:latin typeface="Arial" panose="020B0604020202020204" pitchFamily="34" charset="0"/>
-                <a:cs typeface="Arial" panose="020B0604020202020204" pitchFamily="34" charset="0"/>
-              </a:endParaRPr>
             </a:p>
             <a:p>
               <a:r>
@@ -11175,10 +10904,6 @@
                 </a:rPr>
                 <a:t>       * SSD:Ma_so,Ten</a:t>
               </a:r>
-              <a:endParaRPr lang="en-US" sz="1200" smtClean="0">
-                <a:latin typeface="Arial" panose="020B0604020202020204" pitchFamily="34" charset="0"/>
-                <a:cs typeface="Arial" panose="020B0604020202020204" pitchFamily="34" charset="0"/>
-              </a:endParaRPr>
             </a:p>
             <a:p>
               <a:r>
@@ -11188,10 +10913,6 @@
                 </a:rPr>
                 <a:t>     Danh_sach_Cua_hang:</a:t>
               </a:r>
-              <a:endParaRPr lang="en-US" sz="1200" smtClean="0">
-                <a:latin typeface="Arial" panose="020B0604020202020204" pitchFamily="34" charset="0"/>
-                <a:cs typeface="Arial" panose="020B0604020202020204" pitchFamily="34" charset="0"/>
-              </a:endParaRPr>
             </a:p>
             <a:p>
               <a:r>
@@ -11201,10 +10922,6 @@
                 </a:rPr>
                 <a:t>       * Cua_hang:Ma_so,Ten, Dia_chi, So_dien_thoai</a:t>
               </a:r>
-              <a:endParaRPr lang="en-US" sz="1200" smtClean="0">
-                <a:latin typeface="Arial" panose="020B0604020202020204" pitchFamily="34" charset="0"/>
-                <a:cs typeface="Arial" panose="020B0604020202020204" pitchFamily="34" charset="0"/>
-              </a:endParaRPr>
             </a:p>
             <a:p>
               <a:r>
@@ -11214,10 +10931,6 @@
                 </a:rPr>
                 <a:t>     Danh_sach_Nhan_vien_Nhap_hang</a:t>
               </a:r>
-              <a:endParaRPr lang="en-US" sz="1200" smtClean="0">
-                <a:latin typeface="Arial" panose="020B0604020202020204" pitchFamily="34" charset="0"/>
-                <a:cs typeface="Arial" panose="020B0604020202020204" pitchFamily="34" charset="0"/>
-              </a:endParaRPr>
             </a:p>
             <a:p>
               <a:pPr lvl="1"/>
@@ -11306,6 +11019,7 @@
             <a:bodyPr wrap="square" rtlCol="0">
               <a:spAutoFit/>
             </a:bodyPr>
+            <a:lstStyle/>
             <a:p>
               <a:pPr algn="ctr"/>
               <a:r>
@@ -11350,6 +11064,7 @@
             <a:bodyPr wrap="square" rtlCol="0">
               <a:spAutoFit/>
             </a:bodyPr>
+            <a:lstStyle/>
             <a:p>
               <a:r>
                 <a:rPr lang="en-US" sz="1200" u="sng">
@@ -11358,10 +11073,6 @@
                 </a:rPr>
                 <a:t>Số lượng Tồn </a:t>
               </a:r>
-              <a:endParaRPr lang="en-US" sz="1200" u="sng">
-                <a:latin typeface="Arial" panose="020B0604020202020204" pitchFamily="34" charset="0"/>
-                <a:cs typeface="Arial" panose="020B0604020202020204" pitchFamily="34" charset="0"/>
-              </a:endParaRPr>
             </a:p>
             <a:p>
               <a:r>
@@ -11371,10 +11082,6 @@
                 </a:rPr>
                 <a:t>Ma_so,Ten,Don_gia_Ban,,Don_gia_Nhap,CPU,Loai_Ram,Card_Man_hinh_Onboard,He_dieu_hanh,Trong_luong,Bao_hanh</a:t>
               </a:r>
-              <a:endParaRPr lang="en-US" sz="1200">
-                <a:latin typeface="Arial" panose="020B0604020202020204" pitchFamily="34" charset="0"/>
-                <a:cs typeface="Arial" panose="020B0604020202020204" pitchFamily="34" charset="0"/>
-              </a:endParaRPr>
             </a:p>
             <a:p>
               <a:r>
@@ -11384,10 +11091,6 @@
                 </a:rPr>
                 <a:t>          Nhom_Lap_top:Ma_so,Ten</a:t>
               </a:r>
-              <a:endParaRPr lang="en-US" sz="1200">
-                <a:latin typeface="Arial" panose="020B0604020202020204" pitchFamily="34" charset="0"/>
-                <a:cs typeface="Arial" panose="020B0604020202020204" pitchFamily="34" charset="0"/>
-              </a:endParaRPr>
             </a:p>
             <a:p>
               <a:r>
@@ -11397,10 +11100,6 @@
                 </a:rPr>
                 <a:t>          Tinh_nang:Ma_so,Ten</a:t>
               </a:r>
-              <a:endParaRPr lang="en-US" sz="1200">
-                <a:latin typeface="Arial" panose="020B0604020202020204" pitchFamily="34" charset="0"/>
-                <a:cs typeface="Arial" panose="020B0604020202020204" pitchFamily="34" charset="0"/>
-              </a:endParaRPr>
             </a:p>
             <a:p>
               <a:r>
@@ -11410,10 +11109,6 @@
                 </a:rPr>
                 <a:t>          CPU_Series:Ma_so,Ten</a:t>
               </a:r>
-              <a:endParaRPr lang="en-US" sz="1200">
-                <a:latin typeface="Arial" panose="020B0604020202020204" pitchFamily="34" charset="0"/>
-                <a:cs typeface="Arial" panose="020B0604020202020204" pitchFamily="34" charset="0"/>
-              </a:endParaRPr>
             </a:p>
             <a:p>
               <a:r>
@@ -11423,10 +11118,6 @@
                 </a:rPr>
                 <a:t>          Chuan_Man_hinh:Ma_so,Ten</a:t>
               </a:r>
-              <a:endParaRPr lang="en-US" sz="1200">
-                <a:latin typeface="Arial" panose="020B0604020202020204" pitchFamily="34" charset="0"/>
-                <a:cs typeface="Arial" panose="020B0604020202020204" pitchFamily="34" charset="0"/>
-              </a:endParaRPr>
             </a:p>
             <a:p>
               <a:r>
@@ -11436,10 +11127,6 @@
                 </a:rPr>
                 <a:t>          Mau_sac:Ma_so,Ten</a:t>
               </a:r>
-              <a:endParaRPr lang="en-US" sz="1200">
-                <a:latin typeface="Arial" panose="020B0604020202020204" pitchFamily="34" charset="0"/>
-                <a:cs typeface="Arial" panose="020B0604020202020204" pitchFamily="34" charset="0"/>
-              </a:endParaRPr>
             </a:p>
             <a:p>
               <a:r>
@@ -11449,10 +11136,6 @@
                 </a:rPr>
                 <a:t>          Kich_thuoc_Man_hinh:Ma_so,Ten</a:t>
               </a:r>
-              <a:endParaRPr lang="en-US" sz="1200">
-                <a:latin typeface="Arial" panose="020B0604020202020204" pitchFamily="34" charset="0"/>
-                <a:cs typeface="Arial" panose="020B0604020202020204" pitchFamily="34" charset="0"/>
-              </a:endParaRPr>
             </a:p>
             <a:p>
               <a:r>
@@ -11462,10 +11145,6 @@
                 </a:rPr>
                 <a:t>          Dung_luong_Ram:Ma_so,Ten</a:t>
               </a:r>
-              <a:endParaRPr lang="en-US" sz="1200">
-                <a:latin typeface="Arial" panose="020B0604020202020204" pitchFamily="34" charset="0"/>
-                <a:cs typeface="Arial" panose="020B0604020202020204" pitchFamily="34" charset="0"/>
-              </a:endParaRPr>
             </a:p>
             <a:p>
               <a:r>
@@ -11475,10 +11154,6 @@
                 </a:rPr>
                 <a:t>          Card_Man_hinh_Ngoai:Ma_so,Ten</a:t>
               </a:r>
-              <a:endParaRPr lang="en-US" sz="1200">
-                <a:latin typeface="Arial" panose="020B0604020202020204" pitchFamily="34" charset="0"/>
-                <a:cs typeface="Arial" panose="020B0604020202020204" pitchFamily="34" charset="0"/>
-              </a:endParaRPr>
             </a:p>
             <a:p>
               <a:r>
@@ -11488,10 +11163,6 @@
                 </a:rPr>
                 <a:t>          HDD:Ma_so,Ten</a:t>
               </a:r>
-              <a:endParaRPr lang="en-US" sz="1200">
-                <a:latin typeface="Arial" panose="020B0604020202020204" pitchFamily="34" charset="0"/>
-                <a:cs typeface="Arial" panose="020B0604020202020204" pitchFamily="34" charset="0"/>
-              </a:endParaRPr>
             </a:p>
             <a:p>
               <a:r>
@@ -11501,10 +11172,6 @@
                 </a:rPr>
                 <a:t>          SSD:Ma_so,Ten</a:t>
               </a:r>
-              <a:endParaRPr lang="en-US" sz="1200">
-                <a:latin typeface="Arial" panose="020B0604020202020204" pitchFamily="34" charset="0"/>
-                <a:cs typeface="Arial" panose="020B0604020202020204" pitchFamily="34" charset="0"/>
-              </a:endParaRPr>
             </a:p>
           </p:txBody>
         </p:sp>
@@ -11529,16 +11196,1451 @@
           <a:bodyPr wrap="square" rtlCol="0" anchor="t">
             <a:spAutoFit/>
           </a:bodyPr>
+          <a:lstStyle/>
           <a:p>
             <a:r>
               <a:rPr lang="en-US"/>
               <a:t>Queens Of The Stone Age - In My Head</a:t>
             </a:r>
-            <a:endParaRPr lang="en-US"/>
           </a:p>
         </p:txBody>
       </p:sp>
     </p:spTree>
+  </p:cSld>
+  <p:clrMapOvr>
+    <a:masterClrMapping/>
+  </p:clrMapOvr>
+  <p:timing>
+    <p:tnLst>
+      <p:par>
+        <p:cTn id="1" dur="indefinite" restart="never" nodeType="tmRoot"/>
+      </p:par>
+    </p:tnLst>
+  </p:timing>
+</p:sld>
+</file>
+
+<file path=ppt/slides/slide5.xml><?xml version="1.0" encoding="utf-8"?>
+<p:sld xmlns:a="http://schemas.openxmlformats.org/drawingml/2006/main" xmlns:r="http://schemas.openxmlformats.org/officeDocument/2006/relationships" xmlns:p="http://schemas.openxmlformats.org/presentationml/2006/main">
+  <p:cSld>
+    <p:spTree>
+      <p:nvGrpSpPr>
+        <p:cNvPr id="1" name=""/>
+        <p:cNvGrpSpPr/>
+        <p:nvPr/>
+      </p:nvGrpSpPr>
+      <p:grpSpPr>
+        <a:xfrm>
+          <a:off x="0" y="0"/>
+          <a:ext cx="0" cy="0"/>
+          <a:chOff x="0" y="0"/>
+          <a:chExt cx="0" cy="0"/>
+        </a:xfrm>
+      </p:grpSpPr>
+      <p:sp>
+        <p:nvSpPr>
+          <p:cNvPr id="69" name="Rounded Rectangle 68">
+            <a:hlinkClick r:id="rId3" action="ppaction://hlinksldjump"/>
+          </p:cNvPr>
+          <p:cNvSpPr/>
+          <p:nvPr/>
+        </p:nvSpPr>
+        <p:spPr>
+          <a:xfrm>
+            <a:off x="5479061" y="190982"/>
+            <a:ext cx="6074929" cy="754401"/>
+          </a:xfrm>
+          <a:prstGeom prst="roundRect">
+            <a:avLst/>
+          </a:prstGeom>
+          <a:solidFill>
+            <a:srgbClr val="002060"/>
+          </a:solidFill>
+          <a:ln w="38100" cap="rnd">
+            <a:solidFill>
+              <a:schemeClr val="bg1"/>
+            </a:solidFill>
+          </a:ln>
+          <a:effectLst>
+            <a:outerShdw blurRad="482600" dir="5400000" sx="89000" sy="89000" algn="ctr" rotWithShape="0">
+              <a:srgbClr val="000000">
+                <a:alpha val="49000"/>
+              </a:srgbClr>
+            </a:outerShdw>
+          </a:effectLst>
+          <a:scene3d>
+            <a:camera prst="orthographicFront"/>
+            <a:lightRig rig="twoPt" dir="t"/>
+          </a:scene3d>
+          <a:sp3d extrusionH="12700" prstMaterial="translucentPowder">
+            <a:bevelB w="165100" prst="coolSlant"/>
+          </a:sp3d>
+        </p:spPr>
+        <p:style>
+          <a:lnRef idx="2">
+            <a:schemeClr val="accent1">
+              <a:shade val="50000"/>
+            </a:schemeClr>
+          </a:lnRef>
+          <a:fillRef idx="1">
+            <a:schemeClr val="accent1"/>
+          </a:fillRef>
+          <a:effectRef idx="0">
+            <a:schemeClr val="accent1"/>
+          </a:effectRef>
+          <a:fontRef idx="minor">
+            <a:schemeClr val="lt1"/>
+          </a:fontRef>
+        </p:style>
+        <p:txBody>
+          <a:bodyPr rtlCol="0" anchor="ctr"/>
+          <a:lstStyle/>
+          <a:p>
+            <a:pPr algn="ctr"/>
+            <a:r>
+              <a:rPr lang="en-US" sz="1600" b="1" dirty="0" smtClean="0">
+                <a:solidFill>
+                  <a:srgbClr val="FFFF00"/>
+                </a:solidFill>
+                <a:latin typeface="Arial" panose="020B0604020202020204" pitchFamily="34" charset="0"/>
+                <a:cs typeface="Arial" panose="020B0604020202020204" pitchFamily="34" charset="0"/>
+                <a:sym typeface="+mn-ea"/>
+              </a:rPr>
+              <a:t>Công ty Laptop Phong Vũ</a:t>
+            </a:r>
+            <a:r>
+              <a:rPr lang="en-US" sz="1600" b="1" dirty="0" smtClean="0">
+                <a:solidFill>
+                  <a:prstClr val="white"/>
+                </a:solidFill>
+                <a:latin typeface="Arial" panose="020B0604020202020204" pitchFamily="34" charset="0"/>
+                <a:cs typeface="Arial" panose="020B0604020202020204" pitchFamily="34" charset="0"/>
+                <a:sym typeface="+mn-ea"/>
+              </a:rPr>
+              <a:t> </a:t>
+            </a:r>
+            <a:r>
+              <a:rPr lang="en-US" sz="1600" dirty="0" smtClean="0">
+                <a:solidFill>
+                  <a:prstClr val="white"/>
+                </a:solidFill>
+                <a:latin typeface="Arial" panose="020B0604020202020204" pitchFamily="34" charset="0"/>
+                <a:cs typeface="Arial" panose="020B0604020202020204" pitchFamily="34" charset="0"/>
+                <a:sym typeface="+mn-ea"/>
+              </a:rPr>
+              <a:t>( Mã số : </a:t>
+            </a:r>
+            <a:r>
+              <a:rPr lang="en-US" sz="1600" dirty="0" smtClean="0">
+                <a:solidFill>
+                  <a:schemeClr val="bg1"/>
+                </a:solidFill>
+                <a:latin typeface="Arial" panose="020B0604020202020204" pitchFamily="34" charset="0"/>
+                <a:cs typeface="Arial" panose="020B0604020202020204" pitchFamily="34" charset="0"/>
+                <a:sym typeface="+mn-ea"/>
+              </a:rPr>
+              <a:t>Laptop_Phong_Vu</a:t>
+            </a:r>
+            <a:r>
+              <a:rPr lang="en-US" sz="1600" dirty="0" smtClean="0">
+                <a:solidFill>
+                  <a:prstClr val="white"/>
+                </a:solidFill>
+                <a:latin typeface="Arial" panose="020B0604020202020204" pitchFamily="34" charset="0"/>
+                <a:cs typeface="Arial" panose="020B0604020202020204" pitchFamily="34" charset="0"/>
+                <a:sym typeface="+mn-ea"/>
+              </a:rPr>
+              <a:t>)</a:t>
+            </a:r>
+            <a:endParaRPr lang="en-US" sz="1600" dirty="0" smtClean="0">
+              <a:solidFill>
+                <a:prstClr val="white"/>
+              </a:solidFill>
+              <a:latin typeface="Arial" panose="020B0604020202020204" pitchFamily="34" charset="0"/>
+              <a:cs typeface="Arial" panose="020B0604020202020204" pitchFamily="34" charset="0"/>
+            </a:endParaRPr>
+          </a:p>
+          <a:p>
+            <a:pPr algn="ctr"/>
+            <a:r>
+              <a:rPr lang="en-US" sz="1600" b="1" dirty="0" smtClean="0">
+                <a:solidFill>
+                  <a:srgbClr val="FFFF00"/>
+                </a:solidFill>
+                <a:latin typeface="Arial" panose="020B0604020202020204" pitchFamily="34" charset="0"/>
+                <a:cs typeface="Arial" panose="020B0604020202020204" pitchFamily="34" charset="0"/>
+              </a:rPr>
+              <a:t>Mô hình đối tượng xử lý của Nhân viên </a:t>
+            </a:r>
+            <a:r>
+              <a:rPr lang="en-US" sz="1600" b="1" dirty="0" smtClean="0">
+                <a:solidFill>
+                  <a:srgbClr val="FFFF00"/>
+                </a:solidFill>
+                <a:latin typeface="Arial" panose="020B0604020202020204" pitchFamily="34" charset="0"/>
+                <a:cs typeface="Arial" panose="020B0604020202020204" pitchFamily="34" charset="0"/>
+              </a:rPr>
+              <a:t>Giao </a:t>
+            </a:r>
+            <a:r>
+              <a:rPr lang="en-US" sz="1600" b="1" dirty="0" smtClean="0">
+                <a:solidFill>
+                  <a:srgbClr val="FFFF00"/>
+                </a:solidFill>
+                <a:latin typeface="Arial" panose="020B0604020202020204" pitchFamily="34" charset="0"/>
+                <a:cs typeface="Arial" panose="020B0604020202020204" pitchFamily="34" charset="0"/>
+              </a:rPr>
+              <a:t>hàng </a:t>
+            </a:r>
+            <a:endParaRPr lang="vi-VN" sz="1600" dirty="0">
+              <a:solidFill>
+                <a:srgbClr val="FFFF00"/>
+              </a:solidFill>
+              <a:latin typeface="Arial" panose="020B0604020202020204" pitchFamily="34" charset="0"/>
+              <a:cs typeface="Arial" panose="020B0604020202020204" pitchFamily="34" charset="0"/>
+            </a:endParaRPr>
+          </a:p>
+        </p:txBody>
+      </p:sp>
+      <p:sp>
+        <p:nvSpPr>
+          <p:cNvPr id="10" name="Cube 9">
+            <a:hlinkClick r:id="" action="ppaction://noaction"/>
+          </p:cNvPr>
+          <p:cNvSpPr/>
+          <p:nvPr/>
+        </p:nvSpPr>
+        <p:spPr>
+          <a:xfrm>
+            <a:off x="5161897" y="2009249"/>
+            <a:ext cx="4665340" cy="1292616"/>
+          </a:xfrm>
+          <a:prstGeom prst="cube">
+            <a:avLst>
+              <a:gd name="adj" fmla="val 15836"/>
+            </a:avLst>
+          </a:prstGeom>
+          <a:solidFill>
+            <a:schemeClr val="bg1"/>
+          </a:solidFill>
+          <a:ln w="6350">
+            <a:prstDash val="sysDash"/>
+          </a:ln>
+        </p:spPr>
+        <p:style>
+          <a:lnRef idx="2">
+            <a:schemeClr val="accent1">
+              <a:shade val="50000"/>
+            </a:schemeClr>
+          </a:lnRef>
+          <a:fillRef idx="1">
+            <a:schemeClr val="accent1"/>
+          </a:fillRef>
+          <a:effectRef idx="0">
+            <a:schemeClr val="accent1"/>
+          </a:effectRef>
+          <a:fontRef idx="minor">
+            <a:schemeClr val="lt1"/>
+          </a:fontRef>
+        </p:style>
+        <p:txBody>
+          <a:bodyPr rtlCol="0" anchor="ctr"/>
+          <a:lstStyle/>
+          <a:p>
+            <a:pPr algn="ctr"/>
+            <a:endParaRPr lang="vi-VN" sz="3200" b="1">
+              <a:solidFill>
+                <a:prstClr val="white"/>
+              </a:solidFill>
+            </a:endParaRPr>
+          </a:p>
+        </p:txBody>
+      </p:sp>
+      <p:sp>
+        <p:nvSpPr>
+          <p:cNvPr id="11" name="Oval 10"/>
+          <p:cNvSpPr/>
+          <p:nvPr/>
+        </p:nvSpPr>
+        <p:spPr>
+          <a:xfrm>
+            <a:off x="7749054" y="2318725"/>
+            <a:ext cx="1763271" cy="680610"/>
+          </a:xfrm>
+          <a:prstGeom prst="ellipse">
+            <a:avLst/>
+          </a:prstGeom>
+          <a:solidFill>
+            <a:schemeClr val="bg1"/>
+          </a:solidFill>
+        </p:spPr>
+        <p:style>
+          <a:lnRef idx="2">
+            <a:schemeClr val="accent1">
+              <a:shade val="50000"/>
+            </a:schemeClr>
+          </a:lnRef>
+          <a:fillRef idx="1">
+            <a:schemeClr val="accent1"/>
+          </a:fillRef>
+          <a:effectRef idx="0">
+            <a:schemeClr val="accent1"/>
+          </a:effectRef>
+          <a:fontRef idx="minor">
+            <a:schemeClr val="lt1"/>
+          </a:fontRef>
+        </p:style>
+        <p:txBody>
+          <a:bodyPr rtlCol="0" anchor="ctr"/>
+          <a:lstStyle/>
+          <a:p>
+            <a:pPr algn="ctr"/>
+            <a:endParaRPr lang="en-US" sz="1600" smtClean="0">
+              <a:solidFill>
+                <a:srgbClr val="FF0000"/>
+              </a:solidFill>
+              <a:latin typeface="Arial" panose="020B0604020202020204" pitchFamily="34" charset="0"/>
+              <a:cs typeface="Arial" panose="020B0604020202020204" pitchFamily="34" charset="0"/>
+            </a:endParaRPr>
+          </a:p>
+          <a:p>
+            <a:pPr algn="ctr"/>
+            <a:r>
+              <a:rPr lang="en-US" sz="1600" smtClean="0">
+                <a:solidFill>
+                  <a:srgbClr val="FF0000"/>
+                </a:solidFill>
+                <a:latin typeface="Arial" panose="020B0604020202020204" pitchFamily="34" charset="0"/>
+                <a:cs typeface="Arial" panose="020B0604020202020204" pitchFamily="34" charset="0"/>
+              </a:rPr>
+              <a:t>Lệnh </a:t>
+            </a:r>
+            <a:r>
+              <a:rPr lang="en-US" sz="1600" b="1" smtClean="0">
+                <a:solidFill>
+                  <a:srgbClr val="FF0000"/>
+                </a:solidFill>
+                <a:latin typeface="Arial" panose="020B0604020202020204" pitchFamily="34" charset="0"/>
+                <a:cs typeface="Arial" panose="020B0604020202020204" pitchFamily="34" charset="0"/>
+              </a:rPr>
+              <a:t>(3B)</a:t>
+            </a:r>
+            <a:br>
+              <a:rPr lang="en-US" sz="1600" b="1" smtClean="0">
+                <a:solidFill>
+                  <a:srgbClr val="FF0000"/>
+                </a:solidFill>
+                <a:latin typeface="Arial" panose="020B0604020202020204" pitchFamily="34" charset="0"/>
+                <a:cs typeface="Arial" panose="020B0604020202020204" pitchFamily="34" charset="0"/>
+              </a:rPr>
+            </a:br>
+            <a:r>
+              <a:rPr lang="en-US" sz="1600" b="1" i="1" u="sng" smtClean="0">
+                <a:solidFill>
+                  <a:srgbClr val="FF0000"/>
+                </a:solidFill>
+                <a:latin typeface="Arial" panose="020B0604020202020204" pitchFamily="34" charset="0"/>
+                <a:cs typeface="Arial" panose="020B0604020202020204" pitchFamily="34" charset="0"/>
+              </a:rPr>
+              <a:t> </a:t>
+            </a:r>
+            <a:endParaRPr lang="en-US" sz="1600" b="1">
+              <a:solidFill>
+                <a:srgbClr val="FF0000"/>
+              </a:solidFill>
+              <a:latin typeface="Arial" panose="020B0604020202020204" pitchFamily="34" charset="0"/>
+              <a:cs typeface="Arial" panose="020B0604020202020204" pitchFamily="34" charset="0"/>
+            </a:endParaRPr>
+          </a:p>
+        </p:txBody>
+      </p:sp>
+      <p:grpSp>
+        <p:nvGrpSpPr>
+          <p:cNvPr id="15" name="Group 93"/>
+          <p:cNvGrpSpPr/>
+          <p:nvPr/>
+        </p:nvGrpSpPr>
+        <p:grpSpPr bwMode="auto">
+          <a:xfrm>
+            <a:off x="6275101" y="1190568"/>
+            <a:ext cx="630966" cy="632252"/>
+            <a:chOff x="4628879" y="642920"/>
+            <a:chExt cx="676276" cy="928696"/>
+          </a:xfrm>
+          <a:solidFill>
+            <a:srgbClr val="0070C0"/>
+          </a:solidFill>
+        </p:grpSpPr>
+        <p:sp>
+          <p:nvSpPr>
+            <p:cNvPr id="17" name="Oval 16"/>
+            <p:cNvSpPr/>
+            <p:nvPr/>
+          </p:nvSpPr>
+          <p:spPr>
+            <a:xfrm>
+              <a:off x="4703494" y="642920"/>
+              <a:ext cx="450850" cy="214315"/>
+            </a:xfrm>
+            <a:prstGeom prst="ellipse">
+              <a:avLst/>
+            </a:prstGeom>
+            <a:solidFill>
+              <a:schemeClr val="bg1"/>
+            </a:solidFill>
+            <a:ln w="31750" cmpd="sng">
+              <a:solidFill>
+                <a:schemeClr val="accent2"/>
+              </a:solidFill>
+            </a:ln>
+          </p:spPr>
+          <p:style>
+            <a:lnRef idx="2">
+              <a:schemeClr val="accent1">
+                <a:shade val="50000"/>
+              </a:schemeClr>
+            </a:lnRef>
+            <a:fillRef idx="1">
+              <a:schemeClr val="accent1"/>
+            </a:fillRef>
+            <a:effectRef idx="0">
+              <a:schemeClr val="accent1"/>
+            </a:effectRef>
+            <a:fontRef idx="minor">
+              <a:schemeClr val="lt1"/>
+            </a:fontRef>
+          </p:style>
+          <p:txBody>
+            <a:bodyPr anchor="ctr"/>
+            <a:lstStyle/>
+            <a:p>
+              <a:pPr algn="ctr">
+                <a:defRPr/>
+              </a:pPr>
+              <a:endParaRPr lang="vi-VN">
+                <a:solidFill>
+                  <a:prstClr val="white"/>
+                </a:solidFill>
+              </a:endParaRPr>
+            </a:p>
+          </p:txBody>
+        </p:sp>
+        <p:cxnSp>
+          <p:nvCxnSpPr>
+            <p:cNvPr id="18" name="Straight Arrow Connector 17"/>
+            <p:cNvCxnSpPr>
+              <a:stCxn id="17" idx="4"/>
+            </p:cNvCxnSpPr>
+            <p:nvPr/>
+          </p:nvCxnSpPr>
+          <p:spPr>
+            <a:xfrm rot="5400000">
+              <a:off x="4679679" y="1108062"/>
+              <a:ext cx="500067" cy="1588"/>
+            </a:xfrm>
+            <a:prstGeom prst="straightConnector1">
+              <a:avLst/>
+            </a:prstGeom>
+            <a:grpFill/>
+            <a:ln w="31750" cmpd="sng">
+              <a:solidFill>
+                <a:schemeClr val="accent2"/>
+              </a:solidFill>
+              <a:tailEnd type="none"/>
+            </a:ln>
+          </p:spPr>
+          <p:style>
+            <a:lnRef idx="1">
+              <a:schemeClr val="accent1"/>
+            </a:lnRef>
+            <a:fillRef idx="0">
+              <a:schemeClr val="accent1"/>
+            </a:fillRef>
+            <a:effectRef idx="0">
+              <a:schemeClr val="accent1"/>
+            </a:effectRef>
+            <a:fontRef idx="minor">
+              <a:schemeClr val="tx1"/>
+            </a:fontRef>
+          </p:style>
+        </p:cxnSp>
+        <p:cxnSp>
+          <p:nvCxnSpPr>
+            <p:cNvPr id="19" name="Straight Arrow Connector 18"/>
+            <p:cNvCxnSpPr/>
+            <p:nvPr/>
+          </p:nvCxnSpPr>
+          <p:spPr>
+            <a:xfrm rot="10800000" flipV="1">
+              <a:off x="4628879" y="1000111"/>
+              <a:ext cx="300037" cy="214314"/>
+            </a:xfrm>
+            <a:prstGeom prst="straightConnector1">
+              <a:avLst/>
+            </a:prstGeom>
+            <a:grpFill/>
+            <a:ln w="31750" cmpd="sng">
+              <a:solidFill>
+                <a:schemeClr val="accent2"/>
+              </a:solidFill>
+              <a:tailEnd type="none"/>
+            </a:ln>
+          </p:spPr>
+          <p:style>
+            <a:lnRef idx="1">
+              <a:schemeClr val="accent1"/>
+            </a:lnRef>
+            <a:fillRef idx="0">
+              <a:schemeClr val="accent1"/>
+            </a:fillRef>
+            <a:effectRef idx="0">
+              <a:schemeClr val="accent1"/>
+            </a:effectRef>
+            <a:fontRef idx="minor">
+              <a:schemeClr val="tx1"/>
+            </a:fontRef>
+          </p:style>
+        </p:cxnSp>
+        <p:cxnSp>
+          <p:nvCxnSpPr>
+            <p:cNvPr id="20" name="Straight Arrow Connector 19"/>
+            <p:cNvCxnSpPr/>
+            <p:nvPr/>
+          </p:nvCxnSpPr>
+          <p:spPr>
+            <a:xfrm rot="16200000" flipH="1">
+              <a:off x="4934471" y="1351746"/>
+              <a:ext cx="214315" cy="225426"/>
+            </a:xfrm>
+            <a:prstGeom prst="straightConnector1">
+              <a:avLst/>
+            </a:prstGeom>
+            <a:grpFill/>
+            <a:ln w="31750" cmpd="sng">
+              <a:solidFill>
+                <a:schemeClr val="accent2"/>
+              </a:solidFill>
+              <a:tailEnd type="none"/>
+            </a:ln>
+          </p:spPr>
+          <p:style>
+            <a:lnRef idx="1">
+              <a:schemeClr val="accent1"/>
+            </a:lnRef>
+            <a:fillRef idx="0">
+              <a:schemeClr val="accent1"/>
+            </a:fillRef>
+            <a:effectRef idx="0">
+              <a:schemeClr val="accent1"/>
+            </a:effectRef>
+            <a:fontRef idx="minor">
+              <a:schemeClr val="tx1"/>
+            </a:fontRef>
+          </p:style>
+        </p:cxnSp>
+        <p:cxnSp>
+          <p:nvCxnSpPr>
+            <p:cNvPr id="21" name="Straight Arrow Connector 20"/>
+            <p:cNvCxnSpPr/>
+            <p:nvPr/>
+          </p:nvCxnSpPr>
+          <p:spPr>
+            <a:xfrm rot="5400000">
+              <a:off x="4747145" y="1389846"/>
+              <a:ext cx="214315" cy="149225"/>
+            </a:xfrm>
+            <a:prstGeom prst="straightConnector1">
+              <a:avLst/>
+            </a:prstGeom>
+            <a:grpFill/>
+            <a:ln w="31750" cmpd="sng">
+              <a:solidFill>
+                <a:schemeClr val="accent2"/>
+              </a:solidFill>
+              <a:tailEnd type="none"/>
+            </a:ln>
+          </p:spPr>
+          <p:style>
+            <a:lnRef idx="1">
+              <a:schemeClr val="accent1"/>
+            </a:lnRef>
+            <a:fillRef idx="0">
+              <a:schemeClr val="accent1"/>
+            </a:fillRef>
+            <a:effectRef idx="0">
+              <a:schemeClr val="accent1"/>
+            </a:effectRef>
+            <a:fontRef idx="minor">
+              <a:schemeClr val="tx1"/>
+            </a:fontRef>
+          </p:style>
+        </p:cxnSp>
+        <p:cxnSp>
+          <p:nvCxnSpPr>
+            <p:cNvPr id="22" name="Straight Arrow Connector 21"/>
+            <p:cNvCxnSpPr/>
+            <p:nvPr/>
+          </p:nvCxnSpPr>
+          <p:spPr>
+            <a:xfrm flipV="1">
+              <a:off x="4928917" y="1071547"/>
+              <a:ext cx="376238" cy="71439"/>
+            </a:xfrm>
+            <a:prstGeom prst="straightConnector1">
+              <a:avLst/>
+            </a:prstGeom>
+            <a:grpFill/>
+            <a:ln w="31750" cmpd="sng">
+              <a:solidFill>
+                <a:schemeClr val="accent2"/>
+              </a:solidFill>
+              <a:tailEnd type="none"/>
+            </a:ln>
+          </p:spPr>
+          <p:style>
+            <a:lnRef idx="1">
+              <a:schemeClr val="accent1"/>
+            </a:lnRef>
+            <a:fillRef idx="0">
+              <a:schemeClr val="accent1"/>
+            </a:fillRef>
+            <a:effectRef idx="0">
+              <a:schemeClr val="accent1"/>
+            </a:effectRef>
+            <a:fontRef idx="minor">
+              <a:schemeClr val="tx1"/>
+            </a:fontRef>
+          </p:style>
+        </p:cxnSp>
+        <p:sp>
+          <p:nvSpPr>
+            <p:cNvPr id="23" name="Oval 22"/>
+            <p:cNvSpPr/>
+            <p:nvPr/>
+          </p:nvSpPr>
+          <p:spPr>
+            <a:xfrm>
+              <a:off x="4779699" y="714355"/>
+              <a:ext cx="74614" cy="71437"/>
+            </a:xfrm>
+            <a:prstGeom prst="ellipse">
+              <a:avLst/>
+            </a:prstGeom>
+            <a:grpFill/>
+            <a:ln w="31750" cmpd="sng">
+              <a:solidFill>
+                <a:schemeClr val="bg1"/>
+              </a:solidFill>
+            </a:ln>
+          </p:spPr>
+          <p:style>
+            <a:lnRef idx="2">
+              <a:schemeClr val="accent1">
+                <a:shade val="50000"/>
+              </a:schemeClr>
+            </a:lnRef>
+            <a:fillRef idx="1">
+              <a:schemeClr val="accent1"/>
+            </a:fillRef>
+            <a:effectRef idx="0">
+              <a:schemeClr val="accent1"/>
+            </a:effectRef>
+            <a:fontRef idx="minor">
+              <a:schemeClr val="lt1"/>
+            </a:fontRef>
+          </p:style>
+          <p:txBody>
+            <a:bodyPr anchor="ctr"/>
+            <a:lstStyle/>
+            <a:p>
+              <a:pPr algn="ctr">
+                <a:defRPr/>
+              </a:pPr>
+              <a:endParaRPr lang="vi-VN">
+                <a:solidFill>
+                  <a:prstClr val="white"/>
+                </a:solidFill>
+              </a:endParaRPr>
+            </a:p>
+          </p:txBody>
+        </p:sp>
+        <p:sp>
+          <p:nvSpPr>
+            <p:cNvPr id="24" name="Oval 23"/>
+            <p:cNvSpPr/>
+            <p:nvPr/>
+          </p:nvSpPr>
+          <p:spPr>
+            <a:xfrm>
+              <a:off x="5005149" y="714358"/>
+              <a:ext cx="74614" cy="71437"/>
+            </a:xfrm>
+            <a:prstGeom prst="ellipse">
+              <a:avLst/>
+            </a:prstGeom>
+            <a:grpFill/>
+            <a:ln w="31750" cmpd="sng">
+              <a:solidFill>
+                <a:schemeClr val="bg1"/>
+              </a:solidFill>
+            </a:ln>
+          </p:spPr>
+          <p:style>
+            <a:lnRef idx="2">
+              <a:schemeClr val="accent1">
+                <a:shade val="50000"/>
+              </a:schemeClr>
+            </a:lnRef>
+            <a:fillRef idx="1">
+              <a:schemeClr val="accent1"/>
+            </a:fillRef>
+            <a:effectRef idx="0">
+              <a:schemeClr val="accent1"/>
+            </a:effectRef>
+            <a:fontRef idx="minor">
+              <a:schemeClr val="lt1"/>
+            </a:fontRef>
+          </p:style>
+          <p:txBody>
+            <a:bodyPr anchor="ctr"/>
+            <a:lstStyle/>
+            <a:p>
+              <a:pPr algn="ctr">
+                <a:defRPr/>
+              </a:pPr>
+              <a:endParaRPr lang="vi-VN">
+                <a:solidFill>
+                  <a:prstClr val="white"/>
+                </a:solidFill>
+              </a:endParaRPr>
+            </a:p>
+          </p:txBody>
+        </p:sp>
+      </p:grpSp>
+      <p:sp>
+        <p:nvSpPr>
+          <p:cNvPr id="16" name="TextBox 15">
+            <a:hlinkClick r:id="" action="ppaction://noaction"/>
+          </p:cNvPr>
+          <p:cNvSpPr txBox="1"/>
+          <p:nvPr/>
+        </p:nvSpPr>
+        <p:spPr>
+          <a:xfrm>
+            <a:off x="5781745" y="1703035"/>
+            <a:ext cx="2765467" cy="429261"/>
+          </a:xfrm>
+          <a:prstGeom prst="rect">
+            <a:avLst/>
+          </a:prstGeom>
+          <a:solidFill>
+            <a:schemeClr val="bg1"/>
+          </a:solidFill>
+          <a:ln>
+            <a:solidFill>
+              <a:schemeClr val="accent2">
+                <a:lumMod val="50000"/>
+              </a:schemeClr>
+            </a:solidFill>
+          </a:ln>
+        </p:spPr>
+        <p:txBody>
+          <a:bodyPr wrap="square" rtlCol="0">
+            <a:spAutoFit/>
+          </a:bodyPr>
+          <a:lstStyle/>
+          <a:p>
+            <a:r>
+              <a:rPr lang="en-US" sz="1600">
+                <a:solidFill>
+                  <a:schemeClr val="accent2">
+                    <a:lumMod val="50000"/>
+                  </a:schemeClr>
+                </a:solidFill>
+                <a:latin typeface="Arial" panose="020B0604020202020204" pitchFamily="34" charset="0"/>
+                <a:cs typeface="Arial" panose="020B0604020202020204" pitchFamily="34" charset="0"/>
+              </a:rPr>
+              <a:t>Màn hình </a:t>
+            </a:r>
+            <a:r>
+              <a:rPr lang="en-US" sz="1600" smtClean="0">
+                <a:solidFill>
+                  <a:schemeClr val="accent2">
+                    <a:lumMod val="50000"/>
+                  </a:schemeClr>
+                </a:solidFill>
+                <a:latin typeface="Arial" panose="020B0604020202020204" pitchFamily="34" charset="0"/>
+                <a:cs typeface="Arial" panose="020B0604020202020204" pitchFamily="34" charset="0"/>
+              </a:rPr>
+              <a:t>Giao diện </a:t>
+            </a:r>
+            <a:r>
+              <a:rPr lang="en-US" sz="1600" b="1" smtClean="0">
+                <a:solidFill>
+                  <a:schemeClr val="accent2">
+                    <a:lumMod val="50000"/>
+                  </a:schemeClr>
+                </a:solidFill>
+                <a:latin typeface="Arial" panose="020B0604020202020204" pitchFamily="34" charset="0"/>
+                <a:cs typeface="Arial" panose="020B0604020202020204" pitchFamily="34" charset="0"/>
+              </a:rPr>
+              <a:t>(1 )</a:t>
+            </a:r>
+            <a:endParaRPr lang="en-US" sz="1600" b="1" i="1" u="sng">
+              <a:solidFill>
+                <a:schemeClr val="accent2">
+                  <a:lumMod val="50000"/>
+                </a:schemeClr>
+              </a:solidFill>
+            </a:endParaRPr>
+          </a:p>
+        </p:txBody>
+      </p:sp>
+      <p:sp>
+        <p:nvSpPr>
+          <p:cNvPr id="31" name="TextBox 30">
+            <a:hlinkClick r:id="" action="ppaction://noaction"/>
+          </p:cNvPr>
+          <p:cNvSpPr txBox="1"/>
+          <p:nvPr/>
+        </p:nvSpPr>
+        <p:spPr>
+          <a:xfrm>
+            <a:off x="5611780" y="4481689"/>
+            <a:ext cx="2765467" cy="338553"/>
+          </a:xfrm>
+          <a:prstGeom prst="rect">
+            <a:avLst/>
+          </a:prstGeom>
+          <a:solidFill>
+            <a:schemeClr val="bg1"/>
+          </a:solidFill>
+          <a:ln>
+            <a:solidFill>
+              <a:schemeClr val="accent2">
+                <a:lumMod val="50000"/>
+              </a:schemeClr>
+            </a:solidFill>
+          </a:ln>
+        </p:spPr>
+        <p:txBody>
+          <a:bodyPr wrap="square" rtlCol="0">
+            <a:spAutoFit/>
+          </a:bodyPr>
+          <a:lstStyle/>
+          <a:p>
+            <a:r>
+              <a:rPr lang="en-US" sz="1600" smtClean="0">
+                <a:solidFill>
+                  <a:schemeClr val="accent2">
+                    <a:lumMod val="50000"/>
+                  </a:schemeClr>
+                </a:solidFill>
+                <a:latin typeface="Arial" panose="020B0604020202020204" pitchFamily="34" charset="0"/>
+                <a:cs typeface="Arial" panose="020B0604020202020204" pitchFamily="34" charset="0"/>
+              </a:rPr>
+              <a:t>Dịch vụ Giao tiếp </a:t>
+            </a:r>
+            <a:r>
+              <a:rPr lang="en-US" sz="1600" b="1" smtClean="0">
+                <a:solidFill>
+                  <a:schemeClr val="accent2">
+                    <a:lumMod val="50000"/>
+                  </a:schemeClr>
+                </a:solidFill>
+                <a:latin typeface="Arial" panose="020B0604020202020204" pitchFamily="34" charset="0"/>
+                <a:cs typeface="Arial" panose="020B0604020202020204" pitchFamily="34" charset="0"/>
+              </a:rPr>
+              <a:t>(1 )</a:t>
+            </a:r>
+            <a:endParaRPr lang="en-US" sz="1600" b="1" i="1" u="sng">
+              <a:solidFill>
+                <a:schemeClr val="accent2">
+                  <a:lumMod val="50000"/>
+                </a:schemeClr>
+              </a:solidFill>
+            </a:endParaRPr>
+          </a:p>
+        </p:txBody>
+      </p:sp>
+      <p:cxnSp>
+        <p:nvCxnSpPr>
+          <p:cNvPr id="3" name="Straight Arrow Connector 2"/>
+          <p:cNvCxnSpPr/>
+          <p:nvPr/>
+        </p:nvCxnSpPr>
+        <p:spPr>
+          <a:xfrm flipV="1">
+            <a:off x="6448132" y="3312120"/>
+            <a:ext cx="0" cy="1117053"/>
+          </a:xfrm>
+          <a:prstGeom prst="straightConnector1">
+            <a:avLst/>
+          </a:prstGeom>
+          <a:ln w="50800">
+            <a:solidFill>
+              <a:schemeClr val="tx1"/>
+            </a:solidFill>
+            <a:tailEnd type="triangle"/>
+          </a:ln>
+        </p:spPr>
+        <p:style>
+          <a:lnRef idx="1">
+            <a:schemeClr val="accent1"/>
+          </a:lnRef>
+          <a:fillRef idx="0">
+            <a:schemeClr val="accent1"/>
+          </a:fillRef>
+          <a:effectRef idx="0">
+            <a:schemeClr val="accent1"/>
+          </a:effectRef>
+          <a:fontRef idx="minor">
+            <a:schemeClr val="tx1"/>
+          </a:fontRef>
+        </p:style>
+      </p:cxnSp>
+      <p:sp>
+        <p:nvSpPr>
+          <p:cNvPr id="32" name="TextBox 31">
+            <a:hlinkClick r:id="" action="ppaction://noaction"/>
+          </p:cNvPr>
+          <p:cNvSpPr txBox="1"/>
+          <p:nvPr/>
+        </p:nvSpPr>
+        <p:spPr>
+          <a:xfrm>
+            <a:off x="5161897" y="3737888"/>
+            <a:ext cx="1063470" cy="307777"/>
+          </a:xfrm>
+          <a:prstGeom prst="rect">
+            <a:avLst/>
+          </a:prstGeom>
+          <a:solidFill>
+            <a:schemeClr val="bg1"/>
+          </a:solidFill>
+          <a:ln w="41275">
+            <a:solidFill>
+              <a:schemeClr val="tx1"/>
+            </a:solidFill>
+            <a:prstDash val="sysDash"/>
+          </a:ln>
+        </p:spPr>
+        <p:txBody>
+          <a:bodyPr wrap="square" rtlCol="0">
+            <a:spAutoFit/>
+          </a:bodyPr>
+          <a:lstStyle/>
+          <a:p>
+            <a:pPr algn="ctr"/>
+            <a:r>
+              <a:rPr lang="en-US" sz="1400" smtClean="0">
+                <a:latin typeface="Arial" panose="020B0604020202020204" pitchFamily="34" charset="0"/>
+                <a:cs typeface="Arial" panose="020B0604020202020204" pitchFamily="34" charset="0"/>
+              </a:rPr>
+              <a:t>Du_lieu</a:t>
+            </a:r>
+          </a:p>
+        </p:txBody>
+      </p:sp>
+      <p:sp>
+        <p:nvSpPr>
+          <p:cNvPr id="33" name="TextBox 32">
+            <a:hlinkClick r:id="" action="ppaction://noaction"/>
+          </p:cNvPr>
+          <p:cNvSpPr txBox="1"/>
+          <p:nvPr/>
+        </p:nvSpPr>
+        <p:spPr>
+          <a:xfrm>
+            <a:off x="7115380" y="1011011"/>
+            <a:ext cx="4438510" cy="1015663"/>
+          </a:xfrm>
+          <a:prstGeom prst="rect">
+            <a:avLst/>
+          </a:prstGeom>
+          <a:solidFill>
+            <a:schemeClr val="bg1"/>
+          </a:solidFill>
+          <a:ln>
+            <a:solidFill>
+              <a:schemeClr val="accent1"/>
+            </a:solidFill>
+          </a:ln>
+        </p:spPr>
+        <p:txBody>
+          <a:bodyPr wrap="square" rtlCol="0">
+            <a:spAutoFit/>
+          </a:bodyPr>
+          <a:lstStyle/>
+          <a:p>
+            <a:pPr>
+              <a:defRPr/>
+            </a:pPr>
+            <a:r>
+              <a:rPr lang="en-US" sz="1200" dirty="0" smtClean="0">
+                <a:solidFill>
+                  <a:srgbClr val="FF0000"/>
+                </a:solidFill>
+                <a:latin typeface="Arial" panose="020B0604020202020204" pitchFamily="34" charset="0"/>
+                <a:cs typeface="Arial" panose="020B0604020202020204" pitchFamily="34" charset="0"/>
+                <a:sym typeface="+mn-ea"/>
+              </a:rPr>
+              <a:t>Xem </a:t>
+            </a:r>
+            <a:r>
+              <a:rPr lang="en-US" sz="1200" dirty="0" smtClean="0">
+                <a:solidFill>
+                  <a:srgbClr val="002060"/>
+                </a:solidFill>
+                <a:latin typeface="Arial" panose="020B0604020202020204" pitchFamily="34" charset="0"/>
+                <a:cs typeface="Arial" panose="020B0604020202020204" pitchFamily="34" charset="0"/>
+                <a:sym typeface="+mn-ea"/>
+              </a:rPr>
+              <a:t>  </a:t>
+            </a:r>
+            <a:r>
+              <a:rPr lang="en-US" sz="1200" b="1" dirty="0" smtClean="0">
+                <a:solidFill>
+                  <a:srgbClr val="002060"/>
+                </a:solidFill>
+                <a:latin typeface="Arial" panose="020B0604020202020204" pitchFamily="34" charset="0"/>
+                <a:cs typeface="Arial" panose="020B0604020202020204" pitchFamily="34" charset="0"/>
+                <a:sym typeface="+mn-ea"/>
+              </a:rPr>
+              <a:t>Phiếu đặt</a:t>
+            </a:r>
+            <a:r>
+              <a:rPr lang="en-US" sz="1200" b="1" dirty="0" smtClean="0">
+                <a:solidFill>
+                  <a:srgbClr val="002060"/>
+                </a:solidFill>
+                <a:latin typeface="Arial" panose="020B0604020202020204" pitchFamily="34" charset="0"/>
+                <a:cs typeface="Arial" panose="020B0604020202020204" pitchFamily="34" charset="0"/>
+                <a:sym typeface="+mn-ea"/>
+              </a:rPr>
+              <a:t>(</a:t>
+            </a:r>
+            <a:r>
+              <a:rPr lang="en-US" sz="1200" dirty="0">
+                <a:latin typeface="Arial" panose="020B0604020202020204" pitchFamily="34" charset="0"/>
+                <a:cs typeface="Arial" panose="020B0604020202020204" pitchFamily="34" charset="0"/>
+              </a:rPr>
+              <a:t>Ma_so, Ngay_Dat, Ngay_Phan_cong, Ngay_Thanh_toan, Tien, Tinh_trang</a:t>
+            </a:r>
+          </a:p>
+          <a:p>
+            <a:pPr fontAlgn="auto">
+              <a:spcBef>
+                <a:spcPts val="0"/>
+              </a:spcBef>
+              <a:spcAft>
+                <a:spcPts val="0"/>
+              </a:spcAft>
+              <a:defRPr/>
+            </a:pPr>
+            <a:r>
+              <a:rPr lang="en-US" sz="1200" dirty="0" smtClean="0">
+                <a:solidFill>
+                  <a:srgbClr val="002060"/>
+                </a:solidFill>
+                <a:latin typeface="Arial" panose="020B0604020202020204" pitchFamily="34" charset="0"/>
+                <a:cs typeface="Arial" panose="020B0604020202020204" pitchFamily="34" charset="0"/>
+                <a:sym typeface="+mn-ea"/>
+              </a:rPr>
+              <a:t>, Danh_sach_Laptop(</a:t>
+            </a:r>
+            <a:r>
+              <a:rPr lang="en-US" sz="1200" dirty="0">
+                <a:latin typeface="Arial" panose="020B0604020202020204" pitchFamily="34" charset="0"/>
+                <a:cs typeface="Arial" panose="020B0604020202020204" pitchFamily="34" charset="0"/>
+              </a:rPr>
+              <a:t>Laptop:Ma_so,Ten, Don_gia_Ban, So_luong</a:t>
+            </a:r>
+            <a:r>
+              <a:rPr lang="en-US" sz="1200" dirty="0" smtClean="0">
+                <a:solidFill>
+                  <a:srgbClr val="002060"/>
+                </a:solidFill>
+                <a:latin typeface="Arial" panose="020B0604020202020204" pitchFamily="34" charset="0"/>
+                <a:cs typeface="Arial" panose="020B0604020202020204" pitchFamily="34" charset="0"/>
+                <a:sym typeface="+mn-ea"/>
+              </a:rPr>
+              <a:t>), Khach_hang(</a:t>
+            </a:r>
+            <a:r>
+              <a:rPr lang="en-US" sz="1200" dirty="0">
+                <a:latin typeface="Arial" panose="020B0604020202020204" pitchFamily="34" charset="0"/>
+                <a:cs typeface="Arial" panose="020B0604020202020204" pitchFamily="34" charset="0"/>
+              </a:rPr>
+              <a:t>Ho_ten, Dia_chi, So_Dien_thoai</a:t>
+            </a:r>
+            <a:r>
+              <a:rPr lang="en-US" sz="1200" dirty="0" smtClean="0">
+                <a:solidFill>
+                  <a:srgbClr val="002060"/>
+                </a:solidFill>
+                <a:latin typeface="Arial" panose="020B0604020202020204" pitchFamily="34" charset="0"/>
+                <a:cs typeface="Arial" panose="020B0604020202020204" pitchFamily="34" charset="0"/>
+                <a:sym typeface="+mn-ea"/>
+              </a:rPr>
+              <a:t>), Nhan_vien(</a:t>
+            </a:r>
+            <a:r>
+              <a:rPr lang="en-US" sz="1200" dirty="0">
+                <a:latin typeface="Arial" panose="020B0604020202020204" pitchFamily="34" charset="0"/>
+                <a:cs typeface="Arial" panose="020B0604020202020204" pitchFamily="34" charset="0"/>
+              </a:rPr>
+              <a:t>Ma_so, Ho_ten</a:t>
+            </a:r>
+            <a:r>
+              <a:rPr lang="en-US" sz="1200" dirty="0" smtClean="0">
+                <a:solidFill>
+                  <a:srgbClr val="002060"/>
+                </a:solidFill>
+                <a:latin typeface="Arial" panose="020B0604020202020204" pitchFamily="34" charset="0"/>
+                <a:cs typeface="Arial" panose="020B0604020202020204" pitchFamily="34" charset="0"/>
+                <a:sym typeface="+mn-ea"/>
+              </a:rPr>
+              <a:t>)), </a:t>
+            </a:r>
+            <a:r>
+              <a:rPr lang="en-US" sz="1200" dirty="0" smtClean="0">
+                <a:solidFill>
+                  <a:srgbClr val="FF0000"/>
+                </a:solidFill>
+                <a:latin typeface="Arial" panose="020B0604020202020204" pitchFamily="34" charset="0"/>
+                <a:cs typeface="Arial" panose="020B0604020202020204" pitchFamily="34" charset="0"/>
+                <a:sym typeface="+mn-ea"/>
+              </a:rPr>
+              <a:t>Giao</a:t>
+            </a:r>
+            <a:r>
+              <a:rPr lang="en-US" sz="1200" dirty="0" smtClean="0">
+                <a:solidFill>
+                  <a:srgbClr val="FF0000"/>
+                </a:solidFill>
+                <a:latin typeface="Arial" panose="020B0604020202020204" pitchFamily="34" charset="0"/>
+                <a:cs typeface="Arial" panose="020B0604020202020204" pitchFamily="34" charset="0"/>
+                <a:sym typeface="+mn-ea"/>
+              </a:rPr>
+              <a:t> </a:t>
+            </a:r>
+            <a:r>
+              <a:rPr lang="en-US" sz="1200" dirty="0" smtClean="0">
+                <a:solidFill>
+                  <a:srgbClr val="FF0000"/>
+                </a:solidFill>
+                <a:latin typeface="Arial" panose="020B0604020202020204" pitchFamily="34" charset="0"/>
+                <a:cs typeface="Arial" panose="020B0604020202020204" pitchFamily="34" charset="0"/>
+                <a:sym typeface="+mn-ea"/>
+              </a:rPr>
+              <a:t>hàng</a:t>
+            </a:r>
+            <a:endParaRPr lang="en-US" sz="1200" dirty="0" smtClean="0">
+              <a:solidFill>
+                <a:prstClr val="black"/>
+              </a:solidFill>
+              <a:latin typeface="Arial" panose="020B0604020202020204" pitchFamily="34" charset="0"/>
+              <a:cs typeface="Arial" panose="020B0604020202020204" pitchFamily="34" charset="0"/>
+            </a:endParaRPr>
+          </a:p>
+        </p:txBody>
+      </p:sp>
+      <p:sp>
+        <p:nvSpPr>
+          <p:cNvPr id="2" name="TextBox 11">
+            <a:hlinkClick r:id="" action="ppaction://noaction"/>
+          </p:cNvPr>
+          <p:cNvSpPr txBox="1"/>
+          <p:nvPr/>
+        </p:nvSpPr>
+        <p:spPr>
+          <a:xfrm>
+            <a:off x="5270406" y="2303253"/>
+            <a:ext cx="2355453" cy="737234"/>
+          </a:xfrm>
+          <a:prstGeom prst="rect">
+            <a:avLst/>
+          </a:prstGeom>
+          <a:solidFill>
+            <a:schemeClr val="bg1"/>
+          </a:solidFill>
+          <a:ln w="41275">
+            <a:solidFill>
+              <a:srgbClr val="002060"/>
+            </a:solidFill>
+            <a:prstDash val="sysDash"/>
+          </a:ln>
+        </p:spPr>
+        <p:txBody>
+          <a:bodyPr wrap="square" rtlCol="0">
+            <a:spAutoFit/>
+          </a:bodyPr>
+          <a:lstStyle/>
+          <a:p>
+            <a:r>
+              <a:rPr lang="en-US" sz="1400" b="1" dirty="0" smtClean="0">
+                <a:solidFill>
+                  <a:srgbClr val="002060"/>
+                </a:solidFill>
+                <a:latin typeface="Arial" panose="020B0604020202020204" pitchFamily="34" charset="0"/>
+                <a:cs typeface="Arial" panose="020B0604020202020204" pitchFamily="34" charset="0"/>
+              </a:rPr>
+              <a:t>Du_lieu</a:t>
+            </a:r>
+            <a:r>
+              <a:rPr lang="en-US" sz="1400" dirty="0" smtClean="0">
+                <a:solidFill>
+                  <a:srgbClr val="002060"/>
+                </a:solidFill>
+                <a:latin typeface="Arial" panose="020B0604020202020204" pitchFamily="34" charset="0"/>
+                <a:cs typeface="Arial" panose="020B0604020202020204" pitchFamily="34" charset="0"/>
+              </a:rPr>
+              <a:t/>
+            </a:r>
+            <a:br>
+              <a:rPr lang="en-US" sz="1400" dirty="0" smtClean="0">
+                <a:solidFill>
+                  <a:srgbClr val="002060"/>
+                </a:solidFill>
+                <a:latin typeface="Arial" panose="020B0604020202020204" pitchFamily="34" charset="0"/>
+                <a:cs typeface="Arial" panose="020B0604020202020204" pitchFamily="34" charset="0"/>
+              </a:rPr>
+            </a:br>
+            <a:r>
+              <a:rPr lang="en-US" sz="1400" dirty="0" smtClean="0">
+                <a:solidFill>
+                  <a:srgbClr val="002060"/>
+                </a:solidFill>
+                <a:latin typeface="Arial" panose="020B0604020202020204" pitchFamily="34" charset="0"/>
+                <a:cs typeface="Arial" panose="020B0604020202020204" pitchFamily="34" charset="0"/>
+              </a:rPr>
+              <a:t> Cong_ty</a:t>
+            </a:r>
+            <a:r>
+              <a:rPr lang="en-US" sz="1400" b="1" dirty="0" smtClean="0">
+                <a:solidFill>
+                  <a:srgbClr val="002060"/>
+                </a:solidFill>
+                <a:latin typeface="Arial" panose="020B0604020202020204" pitchFamily="34" charset="0"/>
+                <a:cs typeface="Arial" panose="020B0604020202020204" pitchFamily="34" charset="0"/>
+              </a:rPr>
+              <a:t/>
+            </a:r>
+            <a:br>
+              <a:rPr lang="en-US" sz="1400" b="1" dirty="0" smtClean="0">
+                <a:solidFill>
+                  <a:srgbClr val="002060"/>
+                </a:solidFill>
+                <a:latin typeface="Arial" panose="020B0604020202020204" pitchFamily="34" charset="0"/>
+                <a:cs typeface="Arial" panose="020B0604020202020204" pitchFamily="34" charset="0"/>
+              </a:rPr>
+            </a:br>
+            <a:r>
+              <a:rPr lang="en-US" sz="1400" dirty="0">
+                <a:solidFill>
+                  <a:srgbClr val="002060"/>
+                </a:solidFill>
+                <a:latin typeface="Arial" panose="020B0604020202020204" pitchFamily="34" charset="0"/>
+                <a:cs typeface="Arial" panose="020B0604020202020204" pitchFamily="34" charset="0"/>
+              </a:rPr>
+              <a:t> </a:t>
+            </a:r>
+            <a:r>
+              <a:rPr lang="en-US" sz="1400" dirty="0" smtClean="0">
+                <a:solidFill>
+                  <a:srgbClr val="002060"/>
+                </a:solidFill>
+                <a:latin typeface="Arial" panose="020B0604020202020204" pitchFamily="34" charset="0"/>
+                <a:cs typeface="Arial" panose="020B0604020202020204" pitchFamily="34" charset="0"/>
+              </a:rPr>
+              <a:t>Danh_sach_Phieu_dat </a:t>
+            </a:r>
+            <a:endParaRPr lang="en-US" sz="1400" b="1" dirty="0" smtClean="0">
+              <a:solidFill>
+                <a:srgbClr val="002060"/>
+              </a:solidFill>
+              <a:latin typeface="Arial" panose="020B0604020202020204" pitchFamily="34" charset="0"/>
+              <a:cs typeface="Arial" panose="020B0604020202020204" pitchFamily="34" charset="0"/>
+            </a:endParaRPr>
+          </a:p>
+        </p:txBody>
+      </p:sp>
+      <p:grpSp>
+        <p:nvGrpSpPr>
+          <p:cNvPr id="4" name="Group 3"/>
+          <p:cNvGrpSpPr/>
+          <p:nvPr/>
+        </p:nvGrpSpPr>
+        <p:grpSpPr>
+          <a:xfrm>
+            <a:off x="53975" y="1270"/>
+            <a:ext cx="4575810" cy="1537607"/>
+            <a:chOff x="620563" y="2333151"/>
+            <a:chExt cx="1767100" cy="1537633"/>
+          </a:xfrm>
+        </p:grpSpPr>
+        <p:sp>
+          <p:nvSpPr>
+            <p:cNvPr id="5" name="TextBox 25"/>
+            <p:cNvSpPr txBox="1"/>
+            <p:nvPr/>
+          </p:nvSpPr>
+          <p:spPr>
+            <a:xfrm>
+              <a:off x="620563" y="2333151"/>
+              <a:ext cx="1767100" cy="337191"/>
+            </a:xfrm>
+            <a:prstGeom prst="rect">
+              <a:avLst/>
+            </a:prstGeom>
+            <a:noFill/>
+            <a:ln>
+              <a:solidFill>
+                <a:schemeClr val="tx1"/>
+              </a:solidFill>
+            </a:ln>
+          </p:spPr>
+          <p:txBody>
+            <a:bodyPr wrap="square" rtlCol="0">
+              <a:spAutoFit/>
+            </a:bodyPr>
+            <a:lstStyle/>
+            <a:p>
+              <a:pPr algn="ctr"/>
+              <a:r>
+                <a:rPr lang="en-US" sz="1600" b="1" dirty="0" smtClean="0">
+                  <a:solidFill>
+                    <a:srgbClr val="002060"/>
+                  </a:solidFill>
+                  <a:latin typeface="Arial" panose="020B0604020202020204" pitchFamily="34" charset="0"/>
+                  <a:cs typeface="Arial" panose="020B0604020202020204" pitchFamily="34" charset="0"/>
+                </a:rPr>
+                <a:t>XL_PHIEU_DAT</a:t>
+              </a:r>
+              <a:endParaRPr lang="en-US" sz="1600" b="1" dirty="0">
+                <a:latin typeface="Arial" panose="020B0604020202020204" pitchFamily="34" charset="0"/>
+                <a:cs typeface="Arial" panose="020B0604020202020204" pitchFamily="34" charset="0"/>
+              </a:endParaRPr>
+            </a:p>
+          </p:txBody>
+        </p:sp>
+        <p:sp>
+          <p:nvSpPr>
+            <p:cNvPr id="6" name="TextBox 26"/>
+            <p:cNvSpPr txBox="1"/>
+            <p:nvPr/>
+          </p:nvSpPr>
+          <p:spPr>
+            <a:xfrm>
+              <a:off x="620563" y="2670435"/>
+              <a:ext cx="1767100" cy="1200349"/>
+            </a:xfrm>
+            <a:prstGeom prst="rect">
+              <a:avLst/>
+            </a:prstGeom>
+            <a:noFill/>
+            <a:ln>
+              <a:solidFill>
+                <a:schemeClr val="tx1"/>
+              </a:solidFill>
+            </a:ln>
+          </p:spPr>
+          <p:txBody>
+            <a:bodyPr wrap="square" rtlCol="0">
+              <a:spAutoFit/>
+            </a:bodyPr>
+            <a:lstStyle/>
+            <a:p>
+              <a:r>
+                <a:rPr lang="en-US" sz="1200" dirty="0" smtClean="0">
+                  <a:latin typeface="Arial" panose="020B0604020202020204" pitchFamily="34" charset="0"/>
+                  <a:cs typeface="Arial" panose="020B0604020202020204" pitchFamily="34" charset="0"/>
+                </a:rPr>
+                <a:t>Ma_so, Ngay_Dat, Ngay_Phan_cong, Ngay_Thanh_toan, Tien, Tinh_trang</a:t>
+              </a:r>
+              <a:endParaRPr lang="en-US" sz="1200" dirty="0" smtClean="0">
+                <a:latin typeface="Arial" panose="020B0604020202020204" pitchFamily="34" charset="0"/>
+                <a:cs typeface="Arial" panose="020B0604020202020204" pitchFamily="34" charset="0"/>
+              </a:endParaRPr>
+            </a:p>
+            <a:p>
+              <a:r>
+                <a:rPr lang="en-US" sz="1200" dirty="0" smtClean="0">
+                  <a:latin typeface="Arial" panose="020B0604020202020204" pitchFamily="34" charset="0"/>
+                  <a:cs typeface="Arial" panose="020B0604020202020204" pitchFamily="34" charset="0"/>
+                </a:rPr>
+                <a:t>     </a:t>
+              </a:r>
+              <a:r>
+                <a:rPr lang="en-US" sz="1200" dirty="0" smtClean="0">
+                  <a:latin typeface="Arial" panose="020B0604020202020204" pitchFamily="34" charset="0"/>
+                  <a:cs typeface="Arial" panose="020B0604020202020204" pitchFamily="34" charset="0"/>
+                </a:rPr>
+                <a:t>Danh_sach_Laptop</a:t>
+              </a:r>
+              <a:r>
+                <a:rPr lang="en-US" sz="1200" dirty="0" smtClean="0">
+                  <a:latin typeface="Arial" panose="020B0604020202020204" pitchFamily="34" charset="0"/>
+                  <a:cs typeface="Arial" panose="020B0604020202020204" pitchFamily="34" charset="0"/>
+                </a:rPr>
+                <a:t>:</a:t>
+              </a:r>
+            </a:p>
+            <a:p>
+              <a:r>
+                <a:rPr lang="en-US" sz="1200" dirty="0" smtClean="0">
+                  <a:latin typeface="Arial" panose="020B0604020202020204" pitchFamily="34" charset="0"/>
+                  <a:cs typeface="Arial" panose="020B0604020202020204" pitchFamily="34" charset="0"/>
+                </a:rPr>
+                <a:t>       * </a:t>
+              </a:r>
+              <a:r>
+                <a:rPr lang="en-US" sz="1200" dirty="0" smtClean="0">
+                  <a:latin typeface="Arial" panose="020B0604020202020204" pitchFamily="34" charset="0"/>
+                  <a:cs typeface="Arial" panose="020B0604020202020204" pitchFamily="34" charset="0"/>
+                </a:rPr>
+                <a:t>Laptop:Ma_so,Ten, Don_gia_Ban, So_luong</a:t>
+              </a:r>
+            </a:p>
+            <a:p>
+              <a:r>
+                <a:rPr lang="en-US" sz="1200" dirty="0" smtClean="0">
+                  <a:latin typeface="Arial" panose="020B0604020202020204" pitchFamily="34" charset="0"/>
+                  <a:cs typeface="Arial" panose="020B0604020202020204" pitchFamily="34" charset="0"/>
+                </a:rPr>
+                <a:t>     * Khach_hang: Ho_ten, Dia_chi, So_Dien_thoai</a:t>
+              </a:r>
+            </a:p>
+            <a:p>
+              <a:r>
+                <a:rPr lang="en-US" sz="1200" dirty="0">
+                  <a:latin typeface="Arial" panose="020B0604020202020204" pitchFamily="34" charset="0"/>
+                  <a:cs typeface="Arial" panose="020B0604020202020204" pitchFamily="34" charset="0"/>
+                </a:rPr>
+                <a:t> </a:t>
+              </a:r>
+              <a:r>
+                <a:rPr lang="en-US" sz="1200" dirty="0" smtClean="0">
+                  <a:latin typeface="Arial" panose="020B0604020202020204" pitchFamily="34" charset="0"/>
+                  <a:cs typeface="Arial" panose="020B0604020202020204" pitchFamily="34" charset="0"/>
+                </a:rPr>
+                <a:t>    * Nhan_vien: Ma_so, Ho_ten</a:t>
+              </a:r>
+              <a:endParaRPr lang="en-US" sz="1200" dirty="0" smtClean="0">
+                <a:latin typeface="Arial" panose="020B0604020202020204" pitchFamily="34" charset="0"/>
+                <a:cs typeface="Arial" panose="020B0604020202020204" pitchFamily="34" charset="0"/>
+              </a:endParaRPr>
+            </a:p>
+          </p:txBody>
+        </p:sp>
+      </p:grpSp>
+    </p:spTree>
+    <p:extLst>
+      <p:ext uri="{BB962C8B-B14F-4D97-AF65-F5344CB8AC3E}">
+        <p14:creationId xmlns:p14="http://schemas.microsoft.com/office/powerpoint/2010/main" val="916728579"/>
+      </p:ext>
+    </p:extLst>
   </p:cSld>
   <p:clrMapOvr>
     <a:masterClrMapping/>
@@ -11804,6 +12906,8 @@
       </a:bgFillStyleLst>
     </a:fmtScheme>
   </a:themeElements>
+  <a:objectDefaults/>
+  <a:extraClrSchemeLst/>
   <a:extLst>
     <a:ext uri="{05A4C25C-085E-4340-85A3-A5531E510DB2}">
       <thm15:themeFamily xmlns:thm15="http://schemas.microsoft.com/office/thememl/2012/main" name="Office Theme" id="{62F939B6-93AF-4DB8-9C6B-D6C7DFDC589F}" vid="{4A3C46E8-61CC-4603-A589-7422A47A8E4A}"/>
@@ -12063,6 +13167,8 @@
       </a:bgFillStyleLst>
     </a:fmtScheme>
   </a:themeElements>
+  <a:objectDefaults/>
+  <a:extraClrSchemeLst/>
   <a:extLst>
     <a:ext uri="{05A4C25C-085E-4340-85A3-A5531E510DB2}">
       <thm15:themeFamily xmlns:thm15="http://schemas.microsoft.com/office/thememl/2012/main" name="Office Theme" id="{62F939B6-93AF-4DB8-9C6B-D6C7DFDC589F}" vid="{4A3C46E8-61CC-4603-A589-7422A47A8E4A}"/>
@@ -12322,6 +13428,8 @@
       </a:bgFillStyleLst>
     </a:fmtScheme>
   </a:themeElements>
+  <a:objectDefaults/>
+  <a:extraClrSchemeLst/>
   <a:extLst>
     <a:ext uri="{05A4C25C-085E-4340-85A3-A5531E510DB2}">
       <thm15:themeFamily xmlns:thm15="http://schemas.microsoft.com/office/thememl/2012/main" name="Office Theme" id="{62F939B6-93AF-4DB8-9C6B-D6C7DFDC589F}" vid="{4A3C46E8-61CC-4603-A589-7422A47A8E4A}"/>

</xml_diff>